<commit_message>
[ DOC ] update pinout design slides
</commit_message>
<xml_diff>
--- a/PinOut.pptx
+++ b/PinOut.pptx
@@ -6,6 +6,7 @@
   </p:sldMasterIdLst>
   <p:sldIdLst>
     <p:sldId id="256" r:id="rId2"/>
+    <p:sldId id="257" r:id="rId3"/>
   </p:sldIdLst>
   <p:sldSz cx="12192000" cy="6858000"/>
   <p:notesSz cx="6858000" cy="9144000"/>
@@ -254,7 +255,7 @@
           <a:p>
             <a:fld id="{807DEB4C-13CB-4998-BB8A-6061EEBFB08B}" type="datetimeFigureOut">
               <a:rPr kumimoji="1" lang="ja-JP" altLang="en-US" smtClean="0"/>
-              <a:t>2015/5/24</a:t>
+              <a:t>2017/2/5</a:t>
             </a:fld>
             <a:endParaRPr kumimoji="1" lang="ja-JP" altLang="en-US"/>
           </a:p>
@@ -456,7 +457,7 @@
           <a:p>
             <a:fld id="{807DEB4C-13CB-4998-BB8A-6061EEBFB08B}" type="datetimeFigureOut">
               <a:rPr kumimoji="1" lang="ja-JP" altLang="en-US" smtClean="0"/>
-              <a:t>2015/5/24</a:t>
+              <a:t>2017/2/5</a:t>
             </a:fld>
             <a:endParaRPr kumimoji="1" lang="ja-JP" altLang="en-US"/>
           </a:p>
@@ -668,7 +669,7 @@
           <a:p>
             <a:fld id="{807DEB4C-13CB-4998-BB8A-6061EEBFB08B}" type="datetimeFigureOut">
               <a:rPr kumimoji="1" lang="ja-JP" altLang="en-US" smtClean="0"/>
-              <a:t>2015/5/24</a:t>
+              <a:t>2017/2/5</a:t>
             </a:fld>
             <a:endParaRPr kumimoji="1" lang="ja-JP" altLang="en-US"/>
           </a:p>
@@ -870,7 +871,7 @@
           <a:p>
             <a:fld id="{807DEB4C-13CB-4998-BB8A-6061EEBFB08B}" type="datetimeFigureOut">
               <a:rPr kumimoji="1" lang="ja-JP" altLang="en-US" smtClean="0"/>
-              <a:t>2015/5/24</a:t>
+              <a:t>2017/2/5</a:t>
             </a:fld>
             <a:endParaRPr kumimoji="1" lang="ja-JP" altLang="en-US"/>
           </a:p>
@@ -1116,7 +1117,7 @@
           <a:p>
             <a:fld id="{807DEB4C-13CB-4998-BB8A-6061EEBFB08B}" type="datetimeFigureOut">
               <a:rPr kumimoji="1" lang="ja-JP" altLang="en-US" smtClean="0"/>
-              <a:t>2015/5/24</a:t>
+              <a:t>2017/2/5</a:t>
             </a:fld>
             <a:endParaRPr kumimoji="1" lang="ja-JP" altLang="en-US"/>
           </a:p>
@@ -1412,7 +1413,7 @@
           <a:p>
             <a:fld id="{807DEB4C-13CB-4998-BB8A-6061EEBFB08B}" type="datetimeFigureOut">
               <a:rPr kumimoji="1" lang="ja-JP" altLang="en-US" smtClean="0"/>
-              <a:t>2015/5/24</a:t>
+              <a:t>2017/2/5</a:t>
             </a:fld>
             <a:endParaRPr kumimoji="1" lang="ja-JP" altLang="en-US"/>
           </a:p>
@@ -1843,7 +1844,7 @@
           <a:p>
             <a:fld id="{807DEB4C-13CB-4998-BB8A-6061EEBFB08B}" type="datetimeFigureOut">
               <a:rPr kumimoji="1" lang="ja-JP" altLang="en-US" smtClean="0"/>
-              <a:t>2015/5/24</a:t>
+              <a:t>2017/2/5</a:t>
             </a:fld>
             <a:endParaRPr kumimoji="1" lang="ja-JP" altLang="en-US"/>
           </a:p>
@@ -1961,7 +1962,7 @@
           <a:p>
             <a:fld id="{807DEB4C-13CB-4998-BB8A-6061EEBFB08B}" type="datetimeFigureOut">
               <a:rPr kumimoji="1" lang="ja-JP" altLang="en-US" smtClean="0"/>
-              <a:t>2015/5/24</a:t>
+              <a:t>2017/2/5</a:t>
             </a:fld>
             <a:endParaRPr kumimoji="1" lang="ja-JP" altLang="en-US"/>
           </a:p>
@@ -2056,7 +2057,7 @@
           <a:p>
             <a:fld id="{807DEB4C-13CB-4998-BB8A-6061EEBFB08B}" type="datetimeFigureOut">
               <a:rPr kumimoji="1" lang="ja-JP" altLang="en-US" smtClean="0"/>
-              <a:t>2015/5/24</a:t>
+              <a:t>2017/2/5</a:t>
             </a:fld>
             <a:endParaRPr kumimoji="1" lang="ja-JP" altLang="en-US"/>
           </a:p>
@@ -2365,7 +2366,7 @@
           <a:p>
             <a:fld id="{807DEB4C-13CB-4998-BB8A-6061EEBFB08B}" type="datetimeFigureOut">
               <a:rPr kumimoji="1" lang="ja-JP" altLang="en-US" smtClean="0"/>
-              <a:t>2015/5/24</a:t>
+              <a:t>2017/2/5</a:t>
             </a:fld>
             <a:endParaRPr kumimoji="1" lang="ja-JP" altLang="en-US"/>
           </a:p>
@@ -2618,7 +2619,7 @@
           <a:p>
             <a:fld id="{807DEB4C-13CB-4998-BB8A-6061EEBFB08B}" type="datetimeFigureOut">
               <a:rPr kumimoji="1" lang="ja-JP" altLang="en-US" smtClean="0"/>
-              <a:t>2015/5/24</a:t>
+              <a:t>2017/2/5</a:t>
             </a:fld>
             <a:endParaRPr kumimoji="1" lang="ja-JP" altLang="en-US"/>
           </a:p>
@@ -2863,7 +2864,7 @@
           <a:p>
             <a:fld id="{807DEB4C-13CB-4998-BB8A-6061EEBFB08B}" type="datetimeFigureOut">
               <a:rPr kumimoji="1" lang="ja-JP" altLang="en-US" smtClean="0"/>
-              <a:t>2015/5/24</a:t>
+              <a:t>2017/2/5</a:t>
             </a:fld>
             <a:endParaRPr kumimoji="1" lang="ja-JP" altLang="en-US"/>
           </a:p>
@@ -6819,6 +6820,2495 @@
 </p:sld>
 </file>
 
+<file path=ppt/slides/slide2.xml><?xml version="1.0" encoding="utf-8"?>
+<p:sld xmlns:a="http://schemas.openxmlformats.org/drawingml/2006/main" xmlns:r="http://schemas.openxmlformats.org/officeDocument/2006/relationships" xmlns:p="http://schemas.openxmlformats.org/presentationml/2006/main">
+  <p:cSld>
+    <p:spTree>
+      <p:nvGrpSpPr>
+        <p:cNvPr id="1" name=""/>
+        <p:cNvGrpSpPr/>
+        <p:nvPr/>
+      </p:nvGrpSpPr>
+      <p:grpSpPr>
+        <a:xfrm>
+          <a:off x="0" y="0"/>
+          <a:ext cx="0" cy="0"/>
+          <a:chOff x="0" y="0"/>
+          <a:chExt cx="0" cy="0"/>
+        </a:xfrm>
+      </p:grpSpPr>
+      <p:grpSp>
+        <p:nvGrpSpPr>
+          <p:cNvPr id="78" name="図形グループ 77"/>
+          <p:cNvGrpSpPr/>
+          <p:nvPr/>
+        </p:nvGrpSpPr>
+        <p:grpSpPr>
+          <a:xfrm>
+            <a:off x="2054177" y="0"/>
+            <a:ext cx="8498781" cy="6941094"/>
+            <a:chOff x="2054177" y="0"/>
+            <a:chExt cx="8498781" cy="6941094"/>
+          </a:xfrm>
+        </p:grpSpPr>
+        <p:grpSp>
+          <p:nvGrpSpPr>
+            <p:cNvPr id="75" name="図形グループ 74"/>
+            <p:cNvGrpSpPr/>
+            <p:nvPr/>
+          </p:nvGrpSpPr>
+          <p:grpSpPr>
+            <a:xfrm>
+              <a:off x="2058338" y="0"/>
+              <a:ext cx="8494620" cy="6678001"/>
+              <a:chOff x="2045275" y="180000"/>
+              <a:chExt cx="8494620" cy="6678001"/>
+            </a:xfrm>
+          </p:grpSpPr>
+          <p:grpSp>
+            <p:nvGrpSpPr>
+              <p:cNvPr id="73" name="図形グループ 72"/>
+              <p:cNvGrpSpPr/>
+              <p:nvPr/>
+            </p:nvGrpSpPr>
+            <p:grpSpPr>
+              <a:xfrm>
+                <a:off x="2045275" y="180000"/>
+                <a:ext cx="8195045" cy="6516000"/>
+                <a:chOff x="2045275" y="180000"/>
+                <a:chExt cx="8195045" cy="6516000"/>
+              </a:xfrm>
+            </p:grpSpPr>
+            <p:sp>
+              <p:nvSpPr>
+                <p:cNvPr id="52" name="テキスト ボックス 51"/>
+                <p:cNvSpPr txBox="1"/>
+                <p:nvPr/>
+              </p:nvSpPr>
+              <p:spPr>
+                <a:xfrm>
+                  <a:off x="2353052" y="6160189"/>
+                  <a:ext cx="1377696" cy="307777"/>
+                </a:xfrm>
+                <a:prstGeom prst="rect">
+                  <a:avLst/>
+                </a:prstGeom>
+                <a:ln>
+                  <a:solidFill>
+                    <a:schemeClr val="bg1"/>
+                  </a:solidFill>
+                </a:ln>
+              </p:spPr>
+              <p:style>
+                <a:lnRef idx="1">
+                  <a:schemeClr val="accent4"/>
+                </a:lnRef>
+                <a:fillRef idx="2">
+                  <a:schemeClr val="accent4"/>
+                </a:fillRef>
+                <a:effectRef idx="1">
+                  <a:schemeClr val="accent4"/>
+                </a:effectRef>
+                <a:fontRef idx="minor">
+                  <a:schemeClr val="dk1"/>
+                </a:fontRef>
+              </p:style>
+              <p:txBody>
+                <a:bodyPr wrap="square" rtlCol="0">
+                  <a:spAutoFit/>
+                </a:bodyPr>
+                <a:lstStyle/>
+                <a:p>
+                  <a:pPr algn="ctr"/>
+                  <a:r>
+                    <a:rPr kumimoji="1" lang="en-US" altLang="ja-JP" sz="1400" dirty="0" smtClean="0"/>
+                    <a:t>GPIO </a:t>
+                  </a:r>
+                  <a:r>
+                    <a:rPr kumimoji="1" lang="en-US" altLang="ja-JP" sz="1400" dirty="0" smtClean="0"/>
+                    <a:t>10</a:t>
+                  </a:r>
+                  <a:endParaRPr kumimoji="1" lang="ja-JP" altLang="en-US" sz="1400" dirty="0"/>
+                </a:p>
+              </p:txBody>
+            </p:sp>
+            <p:sp>
+              <p:nvSpPr>
+                <p:cNvPr id="53" name="テキスト ボックス 52"/>
+                <p:cNvSpPr txBox="1"/>
+                <p:nvPr/>
+              </p:nvSpPr>
+              <p:spPr>
+                <a:xfrm>
+                  <a:off x="8503917" y="1773379"/>
+                  <a:ext cx="1728000" cy="307777"/>
+                </a:xfrm>
+                <a:prstGeom prst="rect">
+                  <a:avLst/>
+                </a:prstGeom>
+                <a:ln>
+                  <a:solidFill>
+                    <a:schemeClr val="bg1"/>
+                  </a:solidFill>
+                </a:ln>
+              </p:spPr>
+              <p:style>
+                <a:lnRef idx="1">
+                  <a:schemeClr val="accent4"/>
+                </a:lnRef>
+                <a:fillRef idx="2">
+                  <a:schemeClr val="accent4"/>
+                </a:fillRef>
+                <a:effectRef idx="1">
+                  <a:schemeClr val="accent4"/>
+                </a:effectRef>
+                <a:fontRef idx="minor">
+                  <a:schemeClr val="dk1"/>
+                </a:fontRef>
+              </p:style>
+              <p:txBody>
+                <a:bodyPr wrap="square" rtlCol="0">
+                  <a:spAutoFit/>
+                </a:bodyPr>
+                <a:lstStyle/>
+                <a:p>
+                  <a:pPr algn="ctr"/>
+                  <a:r>
+                    <a:rPr kumimoji="1" lang="en-US" altLang="ja-JP" sz="1400" dirty="0" smtClean="0"/>
+                    <a:t>GPIO </a:t>
+                  </a:r>
+                  <a:r>
+                    <a:rPr kumimoji="1" lang="en-US" altLang="ja-JP" sz="1400" dirty="0" smtClean="0"/>
+                    <a:t>017</a:t>
+                  </a:r>
+                  <a:endParaRPr kumimoji="1" lang="ja-JP" altLang="en-US" sz="1400" dirty="0"/>
+                </a:p>
+              </p:txBody>
+            </p:sp>
+            <p:grpSp>
+              <p:nvGrpSpPr>
+                <p:cNvPr id="67" name="図形グループ 66"/>
+                <p:cNvGrpSpPr/>
+                <p:nvPr/>
+              </p:nvGrpSpPr>
+              <p:grpSpPr>
+                <a:xfrm>
+                  <a:off x="2045275" y="180000"/>
+                  <a:ext cx="8195045" cy="6516000"/>
+                  <a:chOff x="2045275" y="180000"/>
+                  <a:chExt cx="8195045" cy="6516000"/>
+                </a:xfrm>
+              </p:grpSpPr>
+              <p:cxnSp>
+                <p:nvCxnSpPr>
+                  <p:cNvPr id="6" name="直線コネクタ 5"/>
+                  <p:cNvCxnSpPr/>
+                  <p:nvPr/>
+                </p:nvCxnSpPr>
+                <p:spPr>
+                  <a:xfrm>
+                    <a:off x="3730752" y="763524"/>
+                    <a:ext cx="4773168" cy="0"/>
+                  </a:xfrm>
+                  <a:prstGeom prst="line">
+                    <a:avLst/>
+                  </a:prstGeom>
+                  <a:ln w="38100">
+                    <a:solidFill>
+                      <a:schemeClr val="tx1"/>
+                    </a:solidFill>
+                  </a:ln>
+                </p:spPr>
+                <p:style>
+                  <a:lnRef idx="1">
+                    <a:schemeClr val="accent1"/>
+                  </a:lnRef>
+                  <a:fillRef idx="0">
+                    <a:schemeClr val="accent1"/>
+                  </a:fillRef>
+                  <a:effectRef idx="0">
+                    <a:schemeClr val="accent1"/>
+                  </a:effectRef>
+                  <a:fontRef idx="minor">
+                    <a:schemeClr val="tx1"/>
+                  </a:fontRef>
+                </p:style>
+              </p:cxnSp>
+              <p:cxnSp>
+                <p:nvCxnSpPr>
+                  <p:cNvPr id="9" name="直線コネクタ 8"/>
+                  <p:cNvCxnSpPr/>
+                  <p:nvPr/>
+                </p:nvCxnSpPr>
+                <p:spPr>
+                  <a:xfrm>
+                    <a:off x="3730752" y="1190244"/>
+                    <a:ext cx="4773168" cy="0"/>
+                  </a:xfrm>
+                  <a:prstGeom prst="line">
+                    <a:avLst/>
+                  </a:prstGeom>
+                  <a:ln w="38100">
+                    <a:solidFill>
+                      <a:schemeClr val="tx1"/>
+                    </a:solidFill>
+                  </a:ln>
+                </p:spPr>
+                <p:style>
+                  <a:lnRef idx="1">
+                    <a:schemeClr val="accent1"/>
+                  </a:lnRef>
+                  <a:fillRef idx="0">
+                    <a:schemeClr val="accent1"/>
+                  </a:fillRef>
+                  <a:effectRef idx="0">
+                    <a:schemeClr val="accent1"/>
+                  </a:effectRef>
+                  <a:fontRef idx="minor">
+                    <a:schemeClr val="tx1"/>
+                  </a:fontRef>
+                </p:style>
+              </p:cxnSp>
+              <p:cxnSp>
+                <p:nvCxnSpPr>
+                  <p:cNvPr id="10" name="直線コネクタ 9"/>
+                  <p:cNvCxnSpPr/>
+                  <p:nvPr/>
+                </p:nvCxnSpPr>
+                <p:spPr>
+                  <a:xfrm>
+                    <a:off x="3730752" y="1562100"/>
+                    <a:ext cx="4773168" cy="0"/>
+                  </a:xfrm>
+                  <a:prstGeom prst="line">
+                    <a:avLst/>
+                  </a:prstGeom>
+                  <a:ln w="38100">
+                    <a:solidFill>
+                      <a:schemeClr val="tx1"/>
+                    </a:solidFill>
+                  </a:ln>
+                </p:spPr>
+                <p:style>
+                  <a:lnRef idx="1">
+                    <a:schemeClr val="accent1"/>
+                  </a:lnRef>
+                  <a:fillRef idx="0">
+                    <a:schemeClr val="accent1"/>
+                  </a:fillRef>
+                  <a:effectRef idx="0">
+                    <a:schemeClr val="accent1"/>
+                  </a:effectRef>
+                  <a:fontRef idx="minor">
+                    <a:schemeClr val="tx1"/>
+                  </a:fontRef>
+                </p:style>
+              </p:cxnSp>
+              <p:cxnSp>
+                <p:nvCxnSpPr>
+                  <p:cNvPr id="11" name="直線コネクタ 10"/>
+                  <p:cNvCxnSpPr/>
+                  <p:nvPr/>
+                </p:nvCxnSpPr>
+                <p:spPr>
+                  <a:xfrm>
+                    <a:off x="3730752" y="1919336"/>
+                    <a:ext cx="4773168" cy="0"/>
+                  </a:xfrm>
+                  <a:prstGeom prst="line">
+                    <a:avLst/>
+                  </a:prstGeom>
+                  <a:ln w="38100">
+                    <a:solidFill>
+                      <a:schemeClr val="tx1"/>
+                    </a:solidFill>
+                  </a:ln>
+                </p:spPr>
+                <p:style>
+                  <a:lnRef idx="1">
+                    <a:schemeClr val="accent1"/>
+                  </a:lnRef>
+                  <a:fillRef idx="0">
+                    <a:schemeClr val="accent1"/>
+                  </a:fillRef>
+                  <a:effectRef idx="0">
+                    <a:schemeClr val="accent1"/>
+                  </a:effectRef>
+                  <a:fontRef idx="minor">
+                    <a:schemeClr val="tx1"/>
+                  </a:fontRef>
+                </p:style>
+              </p:cxnSp>
+              <p:cxnSp>
+                <p:nvCxnSpPr>
+                  <p:cNvPr id="12" name="直線コネクタ 11"/>
+                  <p:cNvCxnSpPr/>
+                  <p:nvPr/>
+                </p:nvCxnSpPr>
+                <p:spPr>
+                  <a:xfrm>
+                    <a:off x="3730752" y="2346056"/>
+                    <a:ext cx="4773168" cy="0"/>
+                  </a:xfrm>
+                  <a:prstGeom prst="line">
+                    <a:avLst/>
+                  </a:prstGeom>
+                  <a:ln w="38100">
+                    <a:solidFill>
+                      <a:schemeClr val="tx1"/>
+                    </a:solidFill>
+                  </a:ln>
+                </p:spPr>
+                <p:style>
+                  <a:lnRef idx="1">
+                    <a:schemeClr val="accent1"/>
+                  </a:lnRef>
+                  <a:fillRef idx="0">
+                    <a:schemeClr val="accent1"/>
+                  </a:fillRef>
+                  <a:effectRef idx="0">
+                    <a:schemeClr val="accent1"/>
+                  </a:effectRef>
+                  <a:fontRef idx="minor">
+                    <a:schemeClr val="tx1"/>
+                  </a:fontRef>
+                </p:style>
+              </p:cxnSp>
+              <p:cxnSp>
+                <p:nvCxnSpPr>
+                  <p:cNvPr id="13" name="直線コネクタ 12"/>
+                  <p:cNvCxnSpPr/>
+                  <p:nvPr/>
+                </p:nvCxnSpPr>
+                <p:spPr>
+                  <a:xfrm>
+                    <a:off x="3730752" y="2717912"/>
+                    <a:ext cx="4773168" cy="0"/>
+                  </a:xfrm>
+                  <a:prstGeom prst="line">
+                    <a:avLst/>
+                  </a:prstGeom>
+                  <a:ln w="38100">
+                    <a:solidFill>
+                      <a:schemeClr val="tx1"/>
+                    </a:solidFill>
+                  </a:ln>
+                </p:spPr>
+                <p:style>
+                  <a:lnRef idx="1">
+                    <a:schemeClr val="accent1"/>
+                  </a:lnRef>
+                  <a:fillRef idx="0">
+                    <a:schemeClr val="accent1"/>
+                  </a:fillRef>
+                  <a:effectRef idx="0">
+                    <a:schemeClr val="accent1"/>
+                  </a:effectRef>
+                  <a:fontRef idx="minor">
+                    <a:schemeClr val="tx1"/>
+                  </a:fontRef>
+                </p:style>
+              </p:cxnSp>
+              <p:cxnSp>
+                <p:nvCxnSpPr>
+                  <p:cNvPr id="14" name="直線コネクタ 13"/>
+                  <p:cNvCxnSpPr/>
+                  <p:nvPr/>
+                </p:nvCxnSpPr>
+                <p:spPr>
+                  <a:xfrm>
+                    <a:off x="3730752" y="3125049"/>
+                    <a:ext cx="4773168" cy="0"/>
+                  </a:xfrm>
+                  <a:prstGeom prst="line">
+                    <a:avLst/>
+                  </a:prstGeom>
+                  <a:ln w="38100">
+                    <a:solidFill>
+                      <a:schemeClr val="tx1"/>
+                    </a:solidFill>
+                  </a:ln>
+                </p:spPr>
+                <p:style>
+                  <a:lnRef idx="1">
+                    <a:schemeClr val="accent1"/>
+                  </a:lnRef>
+                  <a:fillRef idx="0">
+                    <a:schemeClr val="accent1"/>
+                  </a:fillRef>
+                  <a:effectRef idx="0">
+                    <a:schemeClr val="accent1"/>
+                  </a:effectRef>
+                  <a:fontRef idx="minor">
+                    <a:schemeClr val="tx1"/>
+                  </a:fontRef>
+                </p:style>
+              </p:cxnSp>
+              <p:cxnSp>
+                <p:nvCxnSpPr>
+                  <p:cNvPr id="15" name="直線コネクタ 14"/>
+                  <p:cNvCxnSpPr/>
+                  <p:nvPr/>
+                </p:nvCxnSpPr>
+                <p:spPr>
+                  <a:xfrm>
+                    <a:off x="3730752" y="3535584"/>
+                    <a:ext cx="4773168" cy="0"/>
+                  </a:xfrm>
+                  <a:prstGeom prst="line">
+                    <a:avLst/>
+                  </a:prstGeom>
+                  <a:ln w="38100">
+                    <a:solidFill>
+                      <a:schemeClr val="tx1"/>
+                    </a:solidFill>
+                  </a:ln>
+                </p:spPr>
+                <p:style>
+                  <a:lnRef idx="1">
+                    <a:schemeClr val="accent1"/>
+                  </a:lnRef>
+                  <a:fillRef idx="0">
+                    <a:schemeClr val="accent1"/>
+                  </a:fillRef>
+                  <a:effectRef idx="0">
+                    <a:schemeClr val="accent1"/>
+                  </a:effectRef>
+                  <a:fontRef idx="minor">
+                    <a:schemeClr val="tx1"/>
+                  </a:fontRef>
+                </p:style>
+              </p:cxnSp>
+              <p:cxnSp>
+                <p:nvCxnSpPr>
+                  <p:cNvPr id="16" name="直線コネクタ 15"/>
+                  <p:cNvCxnSpPr/>
+                  <p:nvPr/>
+                </p:nvCxnSpPr>
+                <p:spPr>
+                  <a:xfrm>
+                    <a:off x="3730752" y="3923625"/>
+                    <a:ext cx="4773168" cy="0"/>
+                  </a:xfrm>
+                  <a:prstGeom prst="line">
+                    <a:avLst/>
+                  </a:prstGeom>
+                  <a:ln w="38100">
+                    <a:solidFill>
+                      <a:schemeClr val="tx1"/>
+                    </a:solidFill>
+                  </a:ln>
+                </p:spPr>
+                <p:style>
+                  <a:lnRef idx="1">
+                    <a:schemeClr val="accent1"/>
+                  </a:lnRef>
+                  <a:fillRef idx="0">
+                    <a:schemeClr val="accent1"/>
+                  </a:fillRef>
+                  <a:effectRef idx="0">
+                    <a:schemeClr val="accent1"/>
+                  </a:effectRef>
+                  <a:fontRef idx="minor">
+                    <a:schemeClr val="tx1"/>
+                  </a:fontRef>
+                </p:style>
+              </p:cxnSp>
+              <p:cxnSp>
+                <p:nvCxnSpPr>
+                  <p:cNvPr id="17" name="直線コネクタ 16"/>
+                  <p:cNvCxnSpPr/>
+                  <p:nvPr/>
+                </p:nvCxnSpPr>
+                <p:spPr>
+                  <a:xfrm>
+                    <a:off x="3730752" y="4280861"/>
+                    <a:ext cx="4773168" cy="0"/>
+                  </a:xfrm>
+                  <a:prstGeom prst="line">
+                    <a:avLst/>
+                  </a:prstGeom>
+                  <a:ln w="38100">
+                    <a:solidFill>
+                      <a:schemeClr val="tx1"/>
+                    </a:solidFill>
+                  </a:ln>
+                </p:spPr>
+                <p:style>
+                  <a:lnRef idx="1">
+                    <a:schemeClr val="accent1"/>
+                  </a:lnRef>
+                  <a:fillRef idx="0">
+                    <a:schemeClr val="accent1"/>
+                  </a:fillRef>
+                  <a:effectRef idx="0">
+                    <a:schemeClr val="accent1"/>
+                  </a:effectRef>
+                  <a:fontRef idx="minor">
+                    <a:schemeClr val="tx1"/>
+                  </a:fontRef>
+                </p:style>
+              </p:cxnSp>
+              <p:cxnSp>
+                <p:nvCxnSpPr>
+                  <p:cNvPr id="18" name="直線コネクタ 17"/>
+                  <p:cNvCxnSpPr/>
+                  <p:nvPr/>
+                </p:nvCxnSpPr>
+                <p:spPr>
+                  <a:xfrm>
+                    <a:off x="3730752" y="4707581"/>
+                    <a:ext cx="4773168" cy="0"/>
+                  </a:xfrm>
+                  <a:prstGeom prst="line">
+                    <a:avLst/>
+                  </a:prstGeom>
+                  <a:ln w="38100">
+                    <a:solidFill>
+                      <a:schemeClr val="tx1"/>
+                    </a:solidFill>
+                  </a:ln>
+                </p:spPr>
+                <p:style>
+                  <a:lnRef idx="1">
+                    <a:schemeClr val="accent1"/>
+                  </a:lnRef>
+                  <a:fillRef idx="0">
+                    <a:schemeClr val="accent1"/>
+                  </a:fillRef>
+                  <a:effectRef idx="0">
+                    <a:schemeClr val="accent1"/>
+                  </a:effectRef>
+                  <a:fontRef idx="minor">
+                    <a:schemeClr val="tx1"/>
+                  </a:fontRef>
+                </p:style>
+              </p:cxnSp>
+              <p:cxnSp>
+                <p:nvCxnSpPr>
+                  <p:cNvPr id="19" name="直線コネクタ 18"/>
+                  <p:cNvCxnSpPr/>
+                  <p:nvPr/>
+                </p:nvCxnSpPr>
+                <p:spPr>
+                  <a:xfrm>
+                    <a:off x="3730752" y="5079437"/>
+                    <a:ext cx="4773168" cy="0"/>
+                  </a:xfrm>
+                  <a:prstGeom prst="line">
+                    <a:avLst/>
+                  </a:prstGeom>
+                  <a:ln w="38100">
+                    <a:solidFill>
+                      <a:schemeClr val="tx1"/>
+                    </a:solidFill>
+                  </a:ln>
+                </p:spPr>
+                <p:style>
+                  <a:lnRef idx="1">
+                    <a:schemeClr val="accent1"/>
+                  </a:lnRef>
+                  <a:fillRef idx="0">
+                    <a:schemeClr val="accent1"/>
+                  </a:fillRef>
+                  <a:effectRef idx="0">
+                    <a:schemeClr val="accent1"/>
+                  </a:effectRef>
+                  <a:fontRef idx="minor">
+                    <a:schemeClr val="tx1"/>
+                  </a:fontRef>
+                </p:style>
+              </p:cxnSp>
+              <p:cxnSp>
+                <p:nvCxnSpPr>
+                  <p:cNvPr id="20" name="直線コネクタ 19"/>
+                  <p:cNvCxnSpPr/>
+                  <p:nvPr/>
+                </p:nvCxnSpPr>
+                <p:spPr>
+                  <a:xfrm>
+                    <a:off x="3730752" y="5493318"/>
+                    <a:ext cx="4773168" cy="0"/>
+                  </a:xfrm>
+                  <a:prstGeom prst="line">
+                    <a:avLst/>
+                  </a:prstGeom>
+                  <a:ln w="38100">
+                    <a:solidFill>
+                      <a:schemeClr val="tx1"/>
+                    </a:solidFill>
+                  </a:ln>
+                </p:spPr>
+                <p:style>
+                  <a:lnRef idx="1">
+                    <a:schemeClr val="accent1"/>
+                  </a:lnRef>
+                  <a:fillRef idx="0">
+                    <a:schemeClr val="accent1"/>
+                  </a:fillRef>
+                  <a:effectRef idx="0">
+                    <a:schemeClr val="accent1"/>
+                  </a:effectRef>
+                  <a:fontRef idx="minor">
+                    <a:schemeClr val="tx1"/>
+                  </a:fontRef>
+                </p:style>
+              </p:cxnSp>
+              <p:cxnSp>
+                <p:nvCxnSpPr>
+                  <p:cNvPr id="21" name="直線コネクタ 20"/>
+                  <p:cNvCxnSpPr/>
+                  <p:nvPr/>
+                </p:nvCxnSpPr>
+                <p:spPr>
+                  <a:xfrm>
+                    <a:off x="3730752" y="5920038"/>
+                    <a:ext cx="4773168" cy="0"/>
+                  </a:xfrm>
+                  <a:prstGeom prst="line">
+                    <a:avLst/>
+                  </a:prstGeom>
+                  <a:ln w="38100">
+                    <a:solidFill>
+                      <a:schemeClr val="tx1"/>
+                    </a:solidFill>
+                  </a:ln>
+                </p:spPr>
+                <p:style>
+                  <a:lnRef idx="1">
+                    <a:schemeClr val="accent1"/>
+                  </a:lnRef>
+                  <a:fillRef idx="0">
+                    <a:schemeClr val="accent1"/>
+                  </a:fillRef>
+                  <a:effectRef idx="0">
+                    <a:schemeClr val="accent1"/>
+                  </a:effectRef>
+                  <a:fontRef idx="minor">
+                    <a:schemeClr val="tx1"/>
+                  </a:fontRef>
+                </p:style>
+              </p:cxnSp>
+              <p:cxnSp>
+                <p:nvCxnSpPr>
+                  <p:cNvPr id="22" name="直線コネクタ 21"/>
+                  <p:cNvCxnSpPr/>
+                  <p:nvPr/>
+                </p:nvCxnSpPr>
+                <p:spPr>
+                  <a:xfrm>
+                    <a:off x="3730752" y="6291894"/>
+                    <a:ext cx="4773168" cy="0"/>
+                  </a:xfrm>
+                  <a:prstGeom prst="line">
+                    <a:avLst/>
+                  </a:prstGeom>
+                  <a:ln w="38100">
+                    <a:solidFill>
+                      <a:schemeClr val="tx1"/>
+                    </a:solidFill>
+                  </a:ln>
+                </p:spPr>
+                <p:style>
+                  <a:lnRef idx="1">
+                    <a:schemeClr val="accent1"/>
+                  </a:lnRef>
+                  <a:fillRef idx="0">
+                    <a:schemeClr val="accent1"/>
+                  </a:fillRef>
+                  <a:effectRef idx="0">
+                    <a:schemeClr val="accent1"/>
+                  </a:effectRef>
+                  <a:fontRef idx="minor">
+                    <a:schemeClr val="tx1"/>
+                  </a:fontRef>
+                </p:style>
+              </p:cxnSp>
+              <p:pic>
+                <p:nvPicPr>
+                  <p:cNvPr id="4" name="図 3"/>
+                  <p:cNvPicPr>
+                    <a:picLocks noChangeAspect="1"/>
+                  </p:cNvPicPr>
+                  <p:nvPr/>
+                </p:nvPicPr>
+                <p:blipFill rotWithShape="1">
+                  <a:blip r:embed="rId2">
+                    <a:extLst>
+                      <a:ext uri="{28A0092B-C50C-407E-A947-70E740481C1C}">
+                        <a14:useLocalDpi xmlns:a14="http://schemas.microsoft.com/office/drawing/2010/main" val="0"/>
+                      </a:ext>
+                    </a:extLst>
+                  </a:blip>
+                  <a:srcRect l="4412" t="2626" r="4860" b="2362"/>
+                  <a:stretch/>
+                </p:blipFill>
+                <p:spPr>
+                  <a:xfrm>
+                    <a:off x="4428000" y="180000"/>
+                    <a:ext cx="3312000" cy="6516000"/>
+                  </a:xfrm>
+                  <a:prstGeom prst="rect">
+                    <a:avLst/>
+                  </a:prstGeom>
+                </p:spPr>
+              </p:pic>
+              <p:sp>
+                <p:nvSpPr>
+                  <p:cNvPr id="26" name="テキスト ボックス 25"/>
+                  <p:cNvSpPr txBox="1"/>
+                  <p:nvPr/>
+                </p:nvSpPr>
+                <p:spPr>
+                  <a:xfrm>
+                    <a:off x="8503920" y="2192167"/>
+                    <a:ext cx="1420421" cy="307777"/>
+                  </a:xfrm>
+                  <a:prstGeom prst="rect">
+                    <a:avLst/>
+                  </a:prstGeom>
+                  <a:ln>
+                    <a:solidFill>
+                      <a:schemeClr val="bg1"/>
+                    </a:solidFill>
+                  </a:ln>
+                </p:spPr>
+                <p:style>
+                  <a:lnRef idx="2">
+                    <a:schemeClr val="accent1">
+                      <a:shade val="50000"/>
+                    </a:schemeClr>
+                  </a:lnRef>
+                  <a:fillRef idx="1">
+                    <a:schemeClr val="accent1"/>
+                  </a:fillRef>
+                  <a:effectRef idx="0">
+                    <a:schemeClr val="accent1"/>
+                  </a:effectRef>
+                  <a:fontRef idx="minor">
+                    <a:schemeClr val="lt1"/>
+                  </a:fontRef>
+                </p:style>
+                <p:txBody>
+                  <a:bodyPr wrap="square" rtlCol="0">
+                    <a:spAutoFit/>
+                  </a:bodyPr>
+                  <a:lstStyle/>
+                  <a:p>
+                    <a:pPr algn="ctr"/>
+                    <a:r>
+                      <a:rPr kumimoji="1" lang="en-US" altLang="ja-JP" sz="1400" dirty="0" smtClean="0"/>
+                      <a:t>SDA0 (2-800KHz)</a:t>
+                    </a:r>
+                    <a:endParaRPr kumimoji="1" lang="ja-JP" altLang="en-US" sz="1400" dirty="0"/>
+                  </a:p>
+                </p:txBody>
+              </p:sp>
+              <p:sp>
+                <p:nvSpPr>
+                  <p:cNvPr id="27" name="テキスト ボックス 26"/>
+                  <p:cNvSpPr txBox="1"/>
+                  <p:nvPr/>
+                </p:nvSpPr>
+                <p:spPr>
+                  <a:xfrm>
+                    <a:off x="8503920" y="2609734"/>
+                    <a:ext cx="1420421" cy="307777"/>
+                  </a:xfrm>
+                  <a:prstGeom prst="rect">
+                    <a:avLst/>
+                  </a:prstGeom>
+                  <a:ln>
+                    <a:solidFill>
+                      <a:schemeClr val="bg1"/>
+                    </a:solidFill>
+                  </a:ln>
+                </p:spPr>
+                <p:style>
+                  <a:lnRef idx="2">
+                    <a:schemeClr val="accent1">
+                      <a:shade val="50000"/>
+                    </a:schemeClr>
+                  </a:lnRef>
+                  <a:fillRef idx="1">
+                    <a:schemeClr val="accent1"/>
+                  </a:fillRef>
+                  <a:effectRef idx="0">
+                    <a:schemeClr val="accent1"/>
+                  </a:effectRef>
+                  <a:fontRef idx="minor">
+                    <a:schemeClr val="lt1"/>
+                  </a:fontRef>
+                </p:style>
+                <p:txBody>
+                  <a:bodyPr wrap="square" rtlCol="0">
+                    <a:spAutoFit/>
+                  </a:bodyPr>
+                  <a:lstStyle/>
+                  <a:p>
+                    <a:pPr algn="ctr"/>
+                    <a:r>
+                      <a:rPr kumimoji="1" lang="en-US" altLang="ja-JP" sz="1400" dirty="0" smtClean="0"/>
+                      <a:t>SCL0 (2-800KHz)</a:t>
+                    </a:r>
+                    <a:endParaRPr kumimoji="1" lang="ja-JP" altLang="en-US" sz="1400" dirty="0"/>
+                  </a:p>
+                </p:txBody>
+              </p:sp>
+              <p:sp>
+                <p:nvSpPr>
+                  <p:cNvPr id="28" name="テキスト ボックス 27"/>
+                  <p:cNvSpPr txBox="1"/>
+                  <p:nvPr/>
+                </p:nvSpPr>
+                <p:spPr>
+                  <a:xfrm rot="16200000">
+                    <a:off x="9720125" y="2396383"/>
+                    <a:ext cx="716209" cy="307777"/>
+                  </a:xfrm>
+                  <a:prstGeom prst="rect">
+                    <a:avLst/>
+                  </a:prstGeom>
+                  <a:ln>
+                    <a:solidFill>
+                      <a:schemeClr val="bg1"/>
+                    </a:solidFill>
+                  </a:ln>
+                </p:spPr>
+                <p:style>
+                  <a:lnRef idx="2">
+                    <a:schemeClr val="accent1">
+                      <a:shade val="50000"/>
+                    </a:schemeClr>
+                  </a:lnRef>
+                  <a:fillRef idx="1">
+                    <a:schemeClr val="accent1"/>
+                  </a:fillRef>
+                  <a:effectRef idx="0">
+                    <a:schemeClr val="accent1"/>
+                  </a:effectRef>
+                  <a:fontRef idx="minor">
+                    <a:schemeClr val="lt1"/>
+                  </a:fontRef>
+                </p:style>
+                <p:txBody>
+                  <a:bodyPr wrap="square" rtlCol="0">
+                    <a:spAutoFit/>
+                  </a:bodyPr>
+                  <a:lstStyle/>
+                  <a:p>
+                    <a:pPr algn="ctr"/>
+                    <a:r>
+                      <a:rPr kumimoji="1" lang="en-US" altLang="ja-JP" sz="1400" dirty="0" smtClean="0"/>
+                      <a:t>I2C0</a:t>
+                    </a:r>
+                  </a:p>
+                </p:txBody>
+              </p:sp>
+              <p:sp>
+                <p:nvSpPr>
+                  <p:cNvPr id="36" name="テキスト ボックス 35"/>
+                  <p:cNvSpPr txBox="1"/>
+                  <p:nvPr/>
+                </p:nvSpPr>
+                <p:spPr>
+                  <a:xfrm>
+                    <a:off x="2353052" y="1404895"/>
+                    <a:ext cx="1377696" cy="307777"/>
+                  </a:xfrm>
+                  <a:prstGeom prst="rect">
+                    <a:avLst/>
+                  </a:prstGeom>
+                  <a:ln>
+                    <a:solidFill>
+                      <a:schemeClr val="bg1"/>
+                    </a:solidFill>
+                  </a:ln>
+                </p:spPr>
+                <p:style>
+                  <a:lnRef idx="2">
+                    <a:schemeClr val="accent6">
+                      <a:shade val="50000"/>
+                    </a:schemeClr>
+                  </a:lnRef>
+                  <a:fillRef idx="1">
+                    <a:schemeClr val="accent6"/>
+                  </a:fillRef>
+                  <a:effectRef idx="0">
+                    <a:schemeClr val="accent6"/>
+                  </a:effectRef>
+                  <a:fontRef idx="minor">
+                    <a:schemeClr val="lt1"/>
+                  </a:fontRef>
+                </p:style>
+                <p:txBody>
+                  <a:bodyPr wrap="square" rtlCol="0">
+                    <a:spAutoFit/>
+                  </a:bodyPr>
+                  <a:lstStyle/>
+                  <a:p>
+                    <a:pPr algn="ctr"/>
+                    <a:r>
+                      <a:rPr kumimoji="1" lang="en-US" altLang="ja-JP" sz="1400" dirty="0" smtClean="0"/>
+                      <a:t>CS</a:t>
+                    </a:r>
+                    <a:endParaRPr kumimoji="1" lang="ja-JP" altLang="en-US" sz="1400" dirty="0"/>
+                  </a:p>
+                </p:txBody>
+              </p:sp>
+              <p:sp>
+                <p:nvSpPr>
+                  <p:cNvPr id="37" name="テキスト ボックス 36"/>
+                  <p:cNvSpPr txBox="1"/>
+                  <p:nvPr/>
+                </p:nvSpPr>
+                <p:spPr>
+                  <a:xfrm>
+                    <a:off x="2353056" y="1796215"/>
+                    <a:ext cx="1377696" cy="307777"/>
+                  </a:xfrm>
+                  <a:prstGeom prst="rect">
+                    <a:avLst/>
+                  </a:prstGeom>
+                  <a:ln>
+                    <a:solidFill>
+                      <a:schemeClr val="bg1"/>
+                    </a:solidFill>
+                  </a:ln>
+                </p:spPr>
+                <p:style>
+                  <a:lnRef idx="2">
+                    <a:schemeClr val="accent6">
+                      <a:shade val="50000"/>
+                    </a:schemeClr>
+                  </a:lnRef>
+                  <a:fillRef idx="1">
+                    <a:schemeClr val="accent6"/>
+                  </a:fillRef>
+                  <a:effectRef idx="0">
+                    <a:schemeClr val="accent6"/>
+                  </a:effectRef>
+                  <a:fontRef idx="minor">
+                    <a:schemeClr val="lt1"/>
+                  </a:fontRef>
+                </p:style>
+                <p:txBody>
+                  <a:bodyPr wrap="square" rtlCol="0">
+                    <a:spAutoFit/>
+                  </a:bodyPr>
+                  <a:lstStyle/>
+                  <a:p>
+                    <a:pPr algn="ctr"/>
+                    <a:r>
+                      <a:rPr kumimoji="1" lang="en-US" altLang="ja-JP" sz="1400" dirty="0" smtClean="0"/>
+                      <a:t>MISO</a:t>
+                    </a:r>
+                    <a:endParaRPr kumimoji="1" lang="ja-JP" altLang="en-US" sz="1400" dirty="0"/>
+                  </a:p>
+                </p:txBody>
+              </p:sp>
+              <p:sp>
+                <p:nvSpPr>
+                  <p:cNvPr id="38" name="テキスト ボックス 37"/>
+                  <p:cNvSpPr txBox="1"/>
+                  <p:nvPr/>
+                </p:nvSpPr>
+                <p:spPr>
+                  <a:xfrm>
+                    <a:off x="2353056" y="2192336"/>
+                    <a:ext cx="1377696" cy="307777"/>
+                  </a:xfrm>
+                  <a:prstGeom prst="rect">
+                    <a:avLst/>
+                  </a:prstGeom>
+                  <a:ln>
+                    <a:solidFill>
+                      <a:schemeClr val="bg1"/>
+                    </a:solidFill>
+                  </a:ln>
+                </p:spPr>
+                <p:style>
+                  <a:lnRef idx="2">
+                    <a:schemeClr val="accent6">
+                      <a:shade val="50000"/>
+                    </a:schemeClr>
+                  </a:lnRef>
+                  <a:fillRef idx="1">
+                    <a:schemeClr val="accent6"/>
+                  </a:fillRef>
+                  <a:effectRef idx="0">
+                    <a:schemeClr val="accent6"/>
+                  </a:effectRef>
+                  <a:fontRef idx="minor">
+                    <a:schemeClr val="lt1"/>
+                  </a:fontRef>
+                </p:style>
+                <p:txBody>
+                  <a:bodyPr wrap="square" rtlCol="0">
+                    <a:spAutoFit/>
+                  </a:bodyPr>
+                  <a:lstStyle/>
+                  <a:p>
+                    <a:pPr algn="ctr"/>
+                    <a:r>
+                      <a:rPr lang="en-US" altLang="ja-JP" sz="1400" dirty="0" smtClean="0"/>
+                      <a:t>MOSI</a:t>
+                    </a:r>
+                    <a:endParaRPr kumimoji="1" lang="ja-JP" altLang="en-US" sz="1400" dirty="0"/>
+                  </a:p>
+                </p:txBody>
+              </p:sp>
+              <p:sp>
+                <p:nvSpPr>
+                  <p:cNvPr id="39" name="テキスト ボックス 38"/>
+                  <p:cNvSpPr txBox="1"/>
+                  <p:nvPr/>
+                </p:nvSpPr>
+                <p:spPr>
+                  <a:xfrm>
+                    <a:off x="2353056" y="2600599"/>
+                    <a:ext cx="1377696" cy="307777"/>
+                  </a:xfrm>
+                  <a:prstGeom prst="rect">
+                    <a:avLst/>
+                  </a:prstGeom>
+                  <a:ln>
+                    <a:solidFill>
+                      <a:schemeClr val="bg1"/>
+                    </a:solidFill>
+                  </a:ln>
+                </p:spPr>
+                <p:style>
+                  <a:lnRef idx="2">
+                    <a:schemeClr val="accent6">
+                      <a:shade val="50000"/>
+                    </a:schemeClr>
+                  </a:lnRef>
+                  <a:fillRef idx="1">
+                    <a:schemeClr val="accent6"/>
+                  </a:fillRef>
+                  <a:effectRef idx="0">
+                    <a:schemeClr val="accent6"/>
+                  </a:effectRef>
+                  <a:fontRef idx="minor">
+                    <a:schemeClr val="lt1"/>
+                  </a:fontRef>
+                </p:style>
+                <p:txBody>
+                  <a:bodyPr wrap="square" rtlCol="0">
+                    <a:spAutoFit/>
+                  </a:bodyPr>
+                  <a:lstStyle/>
+                  <a:p>
+                    <a:pPr algn="ctr"/>
+                    <a:r>
+                      <a:rPr lang="en-US" altLang="ja-JP" sz="1400" dirty="0" smtClean="0"/>
+                      <a:t>SCK</a:t>
+                    </a:r>
+                    <a:endParaRPr kumimoji="1" lang="ja-JP" altLang="en-US" sz="1400" dirty="0"/>
+                  </a:p>
+                </p:txBody>
+              </p:sp>
+              <p:sp>
+                <p:nvSpPr>
+                  <p:cNvPr id="40" name="テキスト ボックス 39"/>
+                  <p:cNvSpPr txBox="1"/>
+                  <p:nvPr/>
+                </p:nvSpPr>
+                <p:spPr>
+                  <a:xfrm rot="5400000">
+                    <a:off x="1447981" y="2002193"/>
+                    <a:ext cx="1502372" cy="307777"/>
+                  </a:xfrm>
+                  <a:prstGeom prst="rect">
+                    <a:avLst/>
+                  </a:prstGeom>
+                  <a:ln>
+                    <a:solidFill>
+                      <a:schemeClr val="bg1"/>
+                    </a:solidFill>
+                  </a:ln>
+                </p:spPr>
+                <p:style>
+                  <a:lnRef idx="2">
+                    <a:schemeClr val="accent6">
+                      <a:shade val="50000"/>
+                    </a:schemeClr>
+                  </a:lnRef>
+                  <a:fillRef idx="1">
+                    <a:schemeClr val="accent6"/>
+                  </a:fillRef>
+                  <a:effectRef idx="0">
+                    <a:schemeClr val="accent6"/>
+                  </a:effectRef>
+                  <a:fontRef idx="minor">
+                    <a:schemeClr val="lt1"/>
+                  </a:fontRef>
+                </p:style>
+                <p:txBody>
+                  <a:bodyPr wrap="square" rtlCol="0">
+                    <a:spAutoFit/>
+                  </a:bodyPr>
+                  <a:lstStyle/>
+                  <a:p>
+                    <a:pPr algn="ctr"/>
+                    <a:r>
+                      <a:rPr kumimoji="1" lang="en-US" altLang="ja-JP" sz="1400" dirty="0" smtClean="0"/>
+                      <a:t>SPI(1/2/4/8MHz)</a:t>
+                    </a:r>
+                    <a:endParaRPr kumimoji="1" lang="ja-JP" altLang="en-US" sz="1400" dirty="0"/>
+                  </a:p>
+                </p:txBody>
+              </p:sp>
+              <p:sp>
+                <p:nvSpPr>
+                  <p:cNvPr id="42" name="テキスト ボックス 41"/>
+                  <p:cNvSpPr txBox="1"/>
+                  <p:nvPr/>
+                </p:nvSpPr>
+                <p:spPr>
+                  <a:xfrm>
+                    <a:off x="2353052" y="2989832"/>
+                    <a:ext cx="1377696" cy="307777"/>
+                  </a:xfrm>
+                  <a:prstGeom prst="rect">
+                    <a:avLst/>
+                  </a:prstGeom>
+                  <a:ln>
+                    <a:solidFill>
+                      <a:schemeClr val="bg1"/>
+                    </a:solidFill>
+                  </a:ln>
+                </p:spPr>
+                <p:style>
+                  <a:lnRef idx="1">
+                    <a:schemeClr val="accent4"/>
+                  </a:lnRef>
+                  <a:fillRef idx="2">
+                    <a:schemeClr val="accent4"/>
+                  </a:fillRef>
+                  <a:effectRef idx="1">
+                    <a:schemeClr val="accent4"/>
+                  </a:effectRef>
+                  <a:fontRef idx="minor">
+                    <a:schemeClr val="dk1"/>
+                  </a:fontRef>
+                </p:style>
+                <p:txBody>
+                  <a:bodyPr wrap="square" rtlCol="0">
+                    <a:spAutoFit/>
+                  </a:bodyPr>
+                  <a:lstStyle/>
+                  <a:p>
+                    <a:pPr algn="ctr"/>
+                    <a:r>
+                      <a:rPr kumimoji="1" lang="en-US" altLang="ja-JP" sz="1400" dirty="0" smtClean="0"/>
+                      <a:t>GPIO 00</a:t>
+                    </a:r>
+                    <a:endParaRPr kumimoji="1" lang="ja-JP" altLang="en-US" sz="1400" dirty="0"/>
+                  </a:p>
+                </p:txBody>
+              </p:sp>
+              <p:sp>
+                <p:nvSpPr>
+                  <p:cNvPr id="43" name="テキスト ボックス 42"/>
+                  <p:cNvSpPr txBox="1"/>
+                  <p:nvPr/>
+                </p:nvSpPr>
+                <p:spPr>
+                  <a:xfrm>
+                    <a:off x="2353052" y="3388292"/>
+                    <a:ext cx="1377696" cy="307777"/>
+                  </a:xfrm>
+                  <a:prstGeom prst="rect">
+                    <a:avLst/>
+                  </a:prstGeom>
+                  <a:ln>
+                    <a:solidFill>
+                      <a:schemeClr val="bg1"/>
+                    </a:solidFill>
+                  </a:ln>
+                </p:spPr>
+                <p:style>
+                  <a:lnRef idx="1">
+                    <a:schemeClr val="accent4"/>
+                  </a:lnRef>
+                  <a:fillRef idx="2">
+                    <a:schemeClr val="accent4"/>
+                  </a:fillRef>
+                  <a:effectRef idx="1">
+                    <a:schemeClr val="accent4"/>
+                  </a:effectRef>
+                  <a:fontRef idx="minor">
+                    <a:schemeClr val="dk1"/>
+                  </a:fontRef>
+                </p:style>
+                <p:txBody>
+                  <a:bodyPr wrap="square" rtlCol="0">
+                    <a:spAutoFit/>
+                  </a:bodyPr>
+                  <a:lstStyle/>
+                  <a:p>
+                    <a:pPr algn="ctr"/>
+                    <a:r>
+                      <a:rPr kumimoji="1" lang="en-US" altLang="ja-JP" sz="1400" dirty="0" smtClean="0"/>
+                      <a:t>GPIO 01</a:t>
+                    </a:r>
+                    <a:endParaRPr kumimoji="1" lang="ja-JP" altLang="en-US" sz="1400" dirty="0"/>
+                  </a:p>
+                </p:txBody>
+              </p:sp>
+              <p:sp>
+                <p:nvSpPr>
+                  <p:cNvPr id="44" name="テキスト ボックス 43"/>
+                  <p:cNvSpPr txBox="1"/>
+                  <p:nvPr/>
+                </p:nvSpPr>
+                <p:spPr>
+                  <a:xfrm>
+                    <a:off x="2353052" y="3774056"/>
+                    <a:ext cx="1377696" cy="307777"/>
+                  </a:xfrm>
+                  <a:prstGeom prst="rect">
+                    <a:avLst/>
+                  </a:prstGeom>
+                  <a:ln>
+                    <a:solidFill>
+                      <a:schemeClr val="bg1"/>
+                    </a:solidFill>
+                  </a:ln>
+                </p:spPr>
+                <p:style>
+                  <a:lnRef idx="1">
+                    <a:schemeClr val="accent4"/>
+                  </a:lnRef>
+                  <a:fillRef idx="2">
+                    <a:schemeClr val="accent4"/>
+                  </a:fillRef>
+                  <a:effectRef idx="1">
+                    <a:schemeClr val="accent4"/>
+                  </a:effectRef>
+                  <a:fontRef idx="minor">
+                    <a:schemeClr val="dk1"/>
+                  </a:fontRef>
+                </p:style>
+                <p:txBody>
+                  <a:bodyPr wrap="square" rtlCol="0">
+                    <a:spAutoFit/>
+                  </a:bodyPr>
+                  <a:lstStyle/>
+                  <a:p>
+                    <a:pPr algn="ctr"/>
+                    <a:r>
+                      <a:rPr kumimoji="1" lang="en-US" altLang="ja-JP" sz="1400" dirty="0" smtClean="0"/>
+                      <a:t>GPIO 02</a:t>
+                    </a:r>
+                    <a:endParaRPr kumimoji="1" lang="ja-JP" altLang="en-US" sz="1400" dirty="0"/>
+                  </a:p>
+                </p:txBody>
+              </p:sp>
+              <p:sp>
+                <p:nvSpPr>
+                  <p:cNvPr id="45" name="テキスト ボックス 44"/>
+                  <p:cNvSpPr txBox="1"/>
+                  <p:nvPr/>
+                </p:nvSpPr>
+                <p:spPr>
+                  <a:xfrm>
+                    <a:off x="2353052" y="4167355"/>
+                    <a:ext cx="1377696" cy="307777"/>
+                  </a:xfrm>
+                  <a:prstGeom prst="rect">
+                    <a:avLst/>
+                  </a:prstGeom>
+                  <a:ln>
+                    <a:solidFill>
+                      <a:schemeClr val="bg1"/>
+                    </a:solidFill>
+                  </a:ln>
+                </p:spPr>
+                <p:style>
+                  <a:lnRef idx="1">
+                    <a:schemeClr val="accent4"/>
+                  </a:lnRef>
+                  <a:fillRef idx="2">
+                    <a:schemeClr val="accent4"/>
+                  </a:fillRef>
+                  <a:effectRef idx="1">
+                    <a:schemeClr val="accent4"/>
+                  </a:effectRef>
+                  <a:fontRef idx="minor">
+                    <a:schemeClr val="dk1"/>
+                  </a:fontRef>
+                </p:style>
+                <p:txBody>
+                  <a:bodyPr wrap="square" rtlCol="0">
+                    <a:spAutoFit/>
+                  </a:bodyPr>
+                  <a:lstStyle/>
+                  <a:p>
+                    <a:pPr algn="ctr"/>
+                    <a:r>
+                      <a:rPr kumimoji="1" lang="en-US" altLang="ja-JP" sz="1400" dirty="0" smtClean="0"/>
+                      <a:t>GPIO 03</a:t>
+                    </a:r>
+                    <a:endParaRPr kumimoji="1" lang="ja-JP" altLang="en-US" sz="1400" dirty="0"/>
+                  </a:p>
+                </p:txBody>
+              </p:sp>
+              <p:sp>
+                <p:nvSpPr>
+                  <p:cNvPr id="46" name="テキスト ボックス 45"/>
+                  <p:cNvSpPr txBox="1"/>
+                  <p:nvPr/>
+                </p:nvSpPr>
+                <p:spPr>
+                  <a:xfrm>
+                    <a:off x="2353052" y="4562317"/>
+                    <a:ext cx="1377696" cy="307777"/>
+                  </a:xfrm>
+                  <a:prstGeom prst="rect">
+                    <a:avLst/>
+                  </a:prstGeom>
+                  <a:ln>
+                    <a:solidFill>
+                      <a:schemeClr val="bg1"/>
+                    </a:solidFill>
+                  </a:ln>
+                </p:spPr>
+                <p:style>
+                  <a:lnRef idx="1">
+                    <a:schemeClr val="accent4"/>
+                  </a:lnRef>
+                  <a:fillRef idx="2">
+                    <a:schemeClr val="accent4"/>
+                  </a:fillRef>
+                  <a:effectRef idx="1">
+                    <a:schemeClr val="accent4"/>
+                  </a:effectRef>
+                  <a:fontRef idx="minor">
+                    <a:schemeClr val="dk1"/>
+                  </a:fontRef>
+                </p:style>
+                <p:txBody>
+                  <a:bodyPr wrap="square" rtlCol="0">
+                    <a:spAutoFit/>
+                  </a:bodyPr>
+                  <a:lstStyle/>
+                  <a:p>
+                    <a:pPr algn="ctr"/>
+                    <a:r>
+                      <a:rPr kumimoji="1" lang="en-US" altLang="ja-JP" sz="1400" dirty="0" smtClean="0"/>
+                      <a:t>GPIO 04</a:t>
+                    </a:r>
+                    <a:endParaRPr kumimoji="1" lang="ja-JP" altLang="en-US" sz="1400" dirty="0"/>
+                  </a:p>
+                </p:txBody>
+              </p:sp>
+              <p:sp>
+                <p:nvSpPr>
+                  <p:cNvPr id="47" name="テキスト ボックス 46"/>
+                  <p:cNvSpPr txBox="1"/>
+                  <p:nvPr/>
+                </p:nvSpPr>
+                <p:spPr>
+                  <a:xfrm>
+                    <a:off x="2353052" y="4965521"/>
+                    <a:ext cx="1377696" cy="307777"/>
+                  </a:xfrm>
+                  <a:prstGeom prst="rect">
+                    <a:avLst/>
+                  </a:prstGeom>
+                  <a:ln>
+                    <a:solidFill>
+                      <a:schemeClr val="bg1"/>
+                    </a:solidFill>
+                  </a:ln>
+                </p:spPr>
+                <p:style>
+                  <a:lnRef idx="1">
+                    <a:schemeClr val="accent4"/>
+                  </a:lnRef>
+                  <a:fillRef idx="2">
+                    <a:schemeClr val="accent4"/>
+                  </a:fillRef>
+                  <a:effectRef idx="1">
+                    <a:schemeClr val="accent4"/>
+                  </a:effectRef>
+                  <a:fontRef idx="minor">
+                    <a:schemeClr val="dk1"/>
+                  </a:fontRef>
+                </p:style>
+                <p:txBody>
+                  <a:bodyPr wrap="square" rtlCol="0">
+                    <a:spAutoFit/>
+                  </a:bodyPr>
+                  <a:lstStyle/>
+                  <a:p>
+                    <a:pPr algn="ctr"/>
+                    <a:r>
+                      <a:rPr kumimoji="1" lang="en-US" altLang="ja-JP" sz="1400" dirty="0" smtClean="0"/>
+                      <a:t>GPIO 05</a:t>
+                    </a:r>
+                    <a:endParaRPr kumimoji="1" lang="ja-JP" altLang="en-US" sz="1400" dirty="0"/>
+                  </a:p>
+                </p:txBody>
+              </p:sp>
+              <p:sp>
+                <p:nvSpPr>
+                  <p:cNvPr id="48" name="テキスト ボックス 47"/>
+                  <p:cNvSpPr txBox="1"/>
+                  <p:nvPr/>
+                </p:nvSpPr>
+                <p:spPr>
+                  <a:xfrm>
+                    <a:off x="2353052" y="5367374"/>
+                    <a:ext cx="1377696" cy="307777"/>
+                  </a:xfrm>
+                  <a:prstGeom prst="rect">
+                    <a:avLst/>
+                  </a:prstGeom>
+                  <a:ln>
+                    <a:solidFill>
+                      <a:schemeClr val="bg1"/>
+                    </a:solidFill>
+                  </a:ln>
+                </p:spPr>
+                <p:style>
+                  <a:lnRef idx="1">
+                    <a:schemeClr val="accent4"/>
+                  </a:lnRef>
+                  <a:fillRef idx="2">
+                    <a:schemeClr val="accent4"/>
+                  </a:fillRef>
+                  <a:effectRef idx="1">
+                    <a:schemeClr val="accent4"/>
+                  </a:effectRef>
+                  <a:fontRef idx="minor">
+                    <a:schemeClr val="dk1"/>
+                  </a:fontRef>
+                </p:style>
+                <p:txBody>
+                  <a:bodyPr wrap="square" rtlCol="0">
+                    <a:spAutoFit/>
+                  </a:bodyPr>
+                  <a:lstStyle/>
+                  <a:p>
+                    <a:pPr algn="ctr"/>
+                    <a:r>
+                      <a:rPr kumimoji="1" lang="en-US" altLang="ja-JP" sz="1400" dirty="0" smtClean="0"/>
+                      <a:t>GPIO 06</a:t>
+                    </a:r>
+                    <a:endParaRPr kumimoji="1" lang="ja-JP" altLang="en-US" sz="1400" dirty="0"/>
+                  </a:p>
+                </p:txBody>
+              </p:sp>
+              <p:sp>
+                <p:nvSpPr>
+                  <p:cNvPr id="49" name="テキスト ボックス 48"/>
+                  <p:cNvSpPr txBox="1"/>
+                  <p:nvPr/>
+                </p:nvSpPr>
+                <p:spPr>
+                  <a:xfrm>
+                    <a:off x="2353052" y="5759116"/>
+                    <a:ext cx="1377696" cy="307777"/>
+                  </a:xfrm>
+                  <a:prstGeom prst="rect">
+                    <a:avLst/>
+                  </a:prstGeom>
+                  <a:ln>
+                    <a:solidFill>
+                      <a:schemeClr val="bg1"/>
+                    </a:solidFill>
+                  </a:ln>
+                </p:spPr>
+                <p:style>
+                  <a:lnRef idx="1">
+                    <a:schemeClr val="accent4"/>
+                  </a:lnRef>
+                  <a:fillRef idx="2">
+                    <a:schemeClr val="accent4"/>
+                  </a:fillRef>
+                  <a:effectRef idx="1">
+                    <a:schemeClr val="accent4"/>
+                  </a:effectRef>
+                  <a:fontRef idx="minor">
+                    <a:schemeClr val="dk1"/>
+                  </a:fontRef>
+                </p:style>
+                <p:txBody>
+                  <a:bodyPr wrap="square" rtlCol="0">
+                    <a:spAutoFit/>
+                  </a:bodyPr>
+                  <a:lstStyle/>
+                  <a:p>
+                    <a:pPr algn="ctr"/>
+                    <a:r>
+                      <a:rPr kumimoji="1" lang="en-US" altLang="ja-JP" sz="1400" dirty="0" smtClean="0"/>
+                      <a:t>GPIO 07</a:t>
+                    </a:r>
+                    <a:endParaRPr kumimoji="1" lang="ja-JP" altLang="en-US" sz="1400" dirty="0"/>
+                  </a:p>
+                </p:txBody>
+              </p:sp>
+              <p:sp>
+                <p:nvSpPr>
+                  <p:cNvPr id="50" name="テキスト ボックス 49"/>
+                  <p:cNvSpPr txBox="1"/>
+                  <p:nvPr/>
+                </p:nvSpPr>
+                <p:spPr>
+                  <a:xfrm rot="5400000">
+                    <a:off x="660634" y="4379933"/>
+                    <a:ext cx="3077059" cy="307777"/>
+                  </a:xfrm>
+                  <a:prstGeom prst="rect">
+                    <a:avLst/>
+                  </a:prstGeom>
+                  <a:ln>
+                    <a:solidFill>
+                      <a:schemeClr val="bg1"/>
+                    </a:solidFill>
+                  </a:ln>
+                </p:spPr>
+                <p:style>
+                  <a:lnRef idx="1">
+                    <a:schemeClr val="accent4"/>
+                  </a:lnRef>
+                  <a:fillRef idx="2">
+                    <a:schemeClr val="accent4"/>
+                  </a:fillRef>
+                  <a:effectRef idx="1">
+                    <a:schemeClr val="accent4"/>
+                  </a:effectRef>
+                  <a:fontRef idx="minor">
+                    <a:schemeClr val="dk1"/>
+                  </a:fontRef>
+                </p:style>
+                <p:txBody>
+                  <a:bodyPr wrap="square" rtlCol="0">
+                    <a:spAutoFit/>
+                  </a:bodyPr>
+                  <a:lstStyle/>
+                  <a:p>
+                    <a:pPr algn="ctr"/>
+                    <a:r>
+                      <a:rPr kumimoji="1" lang="en-US" altLang="ja-JP" sz="1400" dirty="0" smtClean="0"/>
+                      <a:t>GPIO 0</a:t>
+                    </a:r>
+                    <a:endParaRPr kumimoji="1" lang="ja-JP" altLang="en-US" sz="1400" dirty="0"/>
+                  </a:p>
+                </p:txBody>
+              </p:sp>
+              <p:sp>
+                <p:nvSpPr>
+                  <p:cNvPr id="54" name="テキスト ボックス 53"/>
+                  <p:cNvSpPr txBox="1"/>
+                  <p:nvPr/>
+                </p:nvSpPr>
+                <p:spPr>
+                  <a:xfrm>
+                    <a:off x="8503920" y="3363139"/>
+                    <a:ext cx="1728000" cy="307777"/>
+                  </a:xfrm>
+                  <a:prstGeom prst="rect">
+                    <a:avLst/>
+                  </a:prstGeom>
+                  <a:ln>
+                    <a:solidFill>
+                      <a:schemeClr val="bg1"/>
+                    </a:solidFill>
+                  </a:ln>
+                </p:spPr>
+                <p:style>
+                  <a:lnRef idx="1">
+                    <a:schemeClr val="accent4"/>
+                  </a:lnRef>
+                  <a:fillRef idx="2">
+                    <a:schemeClr val="accent4"/>
+                  </a:fillRef>
+                  <a:effectRef idx="1">
+                    <a:schemeClr val="accent4"/>
+                  </a:effectRef>
+                  <a:fontRef idx="minor">
+                    <a:schemeClr val="dk1"/>
+                  </a:fontRef>
+                </p:style>
+                <p:txBody>
+                  <a:bodyPr wrap="square" rtlCol="0">
+                    <a:spAutoFit/>
+                  </a:bodyPr>
+                  <a:lstStyle/>
+                  <a:p>
+                    <a:pPr algn="ctr"/>
+                    <a:r>
+                      <a:rPr kumimoji="1" lang="en-US" altLang="ja-JP" sz="1400" dirty="0" smtClean="0"/>
+                      <a:t>GPIO </a:t>
+                    </a:r>
+                    <a:r>
+                      <a:rPr lang="en-US" altLang="ja-JP" sz="1400" dirty="0" smtClean="0"/>
+                      <a:t>16</a:t>
+                    </a:r>
+                    <a:endParaRPr kumimoji="1" lang="ja-JP" altLang="en-US" sz="1400" dirty="0"/>
+                  </a:p>
+                </p:txBody>
+              </p:sp>
+              <p:sp>
+                <p:nvSpPr>
+                  <p:cNvPr id="55" name="テキスト ボックス 54"/>
+                  <p:cNvSpPr txBox="1"/>
+                  <p:nvPr/>
+                </p:nvSpPr>
+                <p:spPr>
+                  <a:xfrm>
+                    <a:off x="8503920" y="3776933"/>
+                    <a:ext cx="1728000" cy="307777"/>
+                  </a:xfrm>
+                  <a:prstGeom prst="rect">
+                    <a:avLst/>
+                  </a:prstGeom>
+                  <a:ln>
+                    <a:solidFill>
+                      <a:schemeClr val="bg1"/>
+                    </a:solidFill>
+                  </a:ln>
+                </p:spPr>
+                <p:style>
+                  <a:lnRef idx="1">
+                    <a:schemeClr val="accent4"/>
+                  </a:lnRef>
+                  <a:fillRef idx="2">
+                    <a:schemeClr val="accent4"/>
+                  </a:fillRef>
+                  <a:effectRef idx="1">
+                    <a:schemeClr val="accent4"/>
+                  </a:effectRef>
+                  <a:fontRef idx="minor">
+                    <a:schemeClr val="dk1"/>
+                  </a:fontRef>
+                </p:style>
+                <p:txBody>
+                  <a:bodyPr wrap="square" rtlCol="0">
+                    <a:spAutoFit/>
+                  </a:bodyPr>
+                  <a:lstStyle/>
+                  <a:p>
+                    <a:pPr algn="ctr"/>
+                    <a:r>
+                      <a:rPr kumimoji="1" lang="en-US" altLang="ja-JP" sz="1400" dirty="0" smtClean="0"/>
+                      <a:t>GPIO </a:t>
+                    </a:r>
+                    <a:r>
+                      <a:rPr lang="en-US" altLang="ja-JP" sz="1400" dirty="0" smtClean="0"/>
+                      <a:t>15</a:t>
+                    </a:r>
+                    <a:endParaRPr kumimoji="1" lang="ja-JP" altLang="en-US" sz="1400" dirty="0"/>
+                  </a:p>
+                </p:txBody>
+              </p:sp>
+              <p:sp>
+                <p:nvSpPr>
+                  <p:cNvPr id="56" name="テキスト ボックス 55"/>
+                  <p:cNvSpPr txBox="1"/>
+                  <p:nvPr/>
+                </p:nvSpPr>
+                <p:spPr>
+                  <a:xfrm>
+                    <a:off x="8495595" y="4535623"/>
+                    <a:ext cx="1728000" cy="307777"/>
+                  </a:xfrm>
+                  <a:prstGeom prst="rect">
+                    <a:avLst/>
+                  </a:prstGeom>
+                  <a:ln>
+                    <a:solidFill>
+                      <a:schemeClr val="bg1"/>
+                    </a:solidFill>
+                  </a:ln>
+                </p:spPr>
+                <p:style>
+                  <a:lnRef idx="1">
+                    <a:schemeClr val="accent4"/>
+                  </a:lnRef>
+                  <a:fillRef idx="2">
+                    <a:schemeClr val="accent4"/>
+                  </a:fillRef>
+                  <a:effectRef idx="1">
+                    <a:schemeClr val="accent4"/>
+                  </a:effectRef>
+                  <a:fontRef idx="minor">
+                    <a:schemeClr val="dk1"/>
+                  </a:fontRef>
+                </p:style>
+                <p:txBody>
+                  <a:bodyPr wrap="square" rtlCol="0">
+                    <a:spAutoFit/>
+                  </a:bodyPr>
+                  <a:lstStyle/>
+                  <a:p>
+                    <a:pPr algn="ctr"/>
+                    <a:r>
+                      <a:rPr kumimoji="1" lang="en-US" altLang="ja-JP" sz="1400" dirty="0" smtClean="0"/>
+                      <a:t>GPIO </a:t>
+                    </a:r>
+                    <a:r>
+                      <a:rPr lang="en-US" altLang="ja-JP" sz="1400" dirty="0" smtClean="0"/>
+                      <a:t>14</a:t>
+                    </a:r>
+                    <a:endParaRPr kumimoji="1" lang="ja-JP" altLang="en-US" sz="1400" dirty="0"/>
+                  </a:p>
+                </p:txBody>
+              </p:sp>
+              <p:sp>
+                <p:nvSpPr>
+                  <p:cNvPr id="57" name="テキスト ボックス 56"/>
+                  <p:cNvSpPr txBox="1"/>
+                  <p:nvPr/>
+                </p:nvSpPr>
+                <p:spPr>
+                  <a:xfrm>
+                    <a:off x="8512320" y="5367373"/>
+                    <a:ext cx="1728000" cy="307777"/>
+                  </a:xfrm>
+                  <a:prstGeom prst="rect">
+                    <a:avLst/>
+                  </a:prstGeom>
+                  <a:ln>
+                    <a:solidFill>
+                      <a:schemeClr val="bg1"/>
+                    </a:solidFill>
+                  </a:ln>
+                </p:spPr>
+                <p:style>
+                  <a:lnRef idx="1">
+                    <a:schemeClr val="accent4"/>
+                  </a:lnRef>
+                  <a:fillRef idx="2">
+                    <a:schemeClr val="accent4"/>
+                  </a:fillRef>
+                  <a:effectRef idx="1">
+                    <a:schemeClr val="accent4"/>
+                  </a:effectRef>
+                  <a:fontRef idx="minor">
+                    <a:schemeClr val="dk1"/>
+                  </a:fontRef>
+                </p:style>
+                <p:txBody>
+                  <a:bodyPr wrap="square" rtlCol="0">
+                    <a:spAutoFit/>
+                  </a:bodyPr>
+                  <a:lstStyle/>
+                  <a:p>
+                    <a:pPr algn="ctr"/>
+                    <a:r>
+                      <a:rPr kumimoji="1" lang="en-US" altLang="ja-JP" sz="1400" dirty="0" smtClean="0"/>
+                      <a:t>GPIO </a:t>
+                    </a:r>
+                    <a:r>
+                      <a:rPr lang="en-US" altLang="ja-JP" sz="1400" dirty="0" smtClean="0"/>
+                      <a:t>13</a:t>
+                    </a:r>
+                    <a:endParaRPr kumimoji="1" lang="ja-JP" altLang="en-US" sz="1400" dirty="0"/>
+                  </a:p>
+                </p:txBody>
+              </p:sp>
+              <p:sp>
+                <p:nvSpPr>
+                  <p:cNvPr id="58" name="テキスト ボックス 57"/>
+                  <p:cNvSpPr txBox="1"/>
+                  <p:nvPr/>
+                </p:nvSpPr>
+                <p:spPr>
+                  <a:xfrm>
+                    <a:off x="8495595" y="5743310"/>
+                    <a:ext cx="1728000" cy="307777"/>
+                  </a:xfrm>
+                  <a:prstGeom prst="rect">
+                    <a:avLst/>
+                  </a:prstGeom>
+                  <a:ln>
+                    <a:solidFill>
+                      <a:schemeClr val="bg1"/>
+                    </a:solidFill>
+                  </a:ln>
+                </p:spPr>
+                <p:style>
+                  <a:lnRef idx="1">
+                    <a:schemeClr val="accent4"/>
+                  </a:lnRef>
+                  <a:fillRef idx="2">
+                    <a:schemeClr val="accent4"/>
+                  </a:fillRef>
+                  <a:effectRef idx="1">
+                    <a:schemeClr val="accent4"/>
+                  </a:effectRef>
+                  <a:fontRef idx="minor">
+                    <a:schemeClr val="dk1"/>
+                  </a:fontRef>
+                </p:style>
+                <p:txBody>
+                  <a:bodyPr wrap="square" rtlCol="0">
+                    <a:spAutoFit/>
+                  </a:bodyPr>
+                  <a:lstStyle/>
+                  <a:p>
+                    <a:pPr algn="ctr"/>
+                    <a:r>
+                      <a:rPr kumimoji="1" lang="en-US" altLang="ja-JP" sz="1400" dirty="0" smtClean="0"/>
+                      <a:t>GPIO </a:t>
+                    </a:r>
+                    <a:r>
+                      <a:rPr lang="en-US" altLang="ja-JP" sz="1400" dirty="0" smtClean="0"/>
+                      <a:t>12</a:t>
+                    </a:r>
+                    <a:endParaRPr kumimoji="1" lang="ja-JP" altLang="en-US" sz="1400" dirty="0"/>
+                  </a:p>
+                </p:txBody>
+              </p:sp>
+              <p:sp>
+                <p:nvSpPr>
+                  <p:cNvPr id="59" name="テキスト ボックス 58"/>
+                  <p:cNvSpPr txBox="1"/>
+                  <p:nvPr/>
+                </p:nvSpPr>
+                <p:spPr>
+                  <a:xfrm>
+                    <a:off x="8495595" y="6157104"/>
+                    <a:ext cx="1728000" cy="307777"/>
+                  </a:xfrm>
+                  <a:prstGeom prst="rect">
+                    <a:avLst/>
+                  </a:prstGeom>
+                  <a:ln>
+                    <a:solidFill>
+                      <a:schemeClr val="bg1"/>
+                    </a:solidFill>
+                  </a:ln>
+                </p:spPr>
+                <p:style>
+                  <a:lnRef idx="1">
+                    <a:schemeClr val="accent4"/>
+                  </a:lnRef>
+                  <a:fillRef idx="2">
+                    <a:schemeClr val="accent4"/>
+                  </a:fillRef>
+                  <a:effectRef idx="1">
+                    <a:schemeClr val="accent4"/>
+                  </a:effectRef>
+                  <a:fontRef idx="minor">
+                    <a:schemeClr val="dk1"/>
+                  </a:fontRef>
+                </p:style>
+                <p:txBody>
+                  <a:bodyPr wrap="square" rtlCol="0">
+                    <a:spAutoFit/>
+                  </a:bodyPr>
+                  <a:lstStyle/>
+                  <a:p>
+                    <a:pPr algn="ctr"/>
+                    <a:r>
+                      <a:rPr kumimoji="1" lang="en-US" altLang="ja-JP" sz="1400" dirty="0" smtClean="0"/>
+                      <a:t>GPIO </a:t>
+                    </a:r>
+                    <a:r>
+                      <a:rPr lang="en-US" altLang="ja-JP" sz="1400" dirty="0" smtClean="0"/>
+                      <a:t>11</a:t>
+                    </a:r>
+                    <a:endParaRPr kumimoji="1" lang="ja-JP" altLang="en-US" sz="1400" dirty="0"/>
+                  </a:p>
+                </p:txBody>
+              </p:sp>
+              <p:sp>
+                <p:nvSpPr>
+                  <p:cNvPr id="61" name="テキスト ボックス 60"/>
+                  <p:cNvSpPr txBox="1"/>
+                  <p:nvPr/>
+                </p:nvSpPr>
+                <p:spPr>
+                  <a:xfrm>
+                    <a:off x="2353052" y="1014846"/>
+                    <a:ext cx="1377696" cy="307777"/>
+                  </a:xfrm>
+                  <a:prstGeom prst="rect">
+                    <a:avLst/>
+                  </a:prstGeom>
+                  <a:solidFill>
+                    <a:srgbClr val="FF0000"/>
+                  </a:solidFill>
+                  <a:ln>
+                    <a:solidFill>
+                      <a:schemeClr val="bg1"/>
+                    </a:solidFill>
+                  </a:ln>
+                </p:spPr>
+                <p:style>
+                  <a:lnRef idx="2">
+                    <a:schemeClr val="accent2">
+                      <a:shade val="50000"/>
+                    </a:schemeClr>
+                  </a:lnRef>
+                  <a:fillRef idx="1">
+                    <a:schemeClr val="accent2"/>
+                  </a:fillRef>
+                  <a:effectRef idx="0">
+                    <a:schemeClr val="accent2"/>
+                  </a:effectRef>
+                  <a:fontRef idx="minor">
+                    <a:schemeClr val="lt1"/>
+                  </a:fontRef>
+                </p:style>
+                <p:txBody>
+                  <a:bodyPr wrap="square" rtlCol="0">
+                    <a:spAutoFit/>
+                  </a:bodyPr>
+                  <a:lstStyle/>
+                  <a:p>
+                    <a:pPr algn="ctr"/>
+                    <a:r>
+                      <a:rPr lang="en-US" altLang="ja-JP" sz="1400" dirty="0" smtClean="0"/>
+                      <a:t>VBUS 5.0V</a:t>
+                    </a:r>
+                    <a:endParaRPr kumimoji="1" lang="ja-JP" altLang="en-US" sz="1400" dirty="0"/>
+                  </a:p>
+                </p:txBody>
+              </p:sp>
+              <p:sp>
+                <p:nvSpPr>
+                  <p:cNvPr id="62" name="テキスト ボックス 61"/>
+                  <p:cNvSpPr txBox="1"/>
+                  <p:nvPr/>
+                </p:nvSpPr>
+                <p:spPr>
+                  <a:xfrm>
+                    <a:off x="2353052" y="622644"/>
+                    <a:ext cx="1377696" cy="307777"/>
+                  </a:xfrm>
+                  <a:prstGeom prst="rect">
+                    <a:avLst/>
+                  </a:prstGeom>
+                  <a:ln>
+                    <a:solidFill>
+                      <a:schemeClr val="bg1"/>
+                    </a:solidFill>
+                  </a:ln>
+                </p:spPr>
+                <p:style>
+                  <a:lnRef idx="3">
+                    <a:schemeClr val="lt1"/>
+                  </a:lnRef>
+                  <a:fillRef idx="1">
+                    <a:schemeClr val="dk1"/>
+                  </a:fillRef>
+                  <a:effectRef idx="1">
+                    <a:schemeClr val="dk1"/>
+                  </a:effectRef>
+                  <a:fontRef idx="minor">
+                    <a:schemeClr val="lt1"/>
+                  </a:fontRef>
+                </p:style>
+                <p:txBody>
+                  <a:bodyPr wrap="square" rtlCol="0">
+                    <a:spAutoFit/>
+                  </a:bodyPr>
+                  <a:lstStyle/>
+                  <a:p>
+                    <a:pPr algn="ctr"/>
+                    <a:r>
+                      <a:rPr kumimoji="1" lang="en-US" altLang="ja-JP" sz="1400" dirty="0" smtClean="0"/>
+                      <a:t>GND</a:t>
+                    </a:r>
+                    <a:endParaRPr kumimoji="1" lang="ja-JP" altLang="en-US" sz="1400" dirty="0"/>
+                  </a:p>
+                </p:txBody>
+              </p:sp>
+              <p:sp>
+                <p:nvSpPr>
+                  <p:cNvPr id="65" name="テキスト ボックス 64"/>
+                  <p:cNvSpPr txBox="1"/>
+                  <p:nvPr/>
+                </p:nvSpPr>
+                <p:spPr>
+                  <a:xfrm>
+                    <a:off x="8512320" y="1022488"/>
+                    <a:ext cx="1377696" cy="307777"/>
+                  </a:xfrm>
+                  <a:prstGeom prst="rect">
+                    <a:avLst/>
+                  </a:prstGeom>
+                  <a:solidFill>
+                    <a:srgbClr val="FF0000"/>
+                  </a:solidFill>
+                  <a:ln>
+                    <a:solidFill>
+                      <a:schemeClr val="bg1"/>
+                    </a:solidFill>
+                  </a:ln>
+                </p:spPr>
+                <p:style>
+                  <a:lnRef idx="2">
+                    <a:schemeClr val="accent2">
+                      <a:shade val="50000"/>
+                    </a:schemeClr>
+                  </a:lnRef>
+                  <a:fillRef idx="1">
+                    <a:schemeClr val="accent2"/>
+                  </a:fillRef>
+                  <a:effectRef idx="0">
+                    <a:schemeClr val="accent2"/>
+                  </a:effectRef>
+                  <a:fontRef idx="minor">
+                    <a:schemeClr val="lt1"/>
+                  </a:fontRef>
+                </p:style>
+                <p:txBody>
+                  <a:bodyPr wrap="square" rtlCol="0">
+                    <a:spAutoFit/>
+                  </a:bodyPr>
+                  <a:lstStyle/>
+                  <a:p>
+                    <a:pPr algn="ctr"/>
+                    <a:r>
+                      <a:rPr lang="en-US" altLang="ja-JP" sz="1400" dirty="0" smtClean="0"/>
+                      <a:t>3.3V Output</a:t>
+                    </a:r>
+                    <a:endParaRPr kumimoji="1" lang="ja-JP" altLang="en-US" sz="1400" dirty="0"/>
+                  </a:p>
+                </p:txBody>
+              </p:sp>
+              <p:sp>
+                <p:nvSpPr>
+                  <p:cNvPr id="66" name="テキスト ボックス 65"/>
+                  <p:cNvSpPr txBox="1"/>
+                  <p:nvPr/>
+                </p:nvSpPr>
+                <p:spPr>
+                  <a:xfrm>
+                    <a:off x="8512320" y="630286"/>
+                    <a:ext cx="1377696" cy="307777"/>
+                  </a:xfrm>
+                  <a:prstGeom prst="rect">
+                    <a:avLst/>
+                  </a:prstGeom>
+                  <a:ln>
+                    <a:solidFill>
+                      <a:schemeClr val="bg1"/>
+                    </a:solidFill>
+                  </a:ln>
+                </p:spPr>
+                <p:style>
+                  <a:lnRef idx="3">
+                    <a:schemeClr val="lt1"/>
+                  </a:lnRef>
+                  <a:fillRef idx="1">
+                    <a:schemeClr val="dk1"/>
+                  </a:fillRef>
+                  <a:effectRef idx="1">
+                    <a:schemeClr val="dk1"/>
+                  </a:effectRef>
+                  <a:fontRef idx="minor">
+                    <a:schemeClr val="lt1"/>
+                  </a:fontRef>
+                </p:style>
+                <p:txBody>
+                  <a:bodyPr wrap="square" rtlCol="0">
+                    <a:spAutoFit/>
+                  </a:bodyPr>
+                  <a:lstStyle/>
+                  <a:p>
+                    <a:pPr algn="ctr"/>
+                    <a:r>
+                      <a:rPr kumimoji="1" lang="en-US" altLang="ja-JP" sz="1400" dirty="0" smtClean="0"/>
+                      <a:t>GND</a:t>
+                    </a:r>
+                    <a:endParaRPr kumimoji="1" lang="ja-JP" altLang="en-US" sz="1400" dirty="0"/>
+                  </a:p>
+                </p:txBody>
+              </p:sp>
+            </p:grpSp>
+            <p:sp>
+              <p:nvSpPr>
+                <p:cNvPr id="68" name="十字形 67"/>
+                <p:cNvSpPr>
+                  <a:spLocks noChangeAspect="1"/>
+                </p:cNvSpPr>
+                <p:nvPr/>
+              </p:nvSpPr>
+              <p:spPr>
+                <a:xfrm rot="2700000">
+                  <a:off x="8376836" y="1419513"/>
+                  <a:ext cx="312280" cy="312280"/>
+                </a:xfrm>
+                <a:prstGeom prst="plus">
+                  <a:avLst>
+                    <a:gd name="adj" fmla="val 47223"/>
+                  </a:avLst>
+                </a:prstGeom>
+                <a:solidFill>
+                  <a:schemeClr val="tx1"/>
+                </a:solidFill>
+                <a:ln>
+                  <a:solidFill>
+                    <a:schemeClr val="tx1"/>
+                  </a:solidFill>
+                </a:ln>
+              </p:spPr>
+              <p:style>
+                <a:lnRef idx="2">
+                  <a:schemeClr val="accent1">
+                    <a:shade val="50000"/>
+                  </a:schemeClr>
+                </a:lnRef>
+                <a:fillRef idx="1">
+                  <a:schemeClr val="accent1"/>
+                </a:fillRef>
+                <a:effectRef idx="0">
+                  <a:schemeClr val="accent1"/>
+                </a:effectRef>
+                <a:fontRef idx="minor">
+                  <a:schemeClr val="lt1"/>
+                </a:fontRef>
+              </p:style>
+              <p:txBody>
+                <a:bodyPr rtlCol="0" anchor="ctr"/>
+                <a:lstStyle/>
+                <a:p>
+                  <a:pPr algn="ctr"/>
+                  <a:endParaRPr kumimoji="1" lang="ja-JP" altLang="en-US"/>
+                </a:p>
+              </p:txBody>
+            </p:sp>
+            <p:sp>
+              <p:nvSpPr>
+                <p:cNvPr id="69" name="十字形 68"/>
+                <p:cNvSpPr>
+                  <a:spLocks noChangeAspect="1"/>
+                </p:cNvSpPr>
+                <p:nvPr/>
+              </p:nvSpPr>
+              <p:spPr>
+                <a:xfrm rot="2700000">
+                  <a:off x="8373855" y="2969746"/>
+                  <a:ext cx="312280" cy="312280"/>
+                </a:xfrm>
+                <a:prstGeom prst="plus">
+                  <a:avLst>
+                    <a:gd name="adj" fmla="val 47223"/>
+                  </a:avLst>
+                </a:prstGeom>
+                <a:solidFill>
+                  <a:schemeClr val="tx1"/>
+                </a:solidFill>
+                <a:ln>
+                  <a:solidFill>
+                    <a:schemeClr val="tx1"/>
+                  </a:solidFill>
+                </a:ln>
+              </p:spPr>
+              <p:style>
+                <a:lnRef idx="2">
+                  <a:schemeClr val="accent1">
+                    <a:shade val="50000"/>
+                  </a:schemeClr>
+                </a:lnRef>
+                <a:fillRef idx="1">
+                  <a:schemeClr val="accent1"/>
+                </a:fillRef>
+                <a:effectRef idx="0">
+                  <a:schemeClr val="accent1"/>
+                </a:effectRef>
+                <a:fontRef idx="minor">
+                  <a:schemeClr val="lt1"/>
+                </a:fontRef>
+              </p:style>
+              <p:txBody>
+                <a:bodyPr rtlCol="0" anchor="ctr"/>
+                <a:lstStyle/>
+                <a:p>
+                  <a:pPr algn="ctr"/>
+                  <a:endParaRPr kumimoji="1" lang="ja-JP" altLang="en-US"/>
+                </a:p>
+              </p:txBody>
+            </p:sp>
+            <p:sp>
+              <p:nvSpPr>
+                <p:cNvPr id="71" name="十字形 70"/>
+                <p:cNvSpPr>
+                  <a:spLocks noChangeAspect="1"/>
+                </p:cNvSpPr>
+                <p:nvPr/>
+              </p:nvSpPr>
+              <p:spPr>
+                <a:xfrm rot="2700000">
+                  <a:off x="8373856" y="4131462"/>
+                  <a:ext cx="312280" cy="312280"/>
+                </a:xfrm>
+                <a:prstGeom prst="plus">
+                  <a:avLst>
+                    <a:gd name="adj" fmla="val 47223"/>
+                  </a:avLst>
+                </a:prstGeom>
+                <a:solidFill>
+                  <a:schemeClr val="tx1"/>
+                </a:solidFill>
+                <a:ln>
+                  <a:solidFill>
+                    <a:schemeClr val="tx1"/>
+                  </a:solidFill>
+                </a:ln>
+              </p:spPr>
+              <p:style>
+                <a:lnRef idx="2">
+                  <a:schemeClr val="accent1">
+                    <a:shade val="50000"/>
+                  </a:schemeClr>
+                </a:lnRef>
+                <a:fillRef idx="1">
+                  <a:schemeClr val="accent1"/>
+                </a:fillRef>
+                <a:effectRef idx="0">
+                  <a:schemeClr val="accent1"/>
+                </a:effectRef>
+                <a:fontRef idx="minor">
+                  <a:schemeClr val="lt1"/>
+                </a:fontRef>
+              </p:style>
+              <p:txBody>
+                <a:bodyPr rtlCol="0" anchor="ctr"/>
+                <a:lstStyle/>
+                <a:p>
+                  <a:pPr algn="ctr"/>
+                  <a:endParaRPr kumimoji="1" lang="ja-JP" altLang="en-US"/>
+                </a:p>
+              </p:txBody>
+            </p:sp>
+            <p:sp>
+              <p:nvSpPr>
+                <p:cNvPr id="72" name="十字形 71"/>
+                <p:cNvSpPr>
+                  <a:spLocks noChangeAspect="1"/>
+                </p:cNvSpPr>
+                <p:nvPr/>
+              </p:nvSpPr>
+              <p:spPr>
+                <a:xfrm rot="2700000">
+                  <a:off x="8350711" y="4930315"/>
+                  <a:ext cx="312280" cy="312280"/>
+                </a:xfrm>
+                <a:prstGeom prst="plus">
+                  <a:avLst>
+                    <a:gd name="adj" fmla="val 47223"/>
+                  </a:avLst>
+                </a:prstGeom>
+                <a:solidFill>
+                  <a:schemeClr val="tx1"/>
+                </a:solidFill>
+                <a:ln>
+                  <a:solidFill>
+                    <a:schemeClr val="tx1"/>
+                  </a:solidFill>
+                </a:ln>
+              </p:spPr>
+              <p:style>
+                <a:lnRef idx="2">
+                  <a:schemeClr val="accent1">
+                    <a:shade val="50000"/>
+                  </a:schemeClr>
+                </a:lnRef>
+                <a:fillRef idx="1">
+                  <a:schemeClr val="accent1"/>
+                </a:fillRef>
+                <a:effectRef idx="0">
+                  <a:schemeClr val="accent1"/>
+                </a:effectRef>
+                <a:fontRef idx="minor">
+                  <a:schemeClr val="lt1"/>
+                </a:fontRef>
+              </p:style>
+              <p:txBody>
+                <a:bodyPr rtlCol="0" anchor="ctr"/>
+                <a:lstStyle/>
+                <a:p>
+                  <a:pPr algn="ctr"/>
+                  <a:endParaRPr kumimoji="1" lang="ja-JP" altLang="en-US"/>
+                </a:p>
+              </p:txBody>
+            </p:sp>
+          </p:grpSp>
+          <p:sp>
+            <p:nvSpPr>
+              <p:cNvPr id="74" name="テキスト ボックス 73"/>
+              <p:cNvSpPr txBox="1"/>
+              <p:nvPr/>
+            </p:nvSpPr>
+            <p:spPr>
+              <a:xfrm rot="5400000">
+                <a:off x="7845876" y="4163983"/>
+                <a:ext cx="5080059" cy="307978"/>
+              </a:xfrm>
+              <a:prstGeom prst="rect">
+                <a:avLst/>
+              </a:prstGeom>
+              <a:ln>
+                <a:solidFill>
+                  <a:schemeClr val="bg1"/>
+                </a:solidFill>
+              </a:ln>
+            </p:spPr>
+            <p:style>
+              <a:lnRef idx="1">
+                <a:schemeClr val="accent4"/>
+              </a:lnRef>
+              <a:fillRef idx="2">
+                <a:schemeClr val="accent4"/>
+              </a:fillRef>
+              <a:effectRef idx="1">
+                <a:schemeClr val="accent4"/>
+              </a:effectRef>
+              <a:fontRef idx="minor">
+                <a:schemeClr val="dk1"/>
+              </a:fontRef>
+            </p:style>
+            <p:txBody>
+              <a:bodyPr wrap="square" rtlCol="0">
+                <a:spAutoFit/>
+              </a:bodyPr>
+              <a:lstStyle/>
+              <a:p>
+                <a:pPr algn="ctr"/>
+                <a:r>
+                  <a:rPr kumimoji="1" lang="en-US" altLang="ja-JP" sz="1400" smtClean="0"/>
+                  <a:t>GPIO </a:t>
+                </a:r>
+                <a:r>
+                  <a:rPr kumimoji="1" lang="en-US" altLang="ja-JP" sz="1400" smtClean="0"/>
+                  <a:t>1</a:t>
+                </a:r>
+                <a:endParaRPr kumimoji="1" lang="ja-JP" altLang="en-US" sz="1400" dirty="0"/>
+              </a:p>
+            </p:txBody>
+          </p:sp>
+        </p:grpSp>
+        <p:sp>
+          <p:nvSpPr>
+            <p:cNvPr id="76" name="テキスト ボックス 75"/>
+            <p:cNvSpPr txBox="1"/>
+            <p:nvPr/>
+          </p:nvSpPr>
+          <p:spPr>
+            <a:xfrm>
+              <a:off x="2368309" y="6633314"/>
+              <a:ext cx="8184649" cy="307777"/>
+            </a:xfrm>
+            <a:prstGeom prst="rect">
+              <a:avLst/>
+            </a:prstGeom>
+            <a:ln>
+              <a:solidFill>
+                <a:schemeClr val="bg1"/>
+              </a:solidFill>
+            </a:ln>
+          </p:spPr>
+          <p:style>
+            <a:lnRef idx="1">
+              <a:schemeClr val="accent4"/>
+            </a:lnRef>
+            <a:fillRef idx="2">
+              <a:schemeClr val="accent4"/>
+            </a:fillRef>
+            <a:effectRef idx="1">
+              <a:schemeClr val="accent4"/>
+            </a:effectRef>
+            <a:fontRef idx="minor">
+              <a:schemeClr val="dk1"/>
+            </a:fontRef>
+          </p:style>
+          <p:txBody>
+            <a:bodyPr wrap="square" rtlCol="0">
+              <a:spAutoFit/>
+            </a:bodyPr>
+            <a:lstStyle/>
+            <a:p>
+              <a:pPr algn="ctr"/>
+              <a:r>
+                <a:rPr kumimoji="1" lang="en-US" altLang="ja-JP" sz="1400" smtClean="0"/>
+                <a:t>GPIO </a:t>
+              </a:r>
+              <a:r>
+                <a:rPr kumimoji="1" lang="en-US" altLang="ja-JP" sz="1400" smtClean="0"/>
+                <a:t>1</a:t>
+              </a:r>
+              <a:endParaRPr kumimoji="1" lang="ja-JP" altLang="en-US" sz="1400" dirty="0"/>
+            </a:p>
+          </p:txBody>
+        </p:sp>
+        <p:sp>
+          <p:nvSpPr>
+            <p:cNvPr id="77" name="テキスト ボックス 76"/>
+            <p:cNvSpPr txBox="1"/>
+            <p:nvPr/>
+          </p:nvSpPr>
+          <p:spPr>
+            <a:xfrm rot="5400000">
+              <a:off x="1730343" y="6309483"/>
+              <a:ext cx="955445" cy="307777"/>
+            </a:xfrm>
+            <a:prstGeom prst="rect">
+              <a:avLst/>
+            </a:prstGeom>
+            <a:ln>
+              <a:solidFill>
+                <a:schemeClr val="bg1"/>
+              </a:solidFill>
+            </a:ln>
+          </p:spPr>
+          <p:style>
+            <a:lnRef idx="1">
+              <a:schemeClr val="accent4"/>
+            </a:lnRef>
+            <a:fillRef idx="2">
+              <a:schemeClr val="accent4"/>
+            </a:fillRef>
+            <a:effectRef idx="1">
+              <a:schemeClr val="accent4"/>
+            </a:effectRef>
+            <a:fontRef idx="minor">
+              <a:schemeClr val="dk1"/>
+            </a:fontRef>
+          </p:style>
+          <p:txBody>
+            <a:bodyPr wrap="square" rtlCol="0">
+              <a:spAutoFit/>
+            </a:bodyPr>
+            <a:lstStyle/>
+            <a:p>
+              <a:pPr algn="ctr"/>
+              <a:r>
+                <a:rPr kumimoji="1" lang="en-US" altLang="ja-JP" sz="1400" smtClean="0"/>
+                <a:t>GPIO </a:t>
+              </a:r>
+              <a:r>
+                <a:rPr kumimoji="1" lang="en-US" altLang="ja-JP" sz="1400" smtClean="0"/>
+                <a:t>1</a:t>
+              </a:r>
+              <a:endParaRPr kumimoji="1" lang="ja-JP" altLang="en-US" sz="1400" dirty="0"/>
+            </a:p>
+          </p:txBody>
+        </p:sp>
+      </p:grpSp>
+    </p:spTree>
+    <p:extLst>
+      <p:ext uri="{BB962C8B-B14F-4D97-AF65-F5344CB8AC3E}">
+        <p14:creationId xmlns:p14="http://schemas.microsoft.com/office/powerpoint/2010/main" val="2037824864"/>
+      </p:ext>
+    </p:extLst>
+  </p:cSld>
+  <p:clrMapOvr>
+    <a:masterClrMapping/>
+  </p:clrMapOvr>
+</p:sld>
+</file>
+
 <file path=ppt/theme/theme1.xml><?xml version="1.0" encoding="utf-8"?>
 <a:theme xmlns:a="http://schemas.openxmlformats.org/drawingml/2006/main" name="Office テーマ">
   <a:themeElements>

</xml_diff>

<commit_message>
remove comment outs from top README
</commit_message>
<xml_diff>
--- a/PinOut.pptx
+++ b/PinOut.pptx
@@ -255,7 +255,7 @@
           <a:p>
             <a:fld id="{807DEB4C-13CB-4998-BB8A-6061EEBFB08B}" type="datetimeFigureOut">
               <a:rPr kumimoji="1" lang="ja-JP" altLang="en-US" smtClean="0"/>
-              <a:t>2017/2/5</a:t>
+              <a:t>2017/2/20</a:t>
             </a:fld>
             <a:endParaRPr kumimoji="1" lang="ja-JP" altLang="en-US"/>
           </a:p>
@@ -457,7 +457,7 @@
           <a:p>
             <a:fld id="{807DEB4C-13CB-4998-BB8A-6061EEBFB08B}" type="datetimeFigureOut">
               <a:rPr kumimoji="1" lang="ja-JP" altLang="en-US" smtClean="0"/>
-              <a:t>2017/2/5</a:t>
+              <a:t>2017/2/20</a:t>
             </a:fld>
             <a:endParaRPr kumimoji="1" lang="ja-JP" altLang="en-US"/>
           </a:p>
@@ -669,7 +669,7 @@
           <a:p>
             <a:fld id="{807DEB4C-13CB-4998-BB8A-6061EEBFB08B}" type="datetimeFigureOut">
               <a:rPr kumimoji="1" lang="ja-JP" altLang="en-US" smtClean="0"/>
-              <a:t>2017/2/5</a:t>
+              <a:t>2017/2/20</a:t>
             </a:fld>
             <a:endParaRPr kumimoji="1" lang="ja-JP" altLang="en-US"/>
           </a:p>
@@ -871,7 +871,7 @@
           <a:p>
             <a:fld id="{807DEB4C-13CB-4998-BB8A-6061EEBFB08B}" type="datetimeFigureOut">
               <a:rPr kumimoji="1" lang="ja-JP" altLang="en-US" smtClean="0"/>
-              <a:t>2017/2/5</a:t>
+              <a:t>2017/2/20</a:t>
             </a:fld>
             <a:endParaRPr kumimoji="1" lang="ja-JP" altLang="en-US"/>
           </a:p>
@@ -1117,7 +1117,7 @@
           <a:p>
             <a:fld id="{807DEB4C-13CB-4998-BB8A-6061EEBFB08B}" type="datetimeFigureOut">
               <a:rPr kumimoji="1" lang="ja-JP" altLang="en-US" smtClean="0"/>
-              <a:t>2017/2/5</a:t>
+              <a:t>2017/2/20</a:t>
             </a:fld>
             <a:endParaRPr kumimoji="1" lang="ja-JP" altLang="en-US"/>
           </a:p>
@@ -1413,7 +1413,7 @@
           <a:p>
             <a:fld id="{807DEB4C-13CB-4998-BB8A-6061EEBFB08B}" type="datetimeFigureOut">
               <a:rPr kumimoji="1" lang="ja-JP" altLang="en-US" smtClean="0"/>
-              <a:t>2017/2/5</a:t>
+              <a:t>2017/2/20</a:t>
             </a:fld>
             <a:endParaRPr kumimoji="1" lang="ja-JP" altLang="en-US"/>
           </a:p>
@@ -1844,7 +1844,7 @@
           <a:p>
             <a:fld id="{807DEB4C-13CB-4998-BB8A-6061EEBFB08B}" type="datetimeFigureOut">
               <a:rPr kumimoji="1" lang="ja-JP" altLang="en-US" smtClean="0"/>
-              <a:t>2017/2/5</a:t>
+              <a:t>2017/2/20</a:t>
             </a:fld>
             <a:endParaRPr kumimoji="1" lang="ja-JP" altLang="en-US"/>
           </a:p>
@@ -1962,7 +1962,7 @@
           <a:p>
             <a:fld id="{807DEB4C-13CB-4998-BB8A-6061EEBFB08B}" type="datetimeFigureOut">
               <a:rPr kumimoji="1" lang="ja-JP" altLang="en-US" smtClean="0"/>
-              <a:t>2017/2/5</a:t>
+              <a:t>2017/2/20</a:t>
             </a:fld>
             <a:endParaRPr kumimoji="1" lang="ja-JP" altLang="en-US"/>
           </a:p>
@@ -2057,7 +2057,7 @@
           <a:p>
             <a:fld id="{807DEB4C-13CB-4998-BB8A-6061EEBFB08B}" type="datetimeFigureOut">
               <a:rPr kumimoji="1" lang="ja-JP" altLang="en-US" smtClean="0"/>
-              <a:t>2017/2/5</a:t>
+              <a:t>2017/2/20</a:t>
             </a:fld>
             <a:endParaRPr kumimoji="1" lang="ja-JP" altLang="en-US"/>
           </a:p>
@@ -2366,7 +2366,7 @@
           <a:p>
             <a:fld id="{807DEB4C-13CB-4998-BB8A-6061EEBFB08B}" type="datetimeFigureOut">
               <a:rPr kumimoji="1" lang="ja-JP" altLang="en-US" smtClean="0"/>
-              <a:t>2017/2/5</a:t>
+              <a:t>2017/2/20</a:t>
             </a:fld>
             <a:endParaRPr kumimoji="1" lang="ja-JP" altLang="en-US"/>
           </a:p>
@@ -2619,7 +2619,7 @@
           <a:p>
             <a:fld id="{807DEB4C-13CB-4998-BB8A-6061EEBFB08B}" type="datetimeFigureOut">
               <a:rPr kumimoji="1" lang="ja-JP" altLang="en-US" smtClean="0"/>
-              <a:t>2017/2/5</a:t>
+              <a:t>2017/2/20</a:t>
             </a:fld>
             <a:endParaRPr kumimoji="1" lang="ja-JP" altLang="en-US"/>
           </a:p>
@@ -2864,7 +2864,7 @@
           <a:p>
             <a:fld id="{807DEB4C-13CB-4998-BB8A-6061EEBFB08B}" type="datetimeFigureOut">
               <a:rPr kumimoji="1" lang="ja-JP" altLang="en-US" smtClean="0"/>
-              <a:t>2017/2/5</a:t>
+              <a:t>2017/2/20</a:t>
             </a:fld>
             <a:endParaRPr kumimoji="1" lang="ja-JP" altLang="en-US"/>
           </a:p>
@@ -6839,155 +6839,49 @@
       </p:grpSpPr>
       <p:grpSp>
         <p:nvGrpSpPr>
-          <p:cNvPr id="78" name="図形グループ 77"/>
+          <p:cNvPr id="3" name="図形グループ 2"/>
           <p:cNvGrpSpPr/>
           <p:nvPr/>
         </p:nvGrpSpPr>
         <p:grpSpPr>
           <a:xfrm>
             <a:off x="2054177" y="0"/>
-            <a:ext cx="8498781" cy="6941094"/>
+            <a:ext cx="8498781" cy="7224730"/>
             <a:chOff x="2054177" y="0"/>
-            <a:chExt cx="8498781" cy="6941094"/>
+            <a:chExt cx="8498781" cy="7224730"/>
           </a:xfrm>
         </p:grpSpPr>
         <p:grpSp>
           <p:nvGrpSpPr>
-            <p:cNvPr id="75" name="図形グループ 74"/>
+            <p:cNvPr id="78" name="図形グループ 77"/>
             <p:cNvGrpSpPr/>
             <p:nvPr/>
           </p:nvGrpSpPr>
           <p:grpSpPr>
             <a:xfrm>
-              <a:off x="2058338" y="0"/>
-              <a:ext cx="8494620" cy="6678001"/>
-              <a:chOff x="2045275" y="180000"/>
-              <a:chExt cx="8494620" cy="6678001"/>
+              <a:off x="2054177" y="0"/>
+              <a:ext cx="8498781" cy="6941094"/>
+              <a:chOff x="2054177" y="0"/>
+              <a:chExt cx="8498781" cy="6941094"/>
             </a:xfrm>
           </p:grpSpPr>
           <p:grpSp>
             <p:nvGrpSpPr>
-              <p:cNvPr id="73" name="図形グループ 72"/>
+              <p:cNvPr id="75" name="図形グループ 74"/>
               <p:cNvGrpSpPr/>
               <p:nvPr/>
             </p:nvGrpSpPr>
             <p:grpSpPr>
               <a:xfrm>
-                <a:off x="2045275" y="180000"/>
-                <a:ext cx="8195045" cy="6516000"/>
+                <a:off x="2058338" y="0"/>
+                <a:ext cx="8494620" cy="6678001"/>
                 <a:chOff x="2045275" y="180000"/>
-                <a:chExt cx="8195045" cy="6516000"/>
+                <a:chExt cx="8494620" cy="6678001"/>
               </a:xfrm>
             </p:grpSpPr>
-            <p:sp>
-              <p:nvSpPr>
-                <p:cNvPr id="52" name="テキスト ボックス 51"/>
-                <p:cNvSpPr txBox="1"/>
-                <p:nvPr/>
-              </p:nvSpPr>
-              <p:spPr>
-                <a:xfrm>
-                  <a:off x="2353052" y="6160189"/>
-                  <a:ext cx="1377696" cy="307777"/>
-                </a:xfrm>
-                <a:prstGeom prst="rect">
-                  <a:avLst/>
-                </a:prstGeom>
-                <a:ln>
-                  <a:solidFill>
-                    <a:schemeClr val="bg1"/>
-                  </a:solidFill>
-                </a:ln>
-              </p:spPr>
-              <p:style>
-                <a:lnRef idx="1">
-                  <a:schemeClr val="accent4"/>
-                </a:lnRef>
-                <a:fillRef idx="2">
-                  <a:schemeClr val="accent4"/>
-                </a:fillRef>
-                <a:effectRef idx="1">
-                  <a:schemeClr val="accent4"/>
-                </a:effectRef>
-                <a:fontRef idx="minor">
-                  <a:schemeClr val="dk1"/>
-                </a:fontRef>
-              </p:style>
-              <p:txBody>
-                <a:bodyPr wrap="square" rtlCol="0">
-                  <a:spAutoFit/>
-                </a:bodyPr>
-                <a:lstStyle/>
-                <a:p>
-                  <a:pPr algn="ctr"/>
-                  <a:r>
-                    <a:rPr kumimoji="1" lang="en-US" altLang="ja-JP" sz="1400" dirty="0" smtClean="0"/>
-                    <a:t>GPIO </a:t>
-                  </a:r>
-                  <a:r>
-                    <a:rPr kumimoji="1" lang="en-US" altLang="ja-JP" sz="1400" dirty="0" smtClean="0"/>
-                    <a:t>10</a:t>
-                  </a:r>
-                  <a:endParaRPr kumimoji="1" lang="ja-JP" altLang="en-US" sz="1400" dirty="0"/>
-                </a:p>
-              </p:txBody>
-            </p:sp>
-            <p:sp>
-              <p:nvSpPr>
-                <p:cNvPr id="53" name="テキスト ボックス 52"/>
-                <p:cNvSpPr txBox="1"/>
-                <p:nvPr/>
-              </p:nvSpPr>
-              <p:spPr>
-                <a:xfrm>
-                  <a:off x="8503917" y="1773379"/>
-                  <a:ext cx="1728000" cy="307777"/>
-                </a:xfrm>
-                <a:prstGeom prst="rect">
-                  <a:avLst/>
-                </a:prstGeom>
-                <a:ln>
-                  <a:solidFill>
-                    <a:schemeClr val="bg1"/>
-                  </a:solidFill>
-                </a:ln>
-              </p:spPr>
-              <p:style>
-                <a:lnRef idx="1">
-                  <a:schemeClr val="accent4"/>
-                </a:lnRef>
-                <a:fillRef idx="2">
-                  <a:schemeClr val="accent4"/>
-                </a:fillRef>
-                <a:effectRef idx="1">
-                  <a:schemeClr val="accent4"/>
-                </a:effectRef>
-                <a:fontRef idx="minor">
-                  <a:schemeClr val="dk1"/>
-                </a:fontRef>
-              </p:style>
-              <p:txBody>
-                <a:bodyPr wrap="square" rtlCol="0">
-                  <a:spAutoFit/>
-                </a:bodyPr>
-                <a:lstStyle/>
-                <a:p>
-                  <a:pPr algn="ctr"/>
-                  <a:r>
-                    <a:rPr kumimoji="1" lang="en-US" altLang="ja-JP" sz="1400" dirty="0" smtClean="0"/>
-                    <a:t>GPIO </a:t>
-                  </a:r>
-                  <a:r>
-                    <a:rPr kumimoji="1" lang="en-US" altLang="ja-JP" sz="1400" dirty="0" smtClean="0"/>
-                    <a:t>017</a:t>
-                  </a:r>
-                  <a:endParaRPr kumimoji="1" lang="ja-JP" altLang="en-US" sz="1400" dirty="0"/>
-                </a:p>
-              </p:txBody>
-            </p:sp>
             <p:grpSp>
               <p:nvGrpSpPr>
-                <p:cNvPr id="67" name="図形グループ 66"/>
+                <p:cNvPr id="73" name="図形グループ 72"/>
                 <p:cNvGrpSpPr/>
                 <p:nvPr/>
               </p:nvGrpSpPr>
@@ -6999,976 +6893,15 @@
                   <a:chExt cx="8195045" cy="6516000"/>
                 </a:xfrm>
               </p:grpSpPr>
-              <p:cxnSp>
-                <p:nvCxnSpPr>
-                  <p:cNvPr id="6" name="直線コネクタ 5"/>
-                  <p:cNvCxnSpPr/>
-                  <p:nvPr/>
-                </p:nvCxnSpPr>
-                <p:spPr>
-                  <a:xfrm>
-                    <a:off x="3730752" y="763524"/>
-                    <a:ext cx="4773168" cy="0"/>
-                  </a:xfrm>
-                  <a:prstGeom prst="line">
-                    <a:avLst/>
-                  </a:prstGeom>
-                  <a:ln w="38100">
-                    <a:solidFill>
-                      <a:schemeClr val="tx1"/>
-                    </a:solidFill>
-                  </a:ln>
-                </p:spPr>
-                <p:style>
-                  <a:lnRef idx="1">
-                    <a:schemeClr val="accent1"/>
-                  </a:lnRef>
-                  <a:fillRef idx="0">
-                    <a:schemeClr val="accent1"/>
-                  </a:fillRef>
-                  <a:effectRef idx="0">
-                    <a:schemeClr val="accent1"/>
-                  </a:effectRef>
-                  <a:fontRef idx="minor">
-                    <a:schemeClr val="tx1"/>
-                  </a:fontRef>
-                </p:style>
-              </p:cxnSp>
-              <p:cxnSp>
-                <p:nvCxnSpPr>
-                  <p:cNvPr id="9" name="直線コネクタ 8"/>
-                  <p:cNvCxnSpPr/>
-                  <p:nvPr/>
-                </p:nvCxnSpPr>
-                <p:spPr>
-                  <a:xfrm>
-                    <a:off x="3730752" y="1190244"/>
-                    <a:ext cx="4773168" cy="0"/>
-                  </a:xfrm>
-                  <a:prstGeom prst="line">
-                    <a:avLst/>
-                  </a:prstGeom>
-                  <a:ln w="38100">
-                    <a:solidFill>
-                      <a:schemeClr val="tx1"/>
-                    </a:solidFill>
-                  </a:ln>
-                </p:spPr>
-                <p:style>
-                  <a:lnRef idx="1">
-                    <a:schemeClr val="accent1"/>
-                  </a:lnRef>
-                  <a:fillRef idx="0">
-                    <a:schemeClr val="accent1"/>
-                  </a:fillRef>
-                  <a:effectRef idx="0">
-                    <a:schemeClr val="accent1"/>
-                  </a:effectRef>
-                  <a:fontRef idx="minor">
-                    <a:schemeClr val="tx1"/>
-                  </a:fontRef>
-                </p:style>
-              </p:cxnSp>
-              <p:cxnSp>
-                <p:nvCxnSpPr>
-                  <p:cNvPr id="10" name="直線コネクタ 9"/>
-                  <p:cNvCxnSpPr/>
-                  <p:nvPr/>
-                </p:nvCxnSpPr>
-                <p:spPr>
-                  <a:xfrm>
-                    <a:off x="3730752" y="1562100"/>
-                    <a:ext cx="4773168" cy="0"/>
-                  </a:xfrm>
-                  <a:prstGeom prst="line">
-                    <a:avLst/>
-                  </a:prstGeom>
-                  <a:ln w="38100">
-                    <a:solidFill>
-                      <a:schemeClr val="tx1"/>
-                    </a:solidFill>
-                  </a:ln>
-                </p:spPr>
-                <p:style>
-                  <a:lnRef idx="1">
-                    <a:schemeClr val="accent1"/>
-                  </a:lnRef>
-                  <a:fillRef idx="0">
-                    <a:schemeClr val="accent1"/>
-                  </a:fillRef>
-                  <a:effectRef idx="0">
-                    <a:schemeClr val="accent1"/>
-                  </a:effectRef>
-                  <a:fontRef idx="minor">
-                    <a:schemeClr val="tx1"/>
-                  </a:fontRef>
-                </p:style>
-              </p:cxnSp>
-              <p:cxnSp>
-                <p:nvCxnSpPr>
-                  <p:cNvPr id="11" name="直線コネクタ 10"/>
-                  <p:cNvCxnSpPr/>
-                  <p:nvPr/>
-                </p:nvCxnSpPr>
-                <p:spPr>
-                  <a:xfrm>
-                    <a:off x="3730752" y="1919336"/>
-                    <a:ext cx="4773168" cy="0"/>
-                  </a:xfrm>
-                  <a:prstGeom prst="line">
-                    <a:avLst/>
-                  </a:prstGeom>
-                  <a:ln w="38100">
-                    <a:solidFill>
-                      <a:schemeClr val="tx1"/>
-                    </a:solidFill>
-                  </a:ln>
-                </p:spPr>
-                <p:style>
-                  <a:lnRef idx="1">
-                    <a:schemeClr val="accent1"/>
-                  </a:lnRef>
-                  <a:fillRef idx="0">
-                    <a:schemeClr val="accent1"/>
-                  </a:fillRef>
-                  <a:effectRef idx="0">
-                    <a:schemeClr val="accent1"/>
-                  </a:effectRef>
-                  <a:fontRef idx="minor">
-                    <a:schemeClr val="tx1"/>
-                  </a:fontRef>
-                </p:style>
-              </p:cxnSp>
-              <p:cxnSp>
-                <p:nvCxnSpPr>
-                  <p:cNvPr id="12" name="直線コネクタ 11"/>
-                  <p:cNvCxnSpPr/>
-                  <p:nvPr/>
-                </p:nvCxnSpPr>
-                <p:spPr>
-                  <a:xfrm>
-                    <a:off x="3730752" y="2346056"/>
-                    <a:ext cx="4773168" cy="0"/>
-                  </a:xfrm>
-                  <a:prstGeom prst="line">
-                    <a:avLst/>
-                  </a:prstGeom>
-                  <a:ln w="38100">
-                    <a:solidFill>
-                      <a:schemeClr val="tx1"/>
-                    </a:solidFill>
-                  </a:ln>
-                </p:spPr>
-                <p:style>
-                  <a:lnRef idx="1">
-                    <a:schemeClr val="accent1"/>
-                  </a:lnRef>
-                  <a:fillRef idx="0">
-                    <a:schemeClr val="accent1"/>
-                  </a:fillRef>
-                  <a:effectRef idx="0">
-                    <a:schemeClr val="accent1"/>
-                  </a:effectRef>
-                  <a:fontRef idx="minor">
-                    <a:schemeClr val="tx1"/>
-                  </a:fontRef>
-                </p:style>
-              </p:cxnSp>
-              <p:cxnSp>
-                <p:nvCxnSpPr>
-                  <p:cNvPr id="13" name="直線コネクタ 12"/>
-                  <p:cNvCxnSpPr/>
-                  <p:nvPr/>
-                </p:nvCxnSpPr>
-                <p:spPr>
-                  <a:xfrm>
-                    <a:off x="3730752" y="2717912"/>
-                    <a:ext cx="4773168" cy="0"/>
-                  </a:xfrm>
-                  <a:prstGeom prst="line">
-                    <a:avLst/>
-                  </a:prstGeom>
-                  <a:ln w="38100">
-                    <a:solidFill>
-                      <a:schemeClr val="tx1"/>
-                    </a:solidFill>
-                  </a:ln>
-                </p:spPr>
-                <p:style>
-                  <a:lnRef idx="1">
-                    <a:schemeClr val="accent1"/>
-                  </a:lnRef>
-                  <a:fillRef idx="0">
-                    <a:schemeClr val="accent1"/>
-                  </a:fillRef>
-                  <a:effectRef idx="0">
-                    <a:schemeClr val="accent1"/>
-                  </a:effectRef>
-                  <a:fontRef idx="minor">
-                    <a:schemeClr val="tx1"/>
-                  </a:fontRef>
-                </p:style>
-              </p:cxnSp>
-              <p:cxnSp>
-                <p:nvCxnSpPr>
-                  <p:cNvPr id="14" name="直線コネクタ 13"/>
-                  <p:cNvCxnSpPr/>
-                  <p:nvPr/>
-                </p:nvCxnSpPr>
-                <p:spPr>
-                  <a:xfrm>
-                    <a:off x="3730752" y="3125049"/>
-                    <a:ext cx="4773168" cy="0"/>
-                  </a:xfrm>
-                  <a:prstGeom prst="line">
-                    <a:avLst/>
-                  </a:prstGeom>
-                  <a:ln w="38100">
-                    <a:solidFill>
-                      <a:schemeClr val="tx1"/>
-                    </a:solidFill>
-                  </a:ln>
-                </p:spPr>
-                <p:style>
-                  <a:lnRef idx="1">
-                    <a:schemeClr val="accent1"/>
-                  </a:lnRef>
-                  <a:fillRef idx="0">
-                    <a:schemeClr val="accent1"/>
-                  </a:fillRef>
-                  <a:effectRef idx="0">
-                    <a:schemeClr val="accent1"/>
-                  </a:effectRef>
-                  <a:fontRef idx="minor">
-                    <a:schemeClr val="tx1"/>
-                  </a:fontRef>
-                </p:style>
-              </p:cxnSp>
-              <p:cxnSp>
-                <p:nvCxnSpPr>
-                  <p:cNvPr id="15" name="直線コネクタ 14"/>
-                  <p:cNvCxnSpPr/>
-                  <p:nvPr/>
-                </p:nvCxnSpPr>
-                <p:spPr>
-                  <a:xfrm>
-                    <a:off x="3730752" y="3535584"/>
-                    <a:ext cx="4773168" cy="0"/>
-                  </a:xfrm>
-                  <a:prstGeom prst="line">
-                    <a:avLst/>
-                  </a:prstGeom>
-                  <a:ln w="38100">
-                    <a:solidFill>
-                      <a:schemeClr val="tx1"/>
-                    </a:solidFill>
-                  </a:ln>
-                </p:spPr>
-                <p:style>
-                  <a:lnRef idx="1">
-                    <a:schemeClr val="accent1"/>
-                  </a:lnRef>
-                  <a:fillRef idx="0">
-                    <a:schemeClr val="accent1"/>
-                  </a:fillRef>
-                  <a:effectRef idx="0">
-                    <a:schemeClr val="accent1"/>
-                  </a:effectRef>
-                  <a:fontRef idx="minor">
-                    <a:schemeClr val="tx1"/>
-                  </a:fontRef>
-                </p:style>
-              </p:cxnSp>
-              <p:cxnSp>
-                <p:nvCxnSpPr>
-                  <p:cNvPr id="16" name="直線コネクタ 15"/>
-                  <p:cNvCxnSpPr/>
-                  <p:nvPr/>
-                </p:nvCxnSpPr>
-                <p:spPr>
-                  <a:xfrm>
-                    <a:off x="3730752" y="3923625"/>
-                    <a:ext cx="4773168" cy="0"/>
-                  </a:xfrm>
-                  <a:prstGeom prst="line">
-                    <a:avLst/>
-                  </a:prstGeom>
-                  <a:ln w="38100">
-                    <a:solidFill>
-                      <a:schemeClr val="tx1"/>
-                    </a:solidFill>
-                  </a:ln>
-                </p:spPr>
-                <p:style>
-                  <a:lnRef idx="1">
-                    <a:schemeClr val="accent1"/>
-                  </a:lnRef>
-                  <a:fillRef idx="0">
-                    <a:schemeClr val="accent1"/>
-                  </a:fillRef>
-                  <a:effectRef idx="0">
-                    <a:schemeClr val="accent1"/>
-                  </a:effectRef>
-                  <a:fontRef idx="minor">
-                    <a:schemeClr val="tx1"/>
-                  </a:fontRef>
-                </p:style>
-              </p:cxnSp>
-              <p:cxnSp>
-                <p:nvCxnSpPr>
-                  <p:cNvPr id="17" name="直線コネクタ 16"/>
-                  <p:cNvCxnSpPr/>
-                  <p:nvPr/>
-                </p:nvCxnSpPr>
-                <p:spPr>
-                  <a:xfrm>
-                    <a:off x="3730752" y="4280861"/>
-                    <a:ext cx="4773168" cy="0"/>
-                  </a:xfrm>
-                  <a:prstGeom prst="line">
-                    <a:avLst/>
-                  </a:prstGeom>
-                  <a:ln w="38100">
-                    <a:solidFill>
-                      <a:schemeClr val="tx1"/>
-                    </a:solidFill>
-                  </a:ln>
-                </p:spPr>
-                <p:style>
-                  <a:lnRef idx="1">
-                    <a:schemeClr val="accent1"/>
-                  </a:lnRef>
-                  <a:fillRef idx="0">
-                    <a:schemeClr val="accent1"/>
-                  </a:fillRef>
-                  <a:effectRef idx="0">
-                    <a:schemeClr val="accent1"/>
-                  </a:effectRef>
-                  <a:fontRef idx="minor">
-                    <a:schemeClr val="tx1"/>
-                  </a:fontRef>
-                </p:style>
-              </p:cxnSp>
-              <p:cxnSp>
-                <p:nvCxnSpPr>
-                  <p:cNvPr id="18" name="直線コネクタ 17"/>
-                  <p:cNvCxnSpPr/>
-                  <p:nvPr/>
-                </p:nvCxnSpPr>
-                <p:spPr>
-                  <a:xfrm>
-                    <a:off x="3730752" y="4707581"/>
-                    <a:ext cx="4773168" cy="0"/>
-                  </a:xfrm>
-                  <a:prstGeom prst="line">
-                    <a:avLst/>
-                  </a:prstGeom>
-                  <a:ln w="38100">
-                    <a:solidFill>
-                      <a:schemeClr val="tx1"/>
-                    </a:solidFill>
-                  </a:ln>
-                </p:spPr>
-                <p:style>
-                  <a:lnRef idx="1">
-                    <a:schemeClr val="accent1"/>
-                  </a:lnRef>
-                  <a:fillRef idx="0">
-                    <a:schemeClr val="accent1"/>
-                  </a:fillRef>
-                  <a:effectRef idx="0">
-                    <a:schemeClr val="accent1"/>
-                  </a:effectRef>
-                  <a:fontRef idx="minor">
-                    <a:schemeClr val="tx1"/>
-                  </a:fontRef>
-                </p:style>
-              </p:cxnSp>
-              <p:cxnSp>
-                <p:nvCxnSpPr>
-                  <p:cNvPr id="19" name="直線コネクタ 18"/>
-                  <p:cNvCxnSpPr/>
-                  <p:nvPr/>
-                </p:nvCxnSpPr>
-                <p:spPr>
-                  <a:xfrm>
-                    <a:off x="3730752" y="5079437"/>
-                    <a:ext cx="4773168" cy="0"/>
-                  </a:xfrm>
-                  <a:prstGeom prst="line">
-                    <a:avLst/>
-                  </a:prstGeom>
-                  <a:ln w="38100">
-                    <a:solidFill>
-                      <a:schemeClr val="tx1"/>
-                    </a:solidFill>
-                  </a:ln>
-                </p:spPr>
-                <p:style>
-                  <a:lnRef idx="1">
-                    <a:schemeClr val="accent1"/>
-                  </a:lnRef>
-                  <a:fillRef idx="0">
-                    <a:schemeClr val="accent1"/>
-                  </a:fillRef>
-                  <a:effectRef idx="0">
-                    <a:schemeClr val="accent1"/>
-                  </a:effectRef>
-                  <a:fontRef idx="minor">
-                    <a:schemeClr val="tx1"/>
-                  </a:fontRef>
-                </p:style>
-              </p:cxnSp>
-              <p:cxnSp>
-                <p:nvCxnSpPr>
-                  <p:cNvPr id="20" name="直線コネクタ 19"/>
-                  <p:cNvCxnSpPr/>
-                  <p:nvPr/>
-                </p:nvCxnSpPr>
-                <p:spPr>
-                  <a:xfrm>
-                    <a:off x="3730752" y="5493318"/>
-                    <a:ext cx="4773168" cy="0"/>
-                  </a:xfrm>
-                  <a:prstGeom prst="line">
-                    <a:avLst/>
-                  </a:prstGeom>
-                  <a:ln w="38100">
-                    <a:solidFill>
-                      <a:schemeClr val="tx1"/>
-                    </a:solidFill>
-                  </a:ln>
-                </p:spPr>
-                <p:style>
-                  <a:lnRef idx="1">
-                    <a:schemeClr val="accent1"/>
-                  </a:lnRef>
-                  <a:fillRef idx="0">
-                    <a:schemeClr val="accent1"/>
-                  </a:fillRef>
-                  <a:effectRef idx="0">
-                    <a:schemeClr val="accent1"/>
-                  </a:effectRef>
-                  <a:fontRef idx="minor">
-                    <a:schemeClr val="tx1"/>
-                  </a:fontRef>
-                </p:style>
-              </p:cxnSp>
-              <p:cxnSp>
-                <p:nvCxnSpPr>
-                  <p:cNvPr id="21" name="直線コネクタ 20"/>
-                  <p:cNvCxnSpPr/>
-                  <p:nvPr/>
-                </p:nvCxnSpPr>
-                <p:spPr>
-                  <a:xfrm>
-                    <a:off x="3730752" y="5920038"/>
-                    <a:ext cx="4773168" cy="0"/>
-                  </a:xfrm>
-                  <a:prstGeom prst="line">
-                    <a:avLst/>
-                  </a:prstGeom>
-                  <a:ln w="38100">
-                    <a:solidFill>
-                      <a:schemeClr val="tx1"/>
-                    </a:solidFill>
-                  </a:ln>
-                </p:spPr>
-                <p:style>
-                  <a:lnRef idx="1">
-                    <a:schemeClr val="accent1"/>
-                  </a:lnRef>
-                  <a:fillRef idx="0">
-                    <a:schemeClr val="accent1"/>
-                  </a:fillRef>
-                  <a:effectRef idx="0">
-                    <a:schemeClr val="accent1"/>
-                  </a:effectRef>
-                  <a:fontRef idx="minor">
-                    <a:schemeClr val="tx1"/>
-                  </a:fontRef>
-                </p:style>
-              </p:cxnSp>
-              <p:cxnSp>
-                <p:nvCxnSpPr>
-                  <p:cNvPr id="22" name="直線コネクタ 21"/>
-                  <p:cNvCxnSpPr/>
-                  <p:nvPr/>
-                </p:nvCxnSpPr>
-                <p:spPr>
-                  <a:xfrm>
-                    <a:off x="3730752" y="6291894"/>
-                    <a:ext cx="4773168" cy="0"/>
-                  </a:xfrm>
-                  <a:prstGeom prst="line">
-                    <a:avLst/>
-                  </a:prstGeom>
-                  <a:ln w="38100">
-                    <a:solidFill>
-                      <a:schemeClr val="tx1"/>
-                    </a:solidFill>
-                  </a:ln>
-                </p:spPr>
-                <p:style>
-                  <a:lnRef idx="1">
-                    <a:schemeClr val="accent1"/>
-                  </a:lnRef>
-                  <a:fillRef idx="0">
-                    <a:schemeClr val="accent1"/>
-                  </a:fillRef>
-                  <a:effectRef idx="0">
-                    <a:schemeClr val="accent1"/>
-                  </a:effectRef>
-                  <a:fontRef idx="minor">
-                    <a:schemeClr val="tx1"/>
-                  </a:fontRef>
-                </p:style>
-              </p:cxnSp>
-              <p:pic>
-                <p:nvPicPr>
-                  <p:cNvPr id="4" name="図 3"/>
-                  <p:cNvPicPr>
-                    <a:picLocks noChangeAspect="1"/>
-                  </p:cNvPicPr>
-                  <p:nvPr/>
-                </p:nvPicPr>
-                <p:blipFill rotWithShape="1">
-                  <a:blip r:embed="rId2">
-                    <a:extLst>
-                      <a:ext uri="{28A0092B-C50C-407E-A947-70E740481C1C}">
-                        <a14:useLocalDpi xmlns:a14="http://schemas.microsoft.com/office/drawing/2010/main" val="0"/>
-                      </a:ext>
-                    </a:extLst>
-                  </a:blip>
-                  <a:srcRect l="4412" t="2626" r="4860" b="2362"/>
-                  <a:stretch/>
-                </p:blipFill>
-                <p:spPr>
-                  <a:xfrm>
-                    <a:off x="4428000" y="180000"/>
-                    <a:ext cx="3312000" cy="6516000"/>
-                  </a:xfrm>
-                  <a:prstGeom prst="rect">
-                    <a:avLst/>
-                  </a:prstGeom>
-                </p:spPr>
-              </p:pic>
               <p:sp>
                 <p:nvSpPr>
-                  <p:cNvPr id="26" name="テキスト ボックス 25"/>
+                  <p:cNvPr id="52" name="テキスト ボックス 51"/>
                   <p:cNvSpPr txBox="1"/>
                   <p:nvPr/>
                 </p:nvSpPr>
                 <p:spPr>
                   <a:xfrm>
-                    <a:off x="8503920" y="2192167"/>
-                    <a:ext cx="1420421" cy="307777"/>
-                  </a:xfrm>
-                  <a:prstGeom prst="rect">
-                    <a:avLst/>
-                  </a:prstGeom>
-                  <a:ln>
-                    <a:solidFill>
-                      <a:schemeClr val="bg1"/>
-                    </a:solidFill>
-                  </a:ln>
-                </p:spPr>
-                <p:style>
-                  <a:lnRef idx="2">
-                    <a:schemeClr val="accent1">
-                      <a:shade val="50000"/>
-                    </a:schemeClr>
-                  </a:lnRef>
-                  <a:fillRef idx="1">
-                    <a:schemeClr val="accent1"/>
-                  </a:fillRef>
-                  <a:effectRef idx="0">
-                    <a:schemeClr val="accent1"/>
-                  </a:effectRef>
-                  <a:fontRef idx="minor">
-                    <a:schemeClr val="lt1"/>
-                  </a:fontRef>
-                </p:style>
-                <p:txBody>
-                  <a:bodyPr wrap="square" rtlCol="0">
-                    <a:spAutoFit/>
-                  </a:bodyPr>
-                  <a:lstStyle/>
-                  <a:p>
-                    <a:pPr algn="ctr"/>
-                    <a:r>
-                      <a:rPr kumimoji="1" lang="en-US" altLang="ja-JP" sz="1400" dirty="0" smtClean="0"/>
-                      <a:t>SDA0 (2-800KHz)</a:t>
-                    </a:r>
-                    <a:endParaRPr kumimoji="1" lang="ja-JP" altLang="en-US" sz="1400" dirty="0"/>
-                  </a:p>
-                </p:txBody>
-              </p:sp>
-              <p:sp>
-                <p:nvSpPr>
-                  <p:cNvPr id="27" name="テキスト ボックス 26"/>
-                  <p:cNvSpPr txBox="1"/>
-                  <p:nvPr/>
-                </p:nvSpPr>
-                <p:spPr>
-                  <a:xfrm>
-                    <a:off x="8503920" y="2609734"/>
-                    <a:ext cx="1420421" cy="307777"/>
-                  </a:xfrm>
-                  <a:prstGeom prst="rect">
-                    <a:avLst/>
-                  </a:prstGeom>
-                  <a:ln>
-                    <a:solidFill>
-                      <a:schemeClr val="bg1"/>
-                    </a:solidFill>
-                  </a:ln>
-                </p:spPr>
-                <p:style>
-                  <a:lnRef idx="2">
-                    <a:schemeClr val="accent1">
-                      <a:shade val="50000"/>
-                    </a:schemeClr>
-                  </a:lnRef>
-                  <a:fillRef idx="1">
-                    <a:schemeClr val="accent1"/>
-                  </a:fillRef>
-                  <a:effectRef idx="0">
-                    <a:schemeClr val="accent1"/>
-                  </a:effectRef>
-                  <a:fontRef idx="minor">
-                    <a:schemeClr val="lt1"/>
-                  </a:fontRef>
-                </p:style>
-                <p:txBody>
-                  <a:bodyPr wrap="square" rtlCol="0">
-                    <a:spAutoFit/>
-                  </a:bodyPr>
-                  <a:lstStyle/>
-                  <a:p>
-                    <a:pPr algn="ctr"/>
-                    <a:r>
-                      <a:rPr kumimoji="1" lang="en-US" altLang="ja-JP" sz="1400" dirty="0" smtClean="0"/>
-                      <a:t>SCL0 (2-800KHz)</a:t>
-                    </a:r>
-                    <a:endParaRPr kumimoji="1" lang="ja-JP" altLang="en-US" sz="1400" dirty="0"/>
-                  </a:p>
-                </p:txBody>
-              </p:sp>
-              <p:sp>
-                <p:nvSpPr>
-                  <p:cNvPr id="28" name="テキスト ボックス 27"/>
-                  <p:cNvSpPr txBox="1"/>
-                  <p:nvPr/>
-                </p:nvSpPr>
-                <p:spPr>
-                  <a:xfrm rot="16200000">
-                    <a:off x="9720125" y="2396383"/>
-                    <a:ext cx="716209" cy="307777"/>
-                  </a:xfrm>
-                  <a:prstGeom prst="rect">
-                    <a:avLst/>
-                  </a:prstGeom>
-                  <a:ln>
-                    <a:solidFill>
-                      <a:schemeClr val="bg1"/>
-                    </a:solidFill>
-                  </a:ln>
-                </p:spPr>
-                <p:style>
-                  <a:lnRef idx="2">
-                    <a:schemeClr val="accent1">
-                      <a:shade val="50000"/>
-                    </a:schemeClr>
-                  </a:lnRef>
-                  <a:fillRef idx="1">
-                    <a:schemeClr val="accent1"/>
-                  </a:fillRef>
-                  <a:effectRef idx="0">
-                    <a:schemeClr val="accent1"/>
-                  </a:effectRef>
-                  <a:fontRef idx="minor">
-                    <a:schemeClr val="lt1"/>
-                  </a:fontRef>
-                </p:style>
-                <p:txBody>
-                  <a:bodyPr wrap="square" rtlCol="0">
-                    <a:spAutoFit/>
-                  </a:bodyPr>
-                  <a:lstStyle/>
-                  <a:p>
-                    <a:pPr algn="ctr"/>
-                    <a:r>
-                      <a:rPr kumimoji="1" lang="en-US" altLang="ja-JP" sz="1400" dirty="0" smtClean="0"/>
-                      <a:t>I2C0</a:t>
-                    </a:r>
-                  </a:p>
-                </p:txBody>
-              </p:sp>
-              <p:sp>
-                <p:nvSpPr>
-                  <p:cNvPr id="36" name="テキスト ボックス 35"/>
-                  <p:cNvSpPr txBox="1"/>
-                  <p:nvPr/>
-                </p:nvSpPr>
-                <p:spPr>
-                  <a:xfrm>
-                    <a:off x="2353052" y="1404895"/>
-                    <a:ext cx="1377696" cy="307777"/>
-                  </a:xfrm>
-                  <a:prstGeom prst="rect">
-                    <a:avLst/>
-                  </a:prstGeom>
-                  <a:ln>
-                    <a:solidFill>
-                      <a:schemeClr val="bg1"/>
-                    </a:solidFill>
-                  </a:ln>
-                </p:spPr>
-                <p:style>
-                  <a:lnRef idx="2">
-                    <a:schemeClr val="accent6">
-                      <a:shade val="50000"/>
-                    </a:schemeClr>
-                  </a:lnRef>
-                  <a:fillRef idx="1">
-                    <a:schemeClr val="accent6"/>
-                  </a:fillRef>
-                  <a:effectRef idx="0">
-                    <a:schemeClr val="accent6"/>
-                  </a:effectRef>
-                  <a:fontRef idx="minor">
-                    <a:schemeClr val="lt1"/>
-                  </a:fontRef>
-                </p:style>
-                <p:txBody>
-                  <a:bodyPr wrap="square" rtlCol="0">
-                    <a:spAutoFit/>
-                  </a:bodyPr>
-                  <a:lstStyle/>
-                  <a:p>
-                    <a:pPr algn="ctr"/>
-                    <a:r>
-                      <a:rPr kumimoji="1" lang="en-US" altLang="ja-JP" sz="1400" dirty="0" smtClean="0"/>
-                      <a:t>CS</a:t>
-                    </a:r>
-                    <a:endParaRPr kumimoji="1" lang="ja-JP" altLang="en-US" sz="1400" dirty="0"/>
-                  </a:p>
-                </p:txBody>
-              </p:sp>
-              <p:sp>
-                <p:nvSpPr>
-                  <p:cNvPr id="37" name="テキスト ボックス 36"/>
-                  <p:cNvSpPr txBox="1"/>
-                  <p:nvPr/>
-                </p:nvSpPr>
-                <p:spPr>
-                  <a:xfrm>
-                    <a:off x="2353056" y="1796215"/>
-                    <a:ext cx="1377696" cy="307777"/>
-                  </a:xfrm>
-                  <a:prstGeom prst="rect">
-                    <a:avLst/>
-                  </a:prstGeom>
-                  <a:ln>
-                    <a:solidFill>
-                      <a:schemeClr val="bg1"/>
-                    </a:solidFill>
-                  </a:ln>
-                </p:spPr>
-                <p:style>
-                  <a:lnRef idx="2">
-                    <a:schemeClr val="accent6">
-                      <a:shade val="50000"/>
-                    </a:schemeClr>
-                  </a:lnRef>
-                  <a:fillRef idx="1">
-                    <a:schemeClr val="accent6"/>
-                  </a:fillRef>
-                  <a:effectRef idx="0">
-                    <a:schemeClr val="accent6"/>
-                  </a:effectRef>
-                  <a:fontRef idx="minor">
-                    <a:schemeClr val="lt1"/>
-                  </a:fontRef>
-                </p:style>
-                <p:txBody>
-                  <a:bodyPr wrap="square" rtlCol="0">
-                    <a:spAutoFit/>
-                  </a:bodyPr>
-                  <a:lstStyle/>
-                  <a:p>
-                    <a:pPr algn="ctr"/>
-                    <a:r>
-                      <a:rPr kumimoji="1" lang="en-US" altLang="ja-JP" sz="1400" dirty="0" smtClean="0"/>
-                      <a:t>MISO</a:t>
-                    </a:r>
-                    <a:endParaRPr kumimoji="1" lang="ja-JP" altLang="en-US" sz="1400" dirty="0"/>
-                  </a:p>
-                </p:txBody>
-              </p:sp>
-              <p:sp>
-                <p:nvSpPr>
-                  <p:cNvPr id="38" name="テキスト ボックス 37"/>
-                  <p:cNvSpPr txBox="1"/>
-                  <p:nvPr/>
-                </p:nvSpPr>
-                <p:spPr>
-                  <a:xfrm>
-                    <a:off x="2353056" y="2192336"/>
-                    <a:ext cx="1377696" cy="307777"/>
-                  </a:xfrm>
-                  <a:prstGeom prst="rect">
-                    <a:avLst/>
-                  </a:prstGeom>
-                  <a:ln>
-                    <a:solidFill>
-                      <a:schemeClr val="bg1"/>
-                    </a:solidFill>
-                  </a:ln>
-                </p:spPr>
-                <p:style>
-                  <a:lnRef idx="2">
-                    <a:schemeClr val="accent6">
-                      <a:shade val="50000"/>
-                    </a:schemeClr>
-                  </a:lnRef>
-                  <a:fillRef idx="1">
-                    <a:schemeClr val="accent6"/>
-                  </a:fillRef>
-                  <a:effectRef idx="0">
-                    <a:schemeClr val="accent6"/>
-                  </a:effectRef>
-                  <a:fontRef idx="minor">
-                    <a:schemeClr val="lt1"/>
-                  </a:fontRef>
-                </p:style>
-                <p:txBody>
-                  <a:bodyPr wrap="square" rtlCol="0">
-                    <a:spAutoFit/>
-                  </a:bodyPr>
-                  <a:lstStyle/>
-                  <a:p>
-                    <a:pPr algn="ctr"/>
-                    <a:r>
-                      <a:rPr lang="en-US" altLang="ja-JP" sz="1400" dirty="0" smtClean="0"/>
-                      <a:t>MOSI</a:t>
-                    </a:r>
-                    <a:endParaRPr kumimoji="1" lang="ja-JP" altLang="en-US" sz="1400" dirty="0"/>
-                  </a:p>
-                </p:txBody>
-              </p:sp>
-              <p:sp>
-                <p:nvSpPr>
-                  <p:cNvPr id="39" name="テキスト ボックス 38"/>
-                  <p:cNvSpPr txBox="1"/>
-                  <p:nvPr/>
-                </p:nvSpPr>
-                <p:spPr>
-                  <a:xfrm>
-                    <a:off x="2353056" y="2600599"/>
-                    <a:ext cx="1377696" cy="307777"/>
-                  </a:xfrm>
-                  <a:prstGeom prst="rect">
-                    <a:avLst/>
-                  </a:prstGeom>
-                  <a:ln>
-                    <a:solidFill>
-                      <a:schemeClr val="bg1"/>
-                    </a:solidFill>
-                  </a:ln>
-                </p:spPr>
-                <p:style>
-                  <a:lnRef idx="2">
-                    <a:schemeClr val="accent6">
-                      <a:shade val="50000"/>
-                    </a:schemeClr>
-                  </a:lnRef>
-                  <a:fillRef idx="1">
-                    <a:schemeClr val="accent6"/>
-                  </a:fillRef>
-                  <a:effectRef idx="0">
-                    <a:schemeClr val="accent6"/>
-                  </a:effectRef>
-                  <a:fontRef idx="minor">
-                    <a:schemeClr val="lt1"/>
-                  </a:fontRef>
-                </p:style>
-                <p:txBody>
-                  <a:bodyPr wrap="square" rtlCol="0">
-                    <a:spAutoFit/>
-                  </a:bodyPr>
-                  <a:lstStyle/>
-                  <a:p>
-                    <a:pPr algn="ctr"/>
-                    <a:r>
-                      <a:rPr lang="en-US" altLang="ja-JP" sz="1400" dirty="0" smtClean="0"/>
-                      <a:t>SCK</a:t>
-                    </a:r>
-                    <a:endParaRPr kumimoji="1" lang="ja-JP" altLang="en-US" sz="1400" dirty="0"/>
-                  </a:p>
-                </p:txBody>
-              </p:sp>
-              <p:sp>
-                <p:nvSpPr>
-                  <p:cNvPr id="40" name="テキスト ボックス 39"/>
-                  <p:cNvSpPr txBox="1"/>
-                  <p:nvPr/>
-                </p:nvSpPr>
-                <p:spPr>
-                  <a:xfrm rot="5400000">
-                    <a:off x="1447981" y="2002193"/>
-                    <a:ext cx="1502372" cy="307777"/>
-                  </a:xfrm>
-                  <a:prstGeom prst="rect">
-                    <a:avLst/>
-                  </a:prstGeom>
-                  <a:ln>
-                    <a:solidFill>
-                      <a:schemeClr val="bg1"/>
-                    </a:solidFill>
-                  </a:ln>
-                </p:spPr>
-                <p:style>
-                  <a:lnRef idx="2">
-                    <a:schemeClr val="accent6">
-                      <a:shade val="50000"/>
-                    </a:schemeClr>
-                  </a:lnRef>
-                  <a:fillRef idx="1">
-                    <a:schemeClr val="accent6"/>
-                  </a:fillRef>
-                  <a:effectRef idx="0">
-                    <a:schemeClr val="accent6"/>
-                  </a:effectRef>
-                  <a:fontRef idx="minor">
-                    <a:schemeClr val="lt1"/>
-                  </a:fontRef>
-                </p:style>
-                <p:txBody>
-                  <a:bodyPr wrap="square" rtlCol="0">
-                    <a:spAutoFit/>
-                  </a:bodyPr>
-                  <a:lstStyle/>
-                  <a:p>
-                    <a:pPr algn="ctr"/>
-                    <a:r>
-                      <a:rPr kumimoji="1" lang="en-US" altLang="ja-JP" sz="1400" dirty="0" smtClean="0"/>
-                      <a:t>SPI(1/2/4/8MHz)</a:t>
-                    </a:r>
-                    <a:endParaRPr kumimoji="1" lang="ja-JP" altLang="en-US" sz="1400" dirty="0"/>
-                  </a:p>
-                </p:txBody>
-              </p:sp>
-              <p:sp>
-                <p:nvSpPr>
-                  <p:cNvPr id="42" name="テキスト ボックス 41"/>
-                  <p:cNvSpPr txBox="1"/>
-                  <p:nvPr/>
-                </p:nvSpPr>
-                <p:spPr>
-                  <a:xfrm>
-                    <a:off x="2353052" y="2989832"/>
+                    <a:off x="2353052" y="6160189"/>
                     <a:ext cx="1377696" cy="307777"/>
                   </a:xfrm>
                   <a:prstGeom prst="rect">
@@ -8003,7 +6936,7 @@
                     <a:pPr algn="ctr"/>
                     <a:r>
                       <a:rPr kumimoji="1" lang="en-US" altLang="ja-JP" sz="1400" dirty="0" smtClean="0"/>
-                      <a:t>GPIO 00</a:t>
+                      <a:t>GPIO 10</a:t>
                     </a:r>
                     <a:endParaRPr kumimoji="1" lang="ja-JP" altLang="en-US" sz="1400" dirty="0"/>
                   </a:p>
@@ -8011,405 +6944,13 @@
               </p:sp>
               <p:sp>
                 <p:nvSpPr>
-                  <p:cNvPr id="43" name="テキスト ボックス 42"/>
+                  <p:cNvPr id="53" name="テキスト ボックス 52"/>
                   <p:cNvSpPr txBox="1"/>
                   <p:nvPr/>
                 </p:nvSpPr>
                 <p:spPr>
                   <a:xfrm>
-                    <a:off x="2353052" y="3388292"/>
-                    <a:ext cx="1377696" cy="307777"/>
-                  </a:xfrm>
-                  <a:prstGeom prst="rect">
-                    <a:avLst/>
-                  </a:prstGeom>
-                  <a:ln>
-                    <a:solidFill>
-                      <a:schemeClr val="bg1"/>
-                    </a:solidFill>
-                  </a:ln>
-                </p:spPr>
-                <p:style>
-                  <a:lnRef idx="1">
-                    <a:schemeClr val="accent4"/>
-                  </a:lnRef>
-                  <a:fillRef idx="2">
-                    <a:schemeClr val="accent4"/>
-                  </a:fillRef>
-                  <a:effectRef idx="1">
-                    <a:schemeClr val="accent4"/>
-                  </a:effectRef>
-                  <a:fontRef idx="minor">
-                    <a:schemeClr val="dk1"/>
-                  </a:fontRef>
-                </p:style>
-                <p:txBody>
-                  <a:bodyPr wrap="square" rtlCol="0">
-                    <a:spAutoFit/>
-                  </a:bodyPr>
-                  <a:lstStyle/>
-                  <a:p>
-                    <a:pPr algn="ctr"/>
-                    <a:r>
-                      <a:rPr kumimoji="1" lang="en-US" altLang="ja-JP" sz="1400" dirty="0" smtClean="0"/>
-                      <a:t>GPIO 01</a:t>
-                    </a:r>
-                    <a:endParaRPr kumimoji="1" lang="ja-JP" altLang="en-US" sz="1400" dirty="0"/>
-                  </a:p>
-                </p:txBody>
-              </p:sp>
-              <p:sp>
-                <p:nvSpPr>
-                  <p:cNvPr id="44" name="テキスト ボックス 43"/>
-                  <p:cNvSpPr txBox="1"/>
-                  <p:nvPr/>
-                </p:nvSpPr>
-                <p:spPr>
-                  <a:xfrm>
-                    <a:off x="2353052" y="3774056"/>
-                    <a:ext cx="1377696" cy="307777"/>
-                  </a:xfrm>
-                  <a:prstGeom prst="rect">
-                    <a:avLst/>
-                  </a:prstGeom>
-                  <a:ln>
-                    <a:solidFill>
-                      <a:schemeClr val="bg1"/>
-                    </a:solidFill>
-                  </a:ln>
-                </p:spPr>
-                <p:style>
-                  <a:lnRef idx="1">
-                    <a:schemeClr val="accent4"/>
-                  </a:lnRef>
-                  <a:fillRef idx="2">
-                    <a:schemeClr val="accent4"/>
-                  </a:fillRef>
-                  <a:effectRef idx="1">
-                    <a:schemeClr val="accent4"/>
-                  </a:effectRef>
-                  <a:fontRef idx="minor">
-                    <a:schemeClr val="dk1"/>
-                  </a:fontRef>
-                </p:style>
-                <p:txBody>
-                  <a:bodyPr wrap="square" rtlCol="0">
-                    <a:spAutoFit/>
-                  </a:bodyPr>
-                  <a:lstStyle/>
-                  <a:p>
-                    <a:pPr algn="ctr"/>
-                    <a:r>
-                      <a:rPr kumimoji="1" lang="en-US" altLang="ja-JP" sz="1400" dirty="0" smtClean="0"/>
-                      <a:t>GPIO 02</a:t>
-                    </a:r>
-                    <a:endParaRPr kumimoji="1" lang="ja-JP" altLang="en-US" sz="1400" dirty="0"/>
-                  </a:p>
-                </p:txBody>
-              </p:sp>
-              <p:sp>
-                <p:nvSpPr>
-                  <p:cNvPr id="45" name="テキスト ボックス 44"/>
-                  <p:cNvSpPr txBox="1"/>
-                  <p:nvPr/>
-                </p:nvSpPr>
-                <p:spPr>
-                  <a:xfrm>
-                    <a:off x="2353052" y="4167355"/>
-                    <a:ext cx="1377696" cy="307777"/>
-                  </a:xfrm>
-                  <a:prstGeom prst="rect">
-                    <a:avLst/>
-                  </a:prstGeom>
-                  <a:ln>
-                    <a:solidFill>
-                      <a:schemeClr val="bg1"/>
-                    </a:solidFill>
-                  </a:ln>
-                </p:spPr>
-                <p:style>
-                  <a:lnRef idx="1">
-                    <a:schemeClr val="accent4"/>
-                  </a:lnRef>
-                  <a:fillRef idx="2">
-                    <a:schemeClr val="accent4"/>
-                  </a:fillRef>
-                  <a:effectRef idx="1">
-                    <a:schemeClr val="accent4"/>
-                  </a:effectRef>
-                  <a:fontRef idx="minor">
-                    <a:schemeClr val="dk1"/>
-                  </a:fontRef>
-                </p:style>
-                <p:txBody>
-                  <a:bodyPr wrap="square" rtlCol="0">
-                    <a:spAutoFit/>
-                  </a:bodyPr>
-                  <a:lstStyle/>
-                  <a:p>
-                    <a:pPr algn="ctr"/>
-                    <a:r>
-                      <a:rPr kumimoji="1" lang="en-US" altLang="ja-JP" sz="1400" dirty="0" smtClean="0"/>
-                      <a:t>GPIO 03</a:t>
-                    </a:r>
-                    <a:endParaRPr kumimoji="1" lang="ja-JP" altLang="en-US" sz="1400" dirty="0"/>
-                  </a:p>
-                </p:txBody>
-              </p:sp>
-              <p:sp>
-                <p:nvSpPr>
-                  <p:cNvPr id="46" name="テキスト ボックス 45"/>
-                  <p:cNvSpPr txBox="1"/>
-                  <p:nvPr/>
-                </p:nvSpPr>
-                <p:spPr>
-                  <a:xfrm>
-                    <a:off x="2353052" y="4562317"/>
-                    <a:ext cx="1377696" cy="307777"/>
-                  </a:xfrm>
-                  <a:prstGeom prst="rect">
-                    <a:avLst/>
-                  </a:prstGeom>
-                  <a:ln>
-                    <a:solidFill>
-                      <a:schemeClr val="bg1"/>
-                    </a:solidFill>
-                  </a:ln>
-                </p:spPr>
-                <p:style>
-                  <a:lnRef idx="1">
-                    <a:schemeClr val="accent4"/>
-                  </a:lnRef>
-                  <a:fillRef idx="2">
-                    <a:schemeClr val="accent4"/>
-                  </a:fillRef>
-                  <a:effectRef idx="1">
-                    <a:schemeClr val="accent4"/>
-                  </a:effectRef>
-                  <a:fontRef idx="minor">
-                    <a:schemeClr val="dk1"/>
-                  </a:fontRef>
-                </p:style>
-                <p:txBody>
-                  <a:bodyPr wrap="square" rtlCol="0">
-                    <a:spAutoFit/>
-                  </a:bodyPr>
-                  <a:lstStyle/>
-                  <a:p>
-                    <a:pPr algn="ctr"/>
-                    <a:r>
-                      <a:rPr kumimoji="1" lang="en-US" altLang="ja-JP" sz="1400" dirty="0" smtClean="0"/>
-                      <a:t>GPIO 04</a:t>
-                    </a:r>
-                    <a:endParaRPr kumimoji="1" lang="ja-JP" altLang="en-US" sz="1400" dirty="0"/>
-                  </a:p>
-                </p:txBody>
-              </p:sp>
-              <p:sp>
-                <p:nvSpPr>
-                  <p:cNvPr id="47" name="テキスト ボックス 46"/>
-                  <p:cNvSpPr txBox="1"/>
-                  <p:nvPr/>
-                </p:nvSpPr>
-                <p:spPr>
-                  <a:xfrm>
-                    <a:off x="2353052" y="4965521"/>
-                    <a:ext cx="1377696" cy="307777"/>
-                  </a:xfrm>
-                  <a:prstGeom prst="rect">
-                    <a:avLst/>
-                  </a:prstGeom>
-                  <a:ln>
-                    <a:solidFill>
-                      <a:schemeClr val="bg1"/>
-                    </a:solidFill>
-                  </a:ln>
-                </p:spPr>
-                <p:style>
-                  <a:lnRef idx="1">
-                    <a:schemeClr val="accent4"/>
-                  </a:lnRef>
-                  <a:fillRef idx="2">
-                    <a:schemeClr val="accent4"/>
-                  </a:fillRef>
-                  <a:effectRef idx="1">
-                    <a:schemeClr val="accent4"/>
-                  </a:effectRef>
-                  <a:fontRef idx="minor">
-                    <a:schemeClr val="dk1"/>
-                  </a:fontRef>
-                </p:style>
-                <p:txBody>
-                  <a:bodyPr wrap="square" rtlCol="0">
-                    <a:spAutoFit/>
-                  </a:bodyPr>
-                  <a:lstStyle/>
-                  <a:p>
-                    <a:pPr algn="ctr"/>
-                    <a:r>
-                      <a:rPr kumimoji="1" lang="en-US" altLang="ja-JP" sz="1400" dirty="0" smtClean="0"/>
-                      <a:t>GPIO 05</a:t>
-                    </a:r>
-                    <a:endParaRPr kumimoji="1" lang="ja-JP" altLang="en-US" sz="1400" dirty="0"/>
-                  </a:p>
-                </p:txBody>
-              </p:sp>
-              <p:sp>
-                <p:nvSpPr>
-                  <p:cNvPr id="48" name="テキスト ボックス 47"/>
-                  <p:cNvSpPr txBox="1"/>
-                  <p:nvPr/>
-                </p:nvSpPr>
-                <p:spPr>
-                  <a:xfrm>
-                    <a:off x="2353052" y="5367374"/>
-                    <a:ext cx="1377696" cy="307777"/>
-                  </a:xfrm>
-                  <a:prstGeom prst="rect">
-                    <a:avLst/>
-                  </a:prstGeom>
-                  <a:ln>
-                    <a:solidFill>
-                      <a:schemeClr val="bg1"/>
-                    </a:solidFill>
-                  </a:ln>
-                </p:spPr>
-                <p:style>
-                  <a:lnRef idx="1">
-                    <a:schemeClr val="accent4"/>
-                  </a:lnRef>
-                  <a:fillRef idx="2">
-                    <a:schemeClr val="accent4"/>
-                  </a:fillRef>
-                  <a:effectRef idx="1">
-                    <a:schemeClr val="accent4"/>
-                  </a:effectRef>
-                  <a:fontRef idx="minor">
-                    <a:schemeClr val="dk1"/>
-                  </a:fontRef>
-                </p:style>
-                <p:txBody>
-                  <a:bodyPr wrap="square" rtlCol="0">
-                    <a:spAutoFit/>
-                  </a:bodyPr>
-                  <a:lstStyle/>
-                  <a:p>
-                    <a:pPr algn="ctr"/>
-                    <a:r>
-                      <a:rPr kumimoji="1" lang="en-US" altLang="ja-JP" sz="1400" dirty="0" smtClean="0"/>
-                      <a:t>GPIO 06</a:t>
-                    </a:r>
-                    <a:endParaRPr kumimoji="1" lang="ja-JP" altLang="en-US" sz="1400" dirty="0"/>
-                  </a:p>
-                </p:txBody>
-              </p:sp>
-              <p:sp>
-                <p:nvSpPr>
-                  <p:cNvPr id="49" name="テキスト ボックス 48"/>
-                  <p:cNvSpPr txBox="1"/>
-                  <p:nvPr/>
-                </p:nvSpPr>
-                <p:spPr>
-                  <a:xfrm>
-                    <a:off x="2353052" y="5759116"/>
-                    <a:ext cx="1377696" cy="307777"/>
-                  </a:xfrm>
-                  <a:prstGeom prst="rect">
-                    <a:avLst/>
-                  </a:prstGeom>
-                  <a:ln>
-                    <a:solidFill>
-                      <a:schemeClr val="bg1"/>
-                    </a:solidFill>
-                  </a:ln>
-                </p:spPr>
-                <p:style>
-                  <a:lnRef idx="1">
-                    <a:schemeClr val="accent4"/>
-                  </a:lnRef>
-                  <a:fillRef idx="2">
-                    <a:schemeClr val="accent4"/>
-                  </a:fillRef>
-                  <a:effectRef idx="1">
-                    <a:schemeClr val="accent4"/>
-                  </a:effectRef>
-                  <a:fontRef idx="minor">
-                    <a:schemeClr val="dk1"/>
-                  </a:fontRef>
-                </p:style>
-                <p:txBody>
-                  <a:bodyPr wrap="square" rtlCol="0">
-                    <a:spAutoFit/>
-                  </a:bodyPr>
-                  <a:lstStyle/>
-                  <a:p>
-                    <a:pPr algn="ctr"/>
-                    <a:r>
-                      <a:rPr kumimoji="1" lang="en-US" altLang="ja-JP" sz="1400" dirty="0" smtClean="0"/>
-                      <a:t>GPIO 07</a:t>
-                    </a:r>
-                    <a:endParaRPr kumimoji="1" lang="ja-JP" altLang="en-US" sz="1400" dirty="0"/>
-                  </a:p>
-                </p:txBody>
-              </p:sp>
-              <p:sp>
-                <p:nvSpPr>
-                  <p:cNvPr id="50" name="テキスト ボックス 49"/>
-                  <p:cNvSpPr txBox="1"/>
-                  <p:nvPr/>
-                </p:nvSpPr>
-                <p:spPr>
-                  <a:xfrm rot="5400000">
-                    <a:off x="660634" y="4379933"/>
-                    <a:ext cx="3077059" cy="307777"/>
-                  </a:xfrm>
-                  <a:prstGeom prst="rect">
-                    <a:avLst/>
-                  </a:prstGeom>
-                  <a:ln>
-                    <a:solidFill>
-                      <a:schemeClr val="bg1"/>
-                    </a:solidFill>
-                  </a:ln>
-                </p:spPr>
-                <p:style>
-                  <a:lnRef idx="1">
-                    <a:schemeClr val="accent4"/>
-                  </a:lnRef>
-                  <a:fillRef idx="2">
-                    <a:schemeClr val="accent4"/>
-                  </a:fillRef>
-                  <a:effectRef idx="1">
-                    <a:schemeClr val="accent4"/>
-                  </a:effectRef>
-                  <a:fontRef idx="minor">
-                    <a:schemeClr val="dk1"/>
-                  </a:fontRef>
-                </p:style>
-                <p:txBody>
-                  <a:bodyPr wrap="square" rtlCol="0">
-                    <a:spAutoFit/>
-                  </a:bodyPr>
-                  <a:lstStyle/>
-                  <a:p>
-                    <a:pPr algn="ctr"/>
-                    <a:r>
-                      <a:rPr kumimoji="1" lang="en-US" altLang="ja-JP" sz="1400" dirty="0" smtClean="0"/>
-                      <a:t>GPIO 0</a:t>
-                    </a:r>
-                    <a:endParaRPr kumimoji="1" lang="ja-JP" altLang="en-US" sz="1400" dirty="0"/>
-                  </a:p>
-                </p:txBody>
-              </p:sp>
-              <p:sp>
-                <p:nvSpPr>
-                  <p:cNvPr id="54" name="テキスト ボックス 53"/>
-                  <p:cNvSpPr txBox="1"/>
-                  <p:nvPr/>
-                </p:nvSpPr>
-                <p:spPr>
-                  <a:xfrm>
-                    <a:off x="8503920" y="3363139"/>
+                    <a:off x="8503917" y="1773379"/>
                     <a:ext cx="1728000" cy="307777"/>
                   </a:xfrm>
                   <a:prstGeom prst="rect">
@@ -8447,704 +6988,2223 @@
                       <a:t>GPIO </a:t>
                     </a:r>
                     <a:r>
-                      <a:rPr lang="en-US" altLang="ja-JP" sz="1400" dirty="0" smtClean="0"/>
-                      <a:t>16</a:t>
+                      <a:rPr kumimoji="1" lang="en-US" altLang="ja-JP" sz="1400" dirty="0" smtClean="0"/>
+                      <a:t>17</a:t>
                     </a:r>
                     <a:endParaRPr kumimoji="1" lang="ja-JP" altLang="en-US" sz="1400" dirty="0"/>
                   </a:p>
                 </p:txBody>
               </p:sp>
+              <p:grpSp>
+                <p:nvGrpSpPr>
+                  <p:cNvPr id="67" name="図形グループ 66"/>
+                  <p:cNvGrpSpPr/>
+                  <p:nvPr/>
+                </p:nvGrpSpPr>
+                <p:grpSpPr>
+                  <a:xfrm>
+                    <a:off x="2045275" y="180000"/>
+                    <a:ext cx="8195045" cy="6516000"/>
+                    <a:chOff x="2045275" y="180000"/>
+                    <a:chExt cx="8195045" cy="6516000"/>
+                  </a:xfrm>
+                </p:grpSpPr>
+                <p:cxnSp>
+                  <p:nvCxnSpPr>
+                    <p:cNvPr id="6" name="直線コネクタ 5"/>
+                    <p:cNvCxnSpPr/>
+                    <p:nvPr/>
+                  </p:nvCxnSpPr>
+                  <p:spPr>
+                    <a:xfrm>
+                      <a:off x="3730752" y="763524"/>
+                      <a:ext cx="4773168" cy="0"/>
+                    </a:xfrm>
+                    <a:prstGeom prst="line">
+                      <a:avLst/>
+                    </a:prstGeom>
+                    <a:ln w="38100">
+                      <a:solidFill>
+                        <a:schemeClr val="tx1"/>
+                      </a:solidFill>
+                    </a:ln>
+                  </p:spPr>
+                  <p:style>
+                    <a:lnRef idx="1">
+                      <a:schemeClr val="accent1"/>
+                    </a:lnRef>
+                    <a:fillRef idx="0">
+                      <a:schemeClr val="accent1"/>
+                    </a:fillRef>
+                    <a:effectRef idx="0">
+                      <a:schemeClr val="accent1"/>
+                    </a:effectRef>
+                    <a:fontRef idx="minor">
+                      <a:schemeClr val="tx1"/>
+                    </a:fontRef>
+                  </p:style>
+                </p:cxnSp>
+                <p:cxnSp>
+                  <p:nvCxnSpPr>
+                    <p:cNvPr id="9" name="直線コネクタ 8"/>
+                    <p:cNvCxnSpPr/>
+                    <p:nvPr/>
+                  </p:nvCxnSpPr>
+                  <p:spPr>
+                    <a:xfrm>
+                      <a:off x="3730752" y="1190244"/>
+                      <a:ext cx="4773168" cy="0"/>
+                    </a:xfrm>
+                    <a:prstGeom prst="line">
+                      <a:avLst/>
+                    </a:prstGeom>
+                    <a:ln w="38100">
+                      <a:solidFill>
+                        <a:schemeClr val="tx1"/>
+                      </a:solidFill>
+                    </a:ln>
+                  </p:spPr>
+                  <p:style>
+                    <a:lnRef idx="1">
+                      <a:schemeClr val="accent1"/>
+                    </a:lnRef>
+                    <a:fillRef idx="0">
+                      <a:schemeClr val="accent1"/>
+                    </a:fillRef>
+                    <a:effectRef idx="0">
+                      <a:schemeClr val="accent1"/>
+                    </a:effectRef>
+                    <a:fontRef idx="minor">
+                      <a:schemeClr val="tx1"/>
+                    </a:fontRef>
+                  </p:style>
+                </p:cxnSp>
+                <p:cxnSp>
+                  <p:nvCxnSpPr>
+                    <p:cNvPr id="10" name="直線コネクタ 9"/>
+                    <p:cNvCxnSpPr/>
+                    <p:nvPr/>
+                  </p:nvCxnSpPr>
+                  <p:spPr>
+                    <a:xfrm>
+                      <a:off x="3730752" y="1562100"/>
+                      <a:ext cx="4773168" cy="0"/>
+                    </a:xfrm>
+                    <a:prstGeom prst="line">
+                      <a:avLst/>
+                    </a:prstGeom>
+                    <a:ln w="38100">
+                      <a:solidFill>
+                        <a:schemeClr val="tx1"/>
+                      </a:solidFill>
+                    </a:ln>
+                  </p:spPr>
+                  <p:style>
+                    <a:lnRef idx="1">
+                      <a:schemeClr val="accent1"/>
+                    </a:lnRef>
+                    <a:fillRef idx="0">
+                      <a:schemeClr val="accent1"/>
+                    </a:fillRef>
+                    <a:effectRef idx="0">
+                      <a:schemeClr val="accent1"/>
+                    </a:effectRef>
+                    <a:fontRef idx="minor">
+                      <a:schemeClr val="tx1"/>
+                    </a:fontRef>
+                  </p:style>
+                </p:cxnSp>
+                <p:cxnSp>
+                  <p:nvCxnSpPr>
+                    <p:cNvPr id="11" name="直線コネクタ 10"/>
+                    <p:cNvCxnSpPr/>
+                    <p:nvPr/>
+                  </p:nvCxnSpPr>
+                  <p:spPr>
+                    <a:xfrm>
+                      <a:off x="3730752" y="1919336"/>
+                      <a:ext cx="4773168" cy="0"/>
+                    </a:xfrm>
+                    <a:prstGeom prst="line">
+                      <a:avLst/>
+                    </a:prstGeom>
+                    <a:ln w="38100">
+                      <a:solidFill>
+                        <a:schemeClr val="tx1"/>
+                      </a:solidFill>
+                    </a:ln>
+                  </p:spPr>
+                  <p:style>
+                    <a:lnRef idx="1">
+                      <a:schemeClr val="accent1"/>
+                    </a:lnRef>
+                    <a:fillRef idx="0">
+                      <a:schemeClr val="accent1"/>
+                    </a:fillRef>
+                    <a:effectRef idx="0">
+                      <a:schemeClr val="accent1"/>
+                    </a:effectRef>
+                    <a:fontRef idx="minor">
+                      <a:schemeClr val="tx1"/>
+                    </a:fontRef>
+                  </p:style>
+                </p:cxnSp>
+                <p:cxnSp>
+                  <p:nvCxnSpPr>
+                    <p:cNvPr id="12" name="直線コネクタ 11"/>
+                    <p:cNvCxnSpPr/>
+                    <p:nvPr/>
+                  </p:nvCxnSpPr>
+                  <p:spPr>
+                    <a:xfrm>
+                      <a:off x="3730752" y="2346056"/>
+                      <a:ext cx="4773168" cy="0"/>
+                    </a:xfrm>
+                    <a:prstGeom prst="line">
+                      <a:avLst/>
+                    </a:prstGeom>
+                    <a:ln w="38100">
+                      <a:solidFill>
+                        <a:schemeClr val="tx1"/>
+                      </a:solidFill>
+                    </a:ln>
+                  </p:spPr>
+                  <p:style>
+                    <a:lnRef idx="1">
+                      <a:schemeClr val="accent1"/>
+                    </a:lnRef>
+                    <a:fillRef idx="0">
+                      <a:schemeClr val="accent1"/>
+                    </a:fillRef>
+                    <a:effectRef idx="0">
+                      <a:schemeClr val="accent1"/>
+                    </a:effectRef>
+                    <a:fontRef idx="minor">
+                      <a:schemeClr val="tx1"/>
+                    </a:fontRef>
+                  </p:style>
+                </p:cxnSp>
+                <p:cxnSp>
+                  <p:nvCxnSpPr>
+                    <p:cNvPr id="13" name="直線コネクタ 12"/>
+                    <p:cNvCxnSpPr/>
+                    <p:nvPr/>
+                  </p:nvCxnSpPr>
+                  <p:spPr>
+                    <a:xfrm>
+                      <a:off x="3730752" y="2717912"/>
+                      <a:ext cx="4773168" cy="0"/>
+                    </a:xfrm>
+                    <a:prstGeom prst="line">
+                      <a:avLst/>
+                    </a:prstGeom>
+                    <a:ln w="38100">
+                      <a:solidFill>
+                        <a:schemeClr val="tx1"/>
+                      </a:solidFill>
+                    </a:ln>
+                  </p:spPr>
+                  <p:style>
+                    <a:lnRef idx="1">
+                      <a:schemeClr val="accent1"/>
+                    </a:lnRef>
+                    <a:fillRef idx="0">
+                      <a:schemeClr val="accent1"/>
+                    </a:fillRef>
+                    <a:effectRef idx="0">
+                      <a:schemeClr val="accent1"/>
+                    </a:effectRef>
+                    <a:fontRef idx="minor">
+                      <a:schemeClr val="tx1"/>
+                    </a:fontRef>
+                  </p:style>
+                </p:cxnSp>
+                <p:cxnSp>
+                  <p:nvCxnSpPr>
+                    <p:cNvPr id="14" name="直線コネクタ 13"/>
+                    <p:cNvCxnSpPr/>
+                    <p:nvPr/>
+                  </p:nvCxnSpPr>
+                  <p:spPr>
+                    <a:xfrm>
+                      <a:off x="3730752" y="3125049"/>
+                      <a:ext cx="4773168" cy="0"/>
+                    </a:xfrm>
+                    <a:prstGeom prst="line">
+                      <a:avLst/>
+                    </a:prstGeom>
+                    <a:ln w="38100">
+                      <a:solidFill>
+                        <a:schemeClr val="tx1"/>
+                      </a:solidFill>
+                    </a:ln>
+                  </p:spPr>
+                  <p:style>
+                    <a:lnRef idx="1">
+                      <a:schemeClr val="accent1"/>
+                    </a:lnRef>
+                    <a:fillRef idx="0">
+                      <a:schemeClr val="accent1"/>
+                    </a:fillRef>
+                    <a:effectRef idx="0">
+                      <a:schemeClr val="accent1"/>
+                    </a:effectRef>
+                    <a:fontRef idx="minor">
+                      <a:schemeClr val="tx1"/>
+                    </a:fontRef>
+                  </p:style>
+                </p:cxnSp>
+                <p:cxnSp>
+                  <p:nvCxnSpPr>
+                    <p:cNvPr id="15" name="直線コネクタ 14"/>
+                    <p:cNvCxnSpPr/>
+                    <p:nvPr/>
+                  </p:nvCxnSpPr>
+                  <p:spPr>
+                    <a:xfrm>
+                      <a:off x="3730752" y="3535584"/>
+                      <a:ext cx="4773168" cy="0"/>
+                    </a:xfrm>
+                    <a:prstGeom prst="line">
+                      <a:avLst/>
+                    </a:prstGeom>
+                    <a:ln w="38100">
+                      <a:solidFill>
+                        <a:schemeClr val="tx1"/>
+                      </a:solidFill>
+                    </a:ln>
+                  </p:spPr>
+                  <p:style>
+                    <a:lnRef idx="1">
+                      <a:schemeClr val="accent1"/>
+                    </a:lnRef>
+                    <a:fillRef idx="0">
+                      <a:schemeClr val="accent1"/>
+                    </a:fillRef>
+                    <a:effectRef idx="0">
+                      <a:schemeClr val="accent1"/>
+                    </a:effectRef>
+                    <a:fontRef idx="minor">
+                      <a:schemeClr val="tx1"/>
+                    </a:fontRef>
+                  </p:style>
+                </p:cxnSp>
+                <p:cxnSp>
+                  <p:nvCxnSpPr>
+                    <p:cNvPr id="16" name="直線コネクタ 15"/>
+                    <p:cNvCxnSpPr/>
+                    <p:nvPr/>
+                  </p:nvCxnSpPr>
+                  <p:spPr>
+                    <a:xfrm>
+                      <a:off x="3730752" y="3923625"/>
+                      <a:ext cx="4773168" cy="0"/>
+                    </a:xfrm>
+                    <a:prstGeom prst="line">
+                      <a:avLst/>
+                    </a:prstGeom>
+                    <a:ln w="38100">
+                      <a:solidFill>
+                        <a:schemeClr val="tx1"/>
+                      </a:solidFill>
+                    </a:ln>
+                  </p:spPr>
+                  <p:style>
+                    <a:lnRef idx="1">
+                      <a:schemeClr val="accent1"/>
+                    </a:lnRef>
+                    <a:fillRef idx="0">
+                      <a:schemeClr val="accent1"/>
+                    </a:fillRef>
+                    <a:effectRef idx="0">
+                      <a:schemeClr val="accent1"/>
+                    </a:effectRef>
+                    <a:fontRef idx="minor">
+                      <a:schemeClr val="tx1"/>
+                    </a:fontRef>
+                  </p:style>
+                </p:cxnSp>
+                <p:cxnSp>
+                  <p:nvCxnSpPr>
+                    <p:cNvPr id="17" name="直線コネクタ 16"/>
+                    <p:cNvCxnSpPr/>
+                    <p:nvPr/>
+                  </p:nvCxnSpPr>
+                  <p:spPr>
+                    <a:xfrm>
+                      <a:off x="3730752" y="4280861"/>
+                      <a:ext cx="4773168" cy="0"/>
+                    </a:xfrm>
+                    <a:prstGeom prst="line">
+                      <a:avLst/>
+                    </a:prstGeom>
+                    <a:ln w="38100">
+                      <a:solidFill>
+                        <a:schemeClr val="tx1"/>
+                      </a:solidFill>
+                    </a:ln>
+                  </p:spPr>
+                  <p:style>
+                    <a:lnRef idx="1">
+                      <a:schemeClr val="accent1"/>
+                    </a:lnRef>
+                    <a:fillRef idx="0">
+                      <a:schemeClr val="accent1"/>
+                    </a:fillRef>
+                    <a:effectRef idx="0">
+                      <a:schemeClr val="accent1"/>
+                    </a:effectRef>
+                    <a:fontRef idx="minor">
+                      <a:schemeClr val="tx1"/>
+                    </a:fontRef>
+                  </p:style>
+                </p:cxnSp>
+                <p:cxnSp>
+                  <p:nvCxnSpPr>
+                    <p:cNvPr id="18" name="直線コネクタ 17"/>
+                    <p:cNvCxnSpPr/>
+                    <p:nvPr/>
+                  </p:nvCxnSpPr>
+                  <p:spPr>
+                    <a:xfrm>
+                      <a:off x="3730752" y="4707581"/>
+                      <a:ext cx="4773168" cy="0"/>
+                    </a:xfrm>
+                    <a:prstGeom prst="line">
+                      <a:avLst/>
+                    </a:prstGeom>
+                    <a:ln w="38100">
+                      <a:solidFill>
+                        <a:schemeClr val="tx1"/>
+                      </a:solidFill>
+                    </a:ln>
+                  </p:spPr>
+                  <p:style>
+                    <a:lnRef idx="1">
+                      <a:schemeClr val="accent1"/>
+                    </a:lnRef>
+                    <a:fillRef idx="0">
+                      <a:schemeClr val="accent1"/>
+                    </a:fillRef>
+                    <a:effectRef idx="0">
+                      <a:schemeClr val="accent1"/>
+                    </a:effectRef>
+                    <a:fontRef idx="minor">
+                      <a:schemeClr val="tx1"/>
+                    </a:fontRef>
+                  </p:style>
+                </p:cxnSp>
+                <p:cxnSp>
+                  <p:nvCxnSpPr>
+                    <p:cNvPr id="19" name="直線コネクタ 18"/>
+                    <p:cNvCxnSpPr/>
+                    <p:nvPr/>
+                  </p:nvCxnSpPr>
+                  <p:spPr>
+                    <a:xfrm>
+                      <a:off x="3730752" y="5079437"/>
+                      <a:ext cx="4773168" cy="0"/>
+                    </a:xfrm>
+                    <a:prstGeom prst="line">
+                      <a:avLst/>
+                    </a:prstGeom>
+                    <a:ln w="38100">
+                      <a:solidFill>
+                        <a:schemeClr val="tx1"/>
+                      </a:solidFill>
+                    </a:ln>
+                  </p:spPr>
+                  <p:style>
+                    <a:lnRef idx="1">
+                      <a:schemeClr val="accent1"/>
+                    </a:lnRef>
+                    <a:fillRef idx="0">
+                      <a:schemeClr val="accent1"/>
+                    </a:fillRef>
+                    <a:effectRef idx="0">
+                      <a:schemeClr val="accent1"/>
+                    </a:effectRef>
+                    <a:fontRef idx="minor">
+                      <a:schemeClr val="tx1"/>
+                    </a:fontRef>
+                  </p:style>
+                </p:cxnSp>
+                <p:cxnSp>
+                  <p:nvCxnSpPr>
+                    <p:cNvPr id="20" name="直線コネクタ 19"/>
+                    <p:cNvCxnSpPr/>
+                    <p:nvPr/>
+                  </p:nvCxnSpPr>
+                  <p:spPr>
+                    <a:xfrm>
+                      <a:off x="3730752" y="5493318"/>
+                      <a:ext cx="4773168" cy="0"/>
+                    </a:xfrm>
+                    <a:prstGeom prst="line">
+                      <a:avLst/>
+                    </a:prstGeom>
+                    <a:ln w="38100">
+                      <a:solidFill>
+                        <a:schemeClr val="tx1"/>
+                      </a:solidFill>
+                    </a:ln>
+                  </p:spPr>
+                  <p:style>
+                    <a:lnRef idx="1">
+                      <a:schemeClr val="accent1"/>
+                    </a:lnRef>
+                    <a:fillRef idx="0">
+                      <a:schemeClr val="accent1"/>
+                    </a:fillRef>
+                    <a:effectRef idx="0">
+                      <a:schemeClr val="accent1"/>
+                    </a:effectRef>
+                    <a:fontRef idx="minor">
+                      <a:schemeClr val="tx1"/>
+                    </a:fontRef>
+                  </p:style>
+                </p:cxnSp>
+                <p:cxnSp>
+                  <p:nvCxnSpPr>
+                    <p:cNvPr id="21" name="直線コネクタ 20"/>
+                    <p:cNvCxnSpPr/>
+                    <p:nvPr/>
+                  </p:nvCxnSpPr>
+                  <p:spPr>
+                    <a:xfrm>
+                      <a:off x="3730752" y="5920038"/>
+                      <a:ext cx="4773168" cy="0"/>
+                    </a:xfrm>
+                    <a:prstGeom prst="line">
+                      <a:avLst/>
+                    </a:prstGeom>
+                    <a:ln w="38100">
+                      <a:solidFill>
+                        <a:schemeClr val="tx1"/>
+                      </a:solidFill>
+                    </a:ln>
+                  </p:spPr>
+                  <p:style>
+                    <a:lnRef idx="1">
+                      <a:schemeClr val="accent1"/>
+                    </a:lnRef>
+                    <a:fillRef idx="0">
+                      <a:schemeClr val="accent1"/>
+                    </a:fillRef>
+                    <a:effectRef idx="0">
+                      <a:schemeClr val="accent1"/>
+                    </a:effectRef>
+                    <a:fontRef idx="minor">
+                      <a:schemeClr val="tx1"/>
+                    </a:fontRef>
+                  </p:style>
+                </p:cxnSp>
+                <p:cxnSp>
+                  <p:nvCxnSpPr>
+                    <p:cNvPr id="22" name="直線コネクタ 21"/>
+                    <p:cNvCxnSpPr/>
+                    <p:nvPr/>
+                  </p:nvCxnSpPr>
+                  <p:spPr>
+                    <a:xfrm>
+                      <a:off x="3730752" y="6291894"/>
+                      <a:ext cx="4773168" cy="0"/>
+                    </a:xfrm>
+                    <a:prstGeom prst="line">
+                      <a:avLst/>
+                    </a:prstGeom>
+                    <a:ln w="38100">
+                      <a:solidFill>
+                        <a:schemeClr val="tx1"/>
+                      </a:solidFill>
+                    </a:ln>
+                  </p:spPr>
+                  <p:style>
+                    <a:lnRef idx="1">
+                      <a:schemeClr val="accent1"/>
+                    </a:lnRef>
+                    <a:fillRef idx="0">
+                      <a:schemeClr val="accent1"/>
+                    </a:fillRef>
+                    <a:effectRef idx="0">
+                      <a:schemeClr val="accent1"/>
+                    </a:effectRef>
+                    <a:fontRef idx="minor">
+                      <a:schemeClr val="tx1"/>
+                    </a:fontRef>
+                  </p:style>
+                </p:cxnSp>
+                <p:pic>
+                  <p:nvPicPr>
+                    <p:cNvPr id="4" name="図 3"/>
+                    <p:cNvPicPr>
+                      <a:picLocks noChangeAspect="1"/>
+                    </p:cNvPicPr>
+                    <p:nvPr/>
+                  </p:nvPicPr>
+                  <p:blipFill rotWithShape="1">
+                    <a:blip r:embed="rId2">
+                      <a:extLst>
+                        <a:ext uri="{28A0092B-C50C-407E-A947-70E740481C1C}">
+                          <a14:useLocalDpi xmlns:a14="http://schemas.microsoft.com/office/drawing/2010/main" val="0"/>
+                        </a:ext>
+                      </a:extLst>
+                    </a:blip>
+                    <a:srcRect l="4412" t="2626" r="4860" b="2362"/>
+                    <a:stretch/>
+                  </p:blipFill>
+                  <p:spPr>
+                    <a:xfrm>
+                      <a:off x="4428000" y="180000"/>
+                      <a:ext cx="3312000" cy="6516000"/>
+                    </a:xfrm>
+                    <a:prstGeom prst="rect">
+                      <a:avLst/>
+                    </a:prstGeom>
+                  </p:spPr>
+                </p:pic>
+                <p:sp>
+                  <p:nvSpPr>
+                    <p:cNvPr id="26" name="テキスト ボックス 25"/>
+                    <p:cNvSpPr txBox="1"/>
+                    <p:nvPr/>
+                  </p:nvSpPr>
+                  <p:spPr>
+                    <a:xfrm>
+                      <a:off x="8503920" y="2192167"/>
+                      <a:ext cx="1420421" cy="307777"/>
+                    </a:xfrm>
+                    <a:prstGeom prst="rect">
+                      <a:avLst/>
+                    </a:prstGeom>
+                    <a:ln>
+                      <a:solidFill>
+                        <a:schemeClr val="bg1"/>
+                      </a:solidFill>
+                    </a:ln>
+                  </p:spPr>
+                  <p:style>
+                    <a:lnRef idx="2">
+                      <a:schemeClr val="accent1">
+                        <a:shade val="50000"/>
+                      </a:schemeClr>
+                    </a:lnRef>
+                    <a:fillRef idx="1">
+                      <a:schemeClr val="accent1"/>
+                    </a:fillRef>
+                    <a:effectRef idx="0">
+                      <a:schemeClr val="accent1"/>
+                    </a:effectRef>
+                    <a:fontRef idx="minor">
+                      <a:schemeClr val="lt1"/>
+                    </a:fontRef>
+                  </p:style>
+                  <p:txBody>
+                    <a:bodyPr wrap="square" rtlCol="0">
+                      <a:spAutoFit/>
+                    </a:bodyPr>
+                    <a:lstStyle/>
+                    <a:p>
+                      <a:pPr algn="ctr"/>
+                      <a:r>
+                        <a:rPr kumimoji="1" lang="en-US" altLang="ja-JP" sz="1400" dirty="0" smtClean="0"/>
+                        <a:t>SDA0 (2-800KHz)</a:t>
+                      </a:r>
+                      <a:endParaRPr kumimoji="1" lang="ja-JP" altLang="en-US" sz="1400" dirty="0"/>
+                    </a:p>
+                  </p:txBody>
+                </p:sp>
+                <p:sp>
+                  <p:nvSpPr>
+                    <p:cNvPr id="27" name="テキスト ボックス 26"/>
+                    <p:cNvSpPr txBox="1"/>
+                    <p:nvPr/>
+                  </p:nvSpPr>
+                  <p:spPr>
+                    <a:xfrm>
+                      <a:off x="8503920" y="2609734"/>
+                      <a:ext cx="1420421" cy="307777"/>
+                    </a:xfrm>
+                    <a:prstGeom prst="rect">
+                      <a:avLst/>
+                    </a:prstGeom>
+                    <a:ln>
+                      <a:solidFill>
+                        <a:schemeClr val="bg1"/>
+                      </a:solidFill>
+                    </a:ln>
+                  </p:spPr>
+                  <p:style>
+                    <a:lnRef idx="2">
+                      <a:schemeClr val="accent1">
+                        <a:shade val="50000"/>
+                      </a:schemeClr>
+                    </a:lnRef>
+                    <a:fillRef idx="1">
+                      <a:schemeClr val="accent1"/>
+                    </a:fillRef>
+                    <a:effectRef idx="0">
+                      <a:schemeClr val="accent1"/>
+                    </a:effectRef>
+                    <a:fontRef idx="minor">
+                      <a:schemeClr val="lt1"/>
+                    </a:fontRef>
+                  </p:style>
+                  <p:txBody>
+                    <a:bodyPr wrap="square" rtlCol="0">
+                      <a:spAutoFit/>
+                    </a:bodyPr>
+                    <a:lstStyle/>
+                    <a:p>
+                      <a:pPr algn="ctr"/>
+                      <a:r>
+                        <a:rPr kumimoji="1" lang="en-US" altLang="ja-JP" sz="1400" dirty="0" smtClean="0"/>
+                        <a:t>SCL0 (2-800KHz)</a:t>
+                      </a:r>
+                      <a:endParaRPr kumimoji="1" lang="ja-JP" altLang="en-US" sz="1400" dirty="0"/>
+                    </a:p>
+                  </p:txBody>
+                </p:sp>
+                <p:sp>
+                  <p:nvSpPr>
+                    <p:cNvPr id="28" name="テキスト ボックス 27"/>
+                    <p:cNvSpPr txBox="1"/>
+                    <p:nvPr/>
+                  </p:nvSpPr>
+                  <p:spPr>
+                    <a:xfrm rot="16200000">
+                      <a:off x="9720125" y="2396383"/>
+                      <a:ext cx="716209" cy="307777"/>
+                    </a:xfrm>
+                    <a:prstGeom prst="rect">
+                      <a:avLst/>
+                    </a:prstGeom>
+                    <a:ln>
+                      <a:solidFill>
+                        <a:schemeClr val="bg1"/>
+                      </a:solidFill>
+                    </a:ln>
+                  </p:spPr>
+                  <p:style>
+                    <a:lnRef idx="2">
+                      <a:schemeClr val="accent1">
+                        <a:shade val="50000"/>
+                      </a:schemeClr>
+                    </a:lnRef>
+                    <a:fillRef idx="1">
+                      <a:schemeClr val="accent1"/>
+                    </a:fillRef>
+                    <a:effectRef idx="0">
+                      <a:schemeClr val="accent1"/>
+                    </a:effectRef>
+                    <a:fontRef idx="minor">
+                      <a:schemeClr val="lt1"/>
+                    </a:fontRef>
+                  </p:style>
+                  <p:txBody>
+                    <a:bodyPr wrap="square" rtlCol="0">
+                      <a:spAutoFit/>
+                    </a:bodyPr>
+                    <a:lstStyle/>
+                    <a:p>
+                      <a:pPr algn="ctr"/>
+                      <a:r>
+                        <a:rPr kumimoji="1" lang="en-US" altLang="ja-JP" sz="1400" dirty="0" smtClean="0"/>
+                        <a:t>I2C0</a:t>
+                      </a:r>
+                    </a:p>
+                  </p:txBody>
+                </p:sp>
+                <p:sp>
+                  <p:nvSpPr>
+                    <p:cNvPr id="36" name="テキスト ボックス 35"/>
+                    <p:cNvSpPr txBox="1"/>
+                    <p:nvPr/>
+                  </p:nvSpPr>
+                  <p:spPr>
+                    <a:xfrm>
+                      <a:off x="2353052" y="1404895"/>
+                      <a:ext cx="1377696" cy="307777"/>
+                    </a:xfrm>
+                    <a:prstGeom prst="rect">
+                      <a:avLst/>
+                    </a:prstGeom>
+                    <a:ln>
+                      <a:solidFill>
+                        <a:schemeClr val="bg1"/>
+                      </a:solidFill>
+                    </a:ln>
+                  </p:spPr>
+                  <p:style>
+                    <a:lnRef idx="2">
+                      <a:schemeClr val="accent6">
+                        <a:shade val="50000"/>
+                      </a:schemeClr>
+                    </a:lnRef>
+                    <a:fillRef idx="1">
+                      <a:schemeClr val="accent6"/>
+                    </a:fillRef>
+                    <a:effectRef idx="0">
+                      <a:schemeClr val="accent6"/>
+                    </a:effectRef>
+                    <a:fontRef idx="minor">
+                      <a:schemeClr val="lt1"/>
+                    </a:fontRef>
+                  </p:style>
+                  <p:txBody>
+                    <a:bodyPr wrap="square" rtlCol="0">
+                      <a:spAutoFit/>
+                    </a:bodyPr>
+                    <a:lstStyle/>
+                    <a:p>
+                      <a:pPr algn="ctr"/>
+                      <a:r>
+                        <a:rPr kumimoji="1" lang="en-US" altLang="ja-JP" sz="1400" dirty="0" smtClean="0"/>
+                        <a:t>CS</a:t>
+                      </a:r>
+                      <a:endParaRPr kumimoji="1" lang="ja-JP" altLang="en-US" sz="1400" dirty="0"/>
+                    </a:p>
+                  </p:txBody>
+                </p:sp>
+                <p:sp>
+                  <p:nvSpPr>
+                    <p:cNvPr id="37" name="テキスト ボックス 36"/>
+                    <p:cNvSpPr txBox="1"/>
+                    <p:nvPr/>
+                  </p:nvSpPr>
+                  <p:spPr>
+                    <a:xfrm>
+                      <a:off x="2353056" y="1796215"/>
+                      <a:ext cx="1377696" cy="307777"/>
+                    </a:xfrm>
+                    <a:prstGeom prst="rect">
+                      <a:avLst/>
+                    </a:prstGeom>
+                    <a:ln>
+                      <a:solidFill>
+                        <a:schemeClr val="bg1"/>
+                      </a:solidFill>
+                    </a:ln>
+                  </p:spPr>
+                  <p:style>
+                    <a:lnRef idx="2">
+                      <a:schemeClr val="accent6">
+                        <a:shade val="50000"/>
+                      </a:schemeClr>
+                    </a:lnRef>
+                    <a:fillRef idx="1">
+                      <a:schemeClr val="accent6"/>
+                    </a:fillRef>
+                    <a:effectRef idx="0">
+                      <a:schemeClr val="accent6"/>
+                    </a:effectRef>
+                    <a:fontRef idx="minor">
+                      <a:schemeClr val="lt1"/>
+                    </a:fontRef>
+                  </p:style>
+                  <p:txBody>
+                    <a:bodyPr wrap="square" rtlCol="0">
+                      <a:spAutoFit/>
+                    </a:bodyPr>
+                    <a:lstStyle/>
+                    <a:p>
+                      <a:pPr algn="ctr"/>
+                      <a:r>
+                        <a:rPr kumimoji="1" lang="en-US" altLang="ja-JP" sz="1400" dirty="0" smtClean="0"/>
+                        <a:t>MISO</a:t>
+                      </a:r>
+                      <a:endParaRPr kumimoji="1" lang="ja-JP" altLang="en-US" sz="1400" dirty="0"/>
+                    </a:p>
+                  </p:txBody>
+                </p:sp>
+                <p:sp>
+                  <p:nvSpPr>
+                    <p:cNvPr id="38" name="テキスト ボックス 37"/>
+                    <p:cNvSpPr txBox="1"/>
+                    <p:nvPr/>
+                  </p:nvSpPr>
+                  <p:spPr>
+                    <a:xfrm>
+                      <a:off x="2353056" y="2192336"/>
+                      <a:ext cx="1377696" cy="307777"/>
+                    </a:xfrm>
+                    <a:prstGeom prst="rect">
+                      <a:avLst/>
+                    </a:prstGeom>
+                    <a:ln>
+                      <a:solidFill>
+                        <a:schemeClr val="bg1"/>
+                      </a:solidFill>
+                    </a:ln>
+                  </p:spPr>
+                  <p:style>
+                    <a:lnRef idx="2">
+                      <a:schemeClr val="accent6">
+                        <a:shade val="50000"/>
+                      </a:schemeClr>
+                    </a:lnRef>
+                    <a:fillRef idx="1">
+                      <a:schemeClr val="accent6"/>
+                    </a:fillRef>
+                    <a:effectRef idx="0">
+                      <a:schemeClr val="accent6"/>
+                    </a:effectRef>
+                    <a:fontRef idx="minor">
+                      <a:schemeClr val="lt1"/>
+                    </a:fontRef>
+                  </p:style>
+                  <p:txBody>
+                    <a:bodyPr wrap="square" rtlCol="0">
+                      <a:spAutoFit/>
+                    </a:bodyPr>
+                    <a:lstStyle/>
+                    <a:p>
+                      <a:pPr algn="ctr"/>
+                      <a:r>
+                        <a:rPr lang="en-US" altLang="ja-JP" sz="1400" dirty="0" smtClean="0"/>
+                        <a:t>MOSI</a:t>
+                      </a:r>
+                      <a:endParaRPr kumimoji="1" lang="ja-JP" altLang="en-US" sz="1400" dirty="0"/>
+                    </a:p>
+                  </p:txBody>
+                </p:sp>
+                <p:sp>
+                  <p:nvSpPr>
+                    <p:cNvPr id="39" name="テキスト ボックス 38"/>
+                    <p:cNvSpPr txBox="1"/>
+                    <p:nvPr/>
+                  </p:nvSpPr>
+                  <p:spPr>
+                    <a:xfrm>
+                      <a:off x="2353056" y="2600599"/>
+                      <a:ext cx="1377696" cy="307777"/>
+                    </a:xfrm>
+                    <a:prstGeom prst="rect">
+                      <a:avLst/>
+                    </a:prstGeom>
+                    <a:ln>
+                      <a:solidFill>
+                        <a:schemeClr val="bg1"/>
+                      </a:solidFill>
+                    </a:ln>
+                  </p:spPr>
+                  <p:style>
+                    <a:lnRef idx="2">
+                      <a:schemeClr val="accent6">
+                        <a:shade val="50000"/>
+                      </a:schemeClr>
+                    </a:lnRef>
+                    <a:fillRef idx="1">
+                      <a:schemeClr val="accent6"/>
+                    </a:fillRef>
+                    <a:effectRef idx="0">
+                      <a:schemeClr val="accent6"/>
+                    </a:effectRef>
+                    <a:fontRef idx="minor">
+                      <a:schemeClr val="lt1"/>
+                    </a:fontRef>
+                  </p:style>
+                  <p:txBody>
+                    <a:bodyPr wrap="square" rtlCol="0">
+                      <a:spAutoFit/>
+                    </a:bodyPr>
+                    <a:lstStyle/>
+                    <a:p>
+                      <a:pPr algn="ctr"/>
+                      <a:r>
+                        <a:rPr lang="en-US" altLang="ja-JP" sz="1400" dirty="0" smtClean="0"/>
+                        <a:t>SCK</a:t>
+                      </a:r>
+                      <a:endParaRPr kumimoji="1" lang="ja-JP" altLang="en-US" sz="1400" dirty="0"/>
+                    </a:p>
+                  </p:txBody>
+                </p:sp>
+                <p:sp>
+                  <p:nvSpPr>
+                    <p:cNvPr id="40" name="テキスト ボックス 39"/>
+                    <p:cNvSpPr txBox="1"/>
+                    <p:nvPr/>
+                  </p:nvSpPr>
+                  <p:spPr>
+                    <a:xfrm rot="5400000">
+                      <a:off x="1447981" y="2002193"/>
+                      <a:ext cx="1502372" cy="307777"/>
+                    </a:xfrm>
+                    <a:prstGeom prst="rect">
+                      <a:avLst/>
+                    </a:prstGeom>
+                    <a:ln>
+                      <a:solidFill>
+                        <a:schemeClr val="bg1"/>
+                      </a:solidFill>
+                    </a:ln>
+                  </p:spPr>
+                  <p:style>
+                    <a:lnRef idx="2">
+                      <a:schemeClr val="accent6">
+                        <a:shade val="50000"/>
+                      </a:schemeClr>
+                    </a:lnRef>
+                    <a:fillRef idx="1">
+                      <a:schemeClr val="accent6"/>
+                    </a:fillRef>
+                    <a:effectRef idx="0">
+                      <a:schemeClr val="accent6"/>
+                    </a:effectRef>
+                    <a:fontRef idx="minor">
+                      <a:schemeClr val="lt1"/>
+                    </a:fontRef>
+                  </p:style>
+                  <p:txBody>
+                    <a:bodyPr wrap="square" rtlCol="0">
+                      <a:spAutoFit/>
+                    </a:bodyPr>
+                    <a:lstStyle/>
+                    <a:p>
+                      <a:pPr algn="ctr"/>
+                      <a:r>
+                        <a:rPr kumimoji="1" lang="en-US" altLang="ja-JP" sz="1400" dirty="0" smtClean="0"/>
+                        <a:t>SPI(1/2/4/8MHz)</a:t>
+                      </a:r>
+                      <a:endParaRPr kumimoji="1" lang="ja-JP" altLang="en-US" sz="1400" dirty="0"/>
+                    </a:p>
+                  </p:txBody>
+                </p:sp>
+                <p:sp>
+                  <p:nvSpPr>
+                    <p:cNvPr id="42" name="テキスト ボックス 41"/>
+                    <p:cNvSpPr txBox="1"/>
+                    <p:nvPr/>
+                  </p:nvSpPr>
+                  <p:spPr>
+                    <a:xfrm>
+                      <a:off x="2353052" y="2989832"/>
+                      <a:ext cx="1377696" cy="307777"/>
+                    </a:xfrm>
+                    <a:prstGeom prst="rect">
+                      <a:avLst/>
+                    </a:prstGeom>
+                    <a:ln>
+                      <a:solidFill>
+                        <a:schemeClr val="bg1"/>
+                      </a:solidFill>
+                    </a:ln>
+                  </p:spPr>
+                  <p:style>
+                    <a:lnRef idx="1">
+                      <a:schemeClr val="accent4"/>
+                    </a:lnRef>
+                    <a:fillRef idx="2">
+                      <a:schemeClr val="accent4"/>
+                    </a:fillRef>
+                    <a:effectRef idx="1">
+                      <a:schemeClr val="accent4"/>
+                    </a:effectRef>
+                    <a:fontRef idx="minor">
+                      <a:schemeClr val="dk1"/>
+                    </a:fontRef>
+                  </p:style>
+                  <p:txBody>
+                    <a:bodyPr wrap="square" rtlCol="0">
+                      <a:spAutoFit/>
+                    </a:bodyPr>
+                    <a:lstStyle/>
+                    <a:p>
+                      <a:pPr algn="ctr"/>
+                      <a:r>
+                        <a:rPr kumimoji="1" lang="en-US" altLang="ja-JP" sz="1400" dirty="0" smtClean="0"/>
+                        <a:t>GPIO 00</a:t>
+                      </a:r>
+                      <a:endParaRPr kumimoji="1" lang="ja-JP" altLang="en-US" sz="1400" dirty="0"/>
+                    </a:p>
+                  </p:txBody>
+                </p:sp>
+                <p:sp>
+                  <p:nvSpPr>
+                    <p:cNvPr id="43" name="テキスト ボックス 42"/>
+                    <p:cNvSpPr txBox="1"/>
+                    <p:nvPr/>
+                  </p:nvSpPr>
+                  <p:spPr>
+                    <a:xfrm>
+                      <a:off x="2353052" y="3388292"/>
+                      <a:ext cx="1377696" cy="307777"/>
+                    </a:xfrm>
+                    <a:prstGeom prst="rect">
+                      <a:avLst/>
+                    </a:prstGeom>
+                    <a:ln>
+                      <a:solidFill>
+                        <a:schemeClr val="bg1"/>
+                      </a:solidFill>
+                    </a:ln>
+                  </p:spPr>
+                  <p:style>
+                    <a:lnRef idx="1">
+                      <a:schemeClr val="accent4"/>
+                    </a:lnRef>
+                    <a:fillRef idx="2">
+                      <a:schemeClr val="accent4"/>
+                    </a:fillRef>
+                    <a:effectRef idx="1">
+                      <a:schemeClr val="accent4"/>
+                    </a:effectRef>
+                    <a:fontRef idx="minor">
+                      <a:schemeClr val="dk1"/>
+                    </a:fontRef>
+                  </p:style>
+                  <p:txBody>
+                    <a:bodyPr wrap="square" rtlCol="0">
+                      <a:spAutoFit/>
+                    </a:bodyPr>
+                    <a:lstStyle/>
+                    <a:p>
+                      <a:pPr algn="ctr"/>
+                      <a:r>
+                        <a:rPr kumimoji="1" lang="en-US" altLang="ja-JP" sz="1400" dirty="0" smtClean="0"/>
+                        <a:t>GPIO 01</a:t>
+                      </a:r>
+                      <a:endParaRPr kumimoji="1" lang="ja-JP" altLang="en-US" sz="1400" dirty="0"/>
+                    </a:p>
+                  </p:txBody>
+                </p:sp>
+                <p:sp>
+                  <p:nvSpPr>
+                    <p:cNvPr id="44" name="テキスト ボックス 43"/>
+                    <p:cNvSpPr txBox="1"/>
+                    <p:nvPr/>
+                  </p:nvSpPr>
+                  <p:spPr>
+                    <a:xfrm>
+                      <a:off x="2353052" y="3774056"/>
+                      <a:ext cx="1377696" cy="307777"/>
+                    </a:xfrm>
+                    <a:prstGeom prst="rect">
+                      <a:avLst/>
+                    </a:prstGeom>
+                    <a:ln>
+                      <a:solidFill>
+                        <a:schemeClr val="bg1"/>
+                      </a:solidFill>
+                    </a:ln>
+                  </p:spPr>
+                  <p:style>
+                    <a:lnRef idx="1">
+                      <a:schemeClr val="accent4"/>
+                    </a:lnRef>
+                    <a:fillRef idx="2">
+                      <a:schemeClr val="accent4"/>
+                    </a:fillRef>
+                    <a:effectRef idx="1">
+                      <a:schemeClr val="accent4"/>
+                    </a:effectRef>
+                    <a:fontRef idx="minor">
+                      <a:schemeClr val="dk1"/>
+                    </a:fontRef>
+                  </p:style>
+                  <p:txBody>
+                    <a:bodyPr wrap="square" rtlCol="0">
+                      <a:spAutoFit/>
+                    </a:bodyPr>
+                    <a:lstStyle/>
+                    <a:p>
+                      <a:pPr algn="ctr"/>
+                      <a:r>
+                        <a:rPr kumimoji="1" lang="en-US" altLang="ja-JP" sz="1400" dirty="0" smtClean="0"/>
+                        <a:t>GPIO 02</a:t>
+                      </a:r>
+                      <a:endParaRPr kumimoji="1" lang="ja-JP" altLang="en-US" sz="1400" dirty="0"/>
+                    </a:p>
+                  </p:txBody>
+                </p:sp>
+                <p:sp>
+                  <p:nvSpPr>
+                    <p:cNvPr id="45" name="テキスト ボックス 44"/>
+                    <p:cNvSpPr txBox="1"/>
+                    <p:nvPr/>
+                  </p:nvSpPr>
+                  <p:spPr>
+                    <a:xfrm>
+                      <a:off x="2353052" y="4167355"/>
+                      <a:ext cx="1377696" cy="307777"/>
+                    </a:xfrm>
+                    <a:prstGeom prst="rect">
+                      <a:avLst/>
+                    </a:prstGeom>
+                    <a:ln>
+                      <a:solidFill>
+                        <a:schemeClr val="bg1"/>
+                      </a:solidFill>
+                    </a:ln>
+                  </p:spPr>
+                  <p:style>
+                    <a:lnRef idx="1">
+                      <a:schemeClr val="accent4"/>
+                    </a:lnRef>
+                    <a:fillRef idx="2">
+                      <a:schemeClr val="accent4"/>
+                    </a:fillRef>
+                    <a:effectRef idx="1">
+                      <a:schemeClr val="accent4"/>
+                    </a:effectRef>
+                    <a:fontRef idx="minor">
+                      <a:schemeClr val="dk1"/>
+                    </a:fontRef>
+                  </p:style>
+                  <p:txBody>
+                    <a:bodyPr wrap="square" rtlCol="0">
+                      <a:spAutoFit/>
+                    </a:bodyPr>
+                    <a:lstStyle/>
+                    <a:p>
+                      <a:pPr algn="ctr"/>
+                      <a:r>
+                        <a:rPr kumimoji="1" lang="en-US" altLang="ja-JP" sz="1400" dirty="0" smtClean="0"/>
+                        <a:t>GPIO 03</a:t>
+                      </a:r>
+                      <a:endParaRPr kumimoji="1" lang="ja-JP" altLang="en-US" sz="1400" dirty="0"/>
+                    </a:p>
+                  </p:txBody>
+                </p:sp>
+                <p:sp>
+                  <p:nvSpPr>
+                    <p:cNvPr id="46" name="テキスト ボックス 45"/>
+                    <p:cNvSpPr txBox="1"/>
+                    <p:nvPr/>
+                  </p:nvSpPr>
+                  <p:spPr>
+                    <a:xfrm>
+                      <a:off x="2353052" y="4562317"/>
+                      <a:ext cx="1377696" cy="307777"/>
+                    </a:xfrm>
+                    <a:prstGeom prst="rect">
+                      <a:avLst/>
+                    </a:prstGeom>
+                    <a:ln>
+                      <a:solidFill>
+                        <a:schemeClr val="bg1"/>
+                      </a:solidFill>
+                    </a:ln>
+                  </p:spPr>
+                  <p:style>
+                    <a:lnRef idx="1">
+                      <a:schemeClr val="accent4"/>
+                    </a:lnRef>
+                    <a:fillRef idx="2">
+                      <a:schemeClr val="accent4"/>
+                    </a:fillRef>
+                    <a:effectRef idx="1">
+                      <a:schemeClr val="accent4"/>
+                    </a:effectRef>
+                    <a:fontRef idx="minor">
+                      <a:schemeClr val="dk1"/>
+                    </a:fontRef>
+                  </p:style>
+                  <p:txBody>
+                    <a:bodyPr wrap="square" rtlCol="0">
+                      <a:spAutoFit/>
+                    </a:bodyPr>
+                    <a:lstStyle/>
+                    <a:p>
+                      <a:pPr algn="ctr"/>
+                      <a:r>
+                        <a:rPr kumimoji="1" lang="en-US" altLang="ja-JP" sz="1400" dirty="0" smtClean="0"/>
+                        <a:t>GPIO 04</a:t>
+                      </a:r>
+                      <a:endParaRPr kumimoji="1" lang="ja-JP" altLang="en-US" sz="1400" dirty="0"/>
+                    </a:p>
+                  </p:txBody>
+                </p:sp>
+                <p:sp>
+                  <p:nvSpPr>
+                    <p:cNvPr id="47" name="テキスト ボックス 46"/>
+                    <p:cNvSpPr txBox="1"/>
+                    <p:nvPr/>
+                  </p:nvSpPr>
+                  <p:spPr>
+                    <a:xfrm>
+                      <a:off x="2353052" y="4965521"/>
+                      <a:ext cx="1377696" cy="307777"/>
+                    </a:xfrm>
+                    <a:prstGeom prst="rect">
+                      <a:avLst/>
+                    </a:prstGeom>
+                    <a:ln>
+                      <a:solidFill>
+                        <a:schemeClr val="bg1"/>
+                      </a:solidFill>
+                    </a:ln>
+                  </p:spPr>
+                  <p:style>
+                    <a:lnRef idx="1">
+                      <a:schemeClr val="accent4"/>
+                    </a:lnRef>
+                    <a:fillRef idx="2">
+                      <a:schemeClr val="accent4"/>
+                    </a:fillRef>
+                    <a:effectRef idx="1">
+                      <a:schemeClr val="accent4"/>
+                    </a:effectRef>
+                    <a:fontRef idx="minor">
+                      <a:schemeClr val="dk1"/>
+                    </a:fontRef>
+                  </p:style>
+                  <p:txBody>
+                    <a:bodyPr wrap="square" rtlCol="0">
+                      <a:spAutoFit/>
+                    </a:bodyPr>
+                    <a:lstStyle/>
+                    <a:p>
+                      <a:pPr algn="ctr"/>
+                      <a:r>
+                        <a:rPr kumimoji="1" lang="en-US" altLang="ja-JP" sz="1400" dirty="0" smtClean="0"/>
+                        <a:t>GPIO 05</a:t>
+                      </a:r>
+                      <a:endParaRPr kumimoji="1" lang="ja-JP" altLang="en-US" sz="1400" dirty="0"/>
+                    </a:p>
+                  </p:txBody>
+                </p:sp>
+                <p:sp>
+                  <p:nvSpPr>
+                    <p:cNvPr id="48" name="テキスト ボックス 47"/>
+                    <p:cNvSpPr txBox="1"/>
+                    <p:nvPr/>
+                  </p:nvSpPr>
+                  <p:spPr>
+                    <a:xfrm>
+                      <a:off x="2353052" y="5367374"/>
+                      <a:ext cx="1377696" cy="307777"/>
+                    </a:xfrm>
+                    <a:prstGeom prst="rect">
+                      <a:avLst/>
+                    </a:prstGeom>
+                    <a:ln>
+                      <a:solidFill>
+                        <a:schemeClr val="bg1"/>
+                      </a:solidFill>
+                    </a:ln>
+                  </p:spPr>
+                  <p:style>
+                    <a:lnRef idx="1">
+                      <a:schemeClr val="accent4"/>
+                    </a:lnRef>
+                    <a:fillRef idx="2">
+                      <a:schemeClr val="accent4"/>
+                    </a:fillRef>
+                    <a:effectRef idx="1">
+                      <a:schemeClr val="accent4"/>
+                    </a:effectRef>
+                    <a:fontRef idx="minor">
+                      <a:schemeClr val="dk1"/>
+                    </a:fontRef>
+                  </p:style>
+                  <p:txBody>
+                    <a:bodyPr wrap="square" rtlCol="0">
+                      <a:spAutoFit/>
+                    </a:bodyPr>
+                    <a:lstStyle/>
+                    <a:p>
+                      <a:pPr algn="ctr"/>
+                      <a:r>
+                        <a:rPr kumimoji="1" lang="en-US" altLang="ja-JP" sz="1400" dirty="0" smtClean="0"/>
+                        <a:t>GPIO 06</a:t>
+                      </a:r>
+                      <a:endParaRPr kumimoji="1" lang="ja-JP" altLang="en-US" sz="1400" dirty="0"/>
+                    </a:p>
+                  </p:txBody>
+                </p:sp>
+                <p:sp>
+                  <p:nvSpPr>
+                    <p:cNvPr id="49" name="テキスト ボックス 48"/>
+                    <p:cNvSpPr txBox="1"/>
+                    <p:nvPr/>
+                  </p:nvSpPr>
+                  <p:spPr>
+                    <a:xfrm>
+                      <a:off x="2353052" y="5759116"/>
+                      <a:ext cx="1377696" cy="307777"/>
+                    </a:xfrm>
+                    <a:prstGeom prst="rect">
+                      <a:avLst/>
+                    </a:prstGeom>
+                    <a:ln>
+                      <a:solidFill>
+                        <a:schemeClr val="bg1"/>
+                      </a:solidFill>
+                    </a:ln>
+                  </p:spPr>
+                  <p:style>
+                    <a:lnRef idx="1">
+                      <a:schemeClr val="accent4"/>
+                    </a:lnRef>
+                    <a:fillRef idx="2">
+                      <a:schemeClr val="accent4"/>
+                    </a:fillRef>
+                    <a:effectRef idx="1">
+                      <a:schemeClr val="accent4"/>
+                    </a:effectRef>
+                    <a:fontRef idx="minor">
+                      <a:schemeClr val="dk1"/>
+                    </a:fontRef>
+                  </p:style>
+                  <p:txBody>
+                    <a:bodyPr wrap="square" rtlCol="0">
+                      <a:spAutoFit/>
+                    </a:bodyPr>
+                    <a:lstStyle/>
+                    <a:p>
+                      <a:pPr algn="ctr"/>
+                      <a:r>
+                        <a:rPr kumimoji="1" lang="en-US" altLang="ja-JP" sz="1400" dirty="0" smtClean="0"/>
+                        <a:t>GPIO 07</a:t>
+                      </a:r>
+                      <a:endParaRPr kumimoji="1" lang="ja-JP" altLang="en-US" sz="1400" dirty="0"/>
+                    </a:p>
+                  </p:txBody>
+                </p:sp>
+                <p:sp>
+                  <p:nvSpPr>
+                    <p:cNvPr id="50" name="テキスト ボックス 49"/>
+                    <p:cNvSpPr txBox="1"/>
+                    <p:nvPr/>
+                  </p:nvSpPr>
+                  <p:spPr>
+                    <a:xfrm rot="5400000">
+                      <a:off x="660634" y="4379933"/>
+                      <a:ext cx="3077059" cy="307777"/>
+                    </a:xfrm>
+                    <a:prstGeom prst="rect">
+                      <a:avLst/>
+                    </a:prstGeom>
+                    <a:ln>
+                      <a:solidFill>
+                        <a:schemeClr val="bg1"/>
+                      </a:solidFill>
+                    </a:ln>
+                  </p:spPr>
+                  <p:style>
+                    <a:lnRef idx="1">
+                      <a:schemeClr val="accent4"/>
+                    </a:lnRef>
+                    <a:fillRef idx="2">
+                      <a:schemeClr val="accent4"/>
+                    </a:fillRef>
+                    <a:effectRef idx="1">
+                      <a:schemeClr val="accent4"/>
+                    </a:effectRef>
+                    <a:fontRef idx="minor">
+                      <a:schemeClr val="dk1"/>
+                    </a:fontRef>
+                  </p:style>
+                  <p:txBody>
+                    <a:bodyPr wrap="square" rtlCol="0">
+                      <a:spAutoFit/>
+                    </a:bodyPr>
+                    <a:lstStyle/>
+                    <a:p>
+                      <a:pPr algn="ctr"/>
+                      <a:r>
+                        <a:rPr kumimoji="1" lang="en-US" altLang="ja-JP" sz="1400" dirty="0" smtClean="0"/>
+                        <a:t>GPIO 0</a:t>
+                      </a:r>
+                      <a:endParaRPr kumimoji="1" lang="ja-JP" altLang="en-US" sz="1400" dirty="0"/>
+                    </a:p>
+                  </p:txBody>
+                </p:sp>
+                <p:sp>
+                  <p:nvSpPr>
+                    <p:cNvPr id="54" name="テキスト ボックス 53"/>
+                    <p:cNvSpPr txBox="1"/>
+                    <p:nvPr/>
+                  </p:nvSpPr>
+                  <p:spPr>
+                    <a:xfrm>
+                      <a:off x="8503920" y="3363139"/>
+                      <a:ext cx="1728000" cy="307777"/>
+                    </a:xfrm>
+                    <a:prstGeom prst="rect">
+                      <a:avLst/>
+                    </a:prstGeom>
+                    <a:ln>
+                      <a:solidFill>
+                        <a:schemeClr val="bg1"/>
+                      </a:solidFill>
+                    </a:ln>
+                  </p:spPr>
+                  <p:style>
+                    <a:lnRef idx="1">
+                      <a:schemeClr val="accent4"/>
+                    </a:lnRef>
+                    <a:fillRef idx="2">
+                      <a:schemeClr val="accent4"/>
+                    </a:fillRef>
+                    <a:effectRef idx="1">
+                      <a:schemeClr val="accent4"/>
+                    </a:effectRef>
+                    <a:fontRef idx="minor">
+                      <a:schemeClr val="dk1"/>
+                    </a:fontRef>
+                  </p:style>
+                  <p:txBody>
+                    <a:bodyPr wrap="square" rtlCol="0">
+                      <a:spAutoFit/>
+                    </a:bodyPr>
+                    <a:lstStyle/>
+                    <a:p>
+                      <a:pPr algn="ctr"/>
+                      <a:r>
+                        <a:rPr kumimoji="1" lang="en-US" altLang="ja-JP" sz="1400" dirty="0" smtClean="0"/>
+                        <a:t>GPIO </a:t>
+                      </a:r>
+                      <a:r>
+                        <a:rPr lang="en-US" altLang="ja-JP" sz="1400" dirty="0" smtClean="0"/>
+                        <a:t>16</a:t>
+                      </a:r>
+                      <a:endParaRPr kumimoji="1" lang="ja-JP" altLang="en-US" sz="1400" dirty="0"/>
+                    </a:p>
+                  </p:txBody>
+                </p:sp>
+                <p:sp>
+                  <p:nvSpPr>
+                    <p:cNvPr id="55" name="テキスト ボックス 54"/>
+                    <p:cNvSpPr txBox="1"/>
+                    <p:nvPr/>
+                  </p:nvSpPr>
+                  <p:spPr>
+                    <a:xfrm>
+                      <a:off x="8503920" y="3776933"/>
+                      <a:ext cx="1728000" cy="307777"/>
+                    </a:xfrm>
+                    <a:prstGeom prst="rect">
+                      <a:avLst/>
+                    </a:prstGeom>
+                    <a:ln>
+                      <a:solidFill>
+                        <a:schemeClr val="bg1"/>
+                      </a:solidFill>
+                    </a:ln>
+                  </p:spPr>
+                  <p:style>
+                    <a:lnRef idx="1">
+                      <a:schemeClr val="accent4"/>
+                    </a:lnRef>
+                    <a:fillRef idx="2">
+                      <a:schemeClr val="accent4"/>
+                    </a:fillRef>
+                    <a:effectRef idx="1">
+                      <a:schemeClr val="accent4"/>
+                    </a:effectRef>
+                    <a:fontRef idx="minor">
+                      <a:schemeClr val="dk1"/>
+                    </a:fontRef>
+                  </p:style>
+                  <p:txBody>
+                    <a:bodyPr wrap="square" rtlCol="0">
+                      <a:spAutoFit/>
+                    </a:bodyPr>
+                    <a:lstStyle/>
+                    <a:p>
+                      <a:pPr algn="ctr"/>
+                      <a:r>
+                        <a:rPr kumimoji="1" lang="en-US" altLang="ja-JP" sz="1400" dirty="0" smtClean="0"/>
+                        <a:t>GPIO </a:t>
+                      </a:r>
+                      <a:r>
+                        <a:rPr lang="en-US" altLang="ja-JP" sz="1400" dirty="0" smtClean="0"/>
+                        <a:t>15</a:t>
+                      </a:r>
+                      <a:endParaRPr kumimoji="1" lang="ja-JP" altLang="en-US" sz="1400" dirty="0"/>
+                    </a:p>
+                  </p:txBody>
+                </p:sp>
+                <p:sp>
+                  <p:nvSpPr>
+                    <p:cNvPr id="56" name="テキスト ボックス 55"/>
+                    <p:cNvSpPr txBox="1"/>
+                    <p:nvPr/>
+                  </p:nvSpPr>
+                  <p:spPr>
+                    <a:xfrm>
+                      <a:off x="8495595" y="4535623"/>
+                      <a:ext cx="1728000" cy="307777"/>
+                    </a:xfrm>
+                    <a:prstGeom prst="rect">
+                      <a:avLst/>
+                    </a:prstGeom>
+                    <a:ln>
+                      <a:solidFill>
+                        <a:schemeClr val="bg1"/>
+                      </a:solidFill>
+                    </a:ln>
+                  </p:spPr>
+                  <p:style>
+                    <a:lnRef idx="1">
+                      <a:schemeClr val="accent4"/>
+                    </a:lnRef>
+                    <a:fillRef idx="2">
+                      <a:schemeClr val="accent4"/>
+                    </a:fillRef>
+                    <a:effectRef idx="1">
+                      <a:schemeClr val="accent4"/>
+                    </a:effectRef>
+                    <a:fontRef idx="minor">
+                      <a:schemeClr val="dk1"/>
+                    </a:fontRef>
+                  </p:style>
+                  <p:txBody>
+                    <a:bodyPr wrap="square" rtlCol="0">
+                      <a:spAutoFit/>
+                    </a:bodyPr>
+                    <a:lstStyle/>
+                    <a:p>
+                      <a:pPr algn="ctr"/>
+                      <a:r>
+                        <a:rPr kumimoji="1" lang="en-US" altLang="ja-JP" sz="1400" dirty="0" smtClean="0"/>
+                        <a:t>GPIO </a:t>
+                      </a:r>
+                      <a:r>
+                        <a:rPr lang="en-US" altLang="ja-JP" sz="1400" dirty="0" smtClean="0"/>
+                        <a:t>14</a:t>
+                      </a:r>
+                      <a:endParaRPr kumimoji="1" lang="ja-JP" altLang="en-US" sz="1400" dirty="0"/>
+                    </a:p>
+                  </p:txBody>
+                </p:sp>
+                <p:sp>
+                  <p:nvSpPr>
+                    <p:cNvPr id="57" name="テキスト ボックス 56"/>
+                    <p:cNvSpPr txBox="1"/>
+                    <p:nvPr/>
+                  </p:nvSpPr>
+                  <p:spPr>
+                    <a:xfrm>
+                      <a:off x="8512320" y="5367373"/>
+                      <a:ext cx="1728000" cy="307777"/>
+                    </a:xfrm>
+                    <a:prstGeom prst="rect">
+                      <a:avLst/>
+                    </a:prstGeom>
+                    <a:ln>
+                      <a:solidFill>
+                        <a:schemeClr val="bg1"/>
+                      </a:solidFill>
+                    </a:ln>
+                  </p:spPr>
+                  <p:style>
+                    <a:lnRef idx="1">
+                      <a:schemeClr val="accent4"/>
+                    </a:lnRef>
+                    <a:fillRef idx="2">
+                      <a:schemeClr val="accent4"/>
+                    </a:fillRef>
+                    <a:effectRef idx="1">
+                      <a:schemeClr val="accent4"/>
+                    </a:effectRef>
+                    <a:fontRef idx="minor">
+                      <a:schemeClr val="dk1"/>
+                    </a:fontRef>
+                  </p:style>
+                  <p:txBody>
+                    <a:bodyPr wrap="square" rtlCol="0">
+                      <a:spAutoFit/>
+                    </a:bodyPr>
+                    <a:lstStyle/>
+                    <a:p>
+                      <a:pPr algn="ctr"/>
+                      <a:r>
+                        <a:rPr kumimoji="1" lang="en-US" altLang="ja-JP" sz="1400" dirty="0" smtClean="0"/>
+                        <a:t>GPIO </a:t>
+                      </a:r>
+                      <a:r>
+                        <a:rPr lang="en-US" altLang="ja-JP" sz="1400" dirty="0" smtClean="0"/>
+                        <a:t>13</a:t>
+                      </a:r>
+                      <a:endParaRPr kumimoji="1" lang="ja-JP" altLang="en-US" sz="1400" dirty="0"/>
+                    </a:p>
+                  </p:txBody>
+                </p:sp>
+                <p:sp>
+                  <p:nvSpPr>
+                    <p:cNvPr id="58" name="テキスト ボックス 57"/>
+                    <p:cNvSpPr txBox="1"/>
+                    <p:nvPr/>
+                  </p:nvSpPr>
+                  <p:spPr>
+                    <a:xfrm>
+                      <a:off x="8495595" y="5743310"/>
+                      <a:ext cx="1728000" cy="307777"/>
+                    </a:xfrm>
+                    <a:prstGeom prst="rect">
+                      <a:avLst/>
+                    </a:prstGeom>
+                    <a:ln>
+                      <a:solidFill>
+                        <a:schemeClr val="bg1"/>
+                      </a:solidFill>
+                    </a:ln>
+                  </p:spPr>
+                  <p:style>
+                    <a:lnRef idx="1">
+                      <a:schemeClr val="accent4"/>
+                    </a:lnRef>
+                    <a:fillRef idx="2">
+                      <a:schemeClr val="accent4"/>
+                    </a:fillRef>
+                    <a:effectRef idx="1">
+                      <a:schemeClr val="accent4"/>
+                    </a:effectRef>
+                    <a:fontRef idx="minor">
+                      <a:schemeClr val="dk1"/>
+                    </a:fontRef>
+                  </p:style>
+                  <p:txBody>
+                    <a:bodyPr wrap="square" rtlCol="0">
+                      <a:spAutoFit/>
+                    </a:bodyPr>
+                    <a:lstStyle/>
+                    <a:p>
+                      <a:pPr algn="ctr"/>
+                      <a:r>
+                        <a:rPr kumimoji="1" lang="en-US" altLang="ja-JP" sz="1400" dirty="0" smtClean="0"/>
+                        <a:t>GPIO </a:t>
+                      </a:r>
+                      <a:r>
+                        <a:rPr lang="en-US" altLang="ja-JP" sz="1400" dirty="0" smtClean="0"/>
+                        <a:t>12</a:t>
+                      </a:r>
+                      <a:endParaRPr kumimoji="1" lang="ja-JP" altLang="en-US" sz="1400" dirty="0"/>
+                    </a:p>
+                  </p:txBody>
+                </p:sp>
+                <p:sp>
+                  <p:nvSpPr>
+                    <p:cNvPr id="59" name="テキスト ボックス 58"/>
+                    <p:cNvSpPr txBox="1"/>
+                    <p:nvPr/>
+                  </p:nvSpPr>
+                  <p:spPr>
+                    <a:xfrm>
+                      <a:off x="8495595" y="6157104"/>
+                      <a:ext cx="1728000" cy="307777"/>
+                    </a:xfrm>
+                    <a:prstGeom prst="rect">
+                      <a:avLst/>
+                    </a:prstGeom>
+                    <a:ln>
+                      <a:solidFill>
+                        <a:schemeClr val="bg1"/>
+                      </a:solidFill>
+                    </a:ln>
+                  </p:spPr>
+                  <p:style>
+                    <a:lnRef idx="1">
+                      <a:schemeClr val="accent4"/>
+                    </a:lnRef>
+                    <a:fillRef idx="2">
+                      <a:schemeClr val="accent4"/>
+                    </a:fillRef>
+                    <a:effectRef idx="1">
+                      <a:schemeClr val="accent4"/>
+                    </a:effectRef>
+                    <a:fontRef idx="minor">
+                      <a:schemeClr val="dk1"/>
+                    </a:fontRef>
+                  </p:style>
+                  <p:txBody>
+                    <a:bodyPr wrap="square" rtlCol="0">
+                      <a:spAutoFit/>
+                    </a:bodyPr>
+                    <a:lstStyle/>
+                    <a:p>
+                      <a:pPr algn="ctr"/>
+                      <a:r>
+                        <a:rPr kumimoji="1" lang="en-US" altLang="ja-JP" sz="1400" dirty="0" smtClean="0"/>
+                        <a:t>GPIO </a:t>
+                      </a:r>
+                      <a:r>
+                        <a:rPr lang="en-US" altLang="ja-JP" sz="1400" dirty="0" smtClean="0"/>
+                        <a:t>11</a:t>
+                      </a:r>
+                      <a:endParaRPr kumimoji="1" lang="ja-JP" altLang="en-US" sz="1400" dirty="0"/>
+                    </a:p>
+                  </p:txBody>
+                </p:sp>
+                <p:sp>
+                  <p:nvSpPr>
+                    <p:cNvPr id="61" name="テキスト ボックス 60"/>
+                    <p:cNvSpPr txBox="1"/>
+                    <p:nvPr/>
+                  </p:nvSpPr>
+                  <p:spPr>
+                    <a:xfrm>
+                      <a:off x="2353052" y="1014846"/>
+                      <a:ext cx="1377696" cy="307777"/>
+                    </a:xfrm>
+                    <a:prstGeom prst="rect">
+                      <a:avLst/>
+                    </a:prstGeom>
+                    <a:solidFill>
+                      <a:srgbClr val="FF0000"/>
+                    </a:solidFill>
+                    <a:ln>
+                      <a:solidFill>
+                        <a:schemeClr val="bg1"/>
+                      </a:solidFill>
+                    </a:ln>
+                  </p:spPr>
+                  <p:style>
+                    <a:lnRef idx="2">
+                      <a:schemeClr val="accent2">
+                        <a:shade val="50000"/>
+                      </a:schemeClr>
+                    </a:lnRef>
+                    <a:fillRef idx="1">
+                      <a:schemeClr val="accent2"/>
+                    </a:fillRef>
+                    <a:effectRef idx="0">
+                      <a:schemeClr val="accent2"/>
+                    </a:effectRef>
+                    <a:fontRef idx="minor">
+                      <a:schemeClr val="lt1"/>
+                    </a:fontRef>
+                  </p:style>
+                  <p:txBody>
+                    <a:bodyPr wrap="square" rtlCol="0">
+                      <a:spAutoFit/>
+                    </a:bodyPr>
+                    <a:lstStyle/>
+                    <a:p>
+                      <a:pPr algn="ctr"/>
+                      <a:r>
+                        <a:rPr lang="en-US" altLang="ja-JP" sz="1400" dirty="0" smtClean="0"/>
+                        <a:t>VBUS 5.0V</a:t>
+                      </a:r>
+                      <a:endParaRPr kumimoji="1" lang="ja-JP" altLang="en-US" sz="1400" dirty="0"/>
+                    </a:p>
+                  </p:txBody>
+                </p:sp>
+                <p:sp>
+                  <p:nvSpPr>
+                    <p:cNvPr id="62" name="テキスト ボックス 61"/>
+                    <p:cNvSpPr txBox="1"/>
+                    <p:nvPr/>
+                  </p:nvSpPr>
+                  <p:spPr>
+                    <a:xfrm>
+                      <a:off x="2353052" y="622644"/>
+                      <a:ext cx="1377696" cy="307777"/>
+                    </a:xfrm>
+                    <a:prstGeom prst="rect">
+                      <a:avLst/>
+                    </a:prstGeom>
+                    <a:ln>
+                      <a:solidFill>
+                        <a:schemeClr val="bg1"/>
+                      </a:solidFill>
+                    </a:ln>
+                  </p:spPr>
+                  <p:style>
+                    <a:lnRef idx="3">
+                      <a:schemeClr val="lt1"/>
+                    </a:lnRef>
+                    <a:fillRef idx="1">
+                      <a:schemeClr val="dk1"/>
+                    </a:fillRef>
+                    <a:effectRef idx="1">
+                      <a:schemeClr val="dk1"/>
+                    </a:effectRef>
+                    <a:fontRef idx="minor">
+                      <a:schemeClr val="lt1"/>
+                    </a:fontRef>
+                  </p:style>
+                  <p:txBody>
+                    <a:bodyPr wrap="square" rtlCol="0">
+                      <a:spAutoFit/>
+                    </a:bodyPr>
+                    <a:lstStyle/>
+                    <a:p>
+                      <a:pPr algn="ctr"/>
+                      <a:r>
+                        <a:rPr kumimoji="1" lang="en-US" altLang="ja-JP" sz="1400" dirty="0" smtClean="0"/>
+                        <a:t>GND</a:t>
+                      </a:r>
+                      <a:endParaRPr kumimoji="1" lang="ja-JP" altLang="en-US" sz="1400" dirty="0"/>
+                    </a:p>
+                  </p:txBody>
+                </p:sp>
+                <p:sp>
+                  <p:nvSpPr>
+                    <p:cNvPr id="65" name="テキスト ボックス 64"/>
+                    <p:cNvSpPr txBox="1"/>
+                    <p:nvPr/>
+                  </p:nvSpPr>
+                  <p:spPr>
+                    <a:xfrm>
+                      <a:off x="8512320" y="1022488"/>
+                      <a:ext cx="1377696" cy="307777"/>
+                    </a:xfrm>
+                    <a:prstGeom prst="rect">
+                      <a:avLst/>
+                    </a:prstGeom>
+                    <a:solidFill>
+                      <a:srgbClr val="FF0000"/>
+                    </a:solidFill>
+                    <a:ln>
+                      <a:solidFill>
+                        <a:schemeClr val="bg1"/>
+                      </a:solidFill>
+                    </a:ln>
+                  </p:spPr>
+                  <p:style>
+                    <a:lnRef idx="2">
+                      <a:schemeClr val="accent2">
+                        <a:shade val="50000"/>
+                      </a:schemeClr>
+                    </a:lnRef>
+                    <a:fillRef idx="1">
+                      <a:schemeClr val="accent2"/>
+                    </a:fillRef>
+                    <a:effectRef idx="0">
+                      <a:schemeClr val="accent2"/>
+                    </a:effectRef>
+                    <a:fontRef idx="minor">
+                      <a:schemeClr val="lt1"/>
+                    </a:fontRef>
+                  </p:style>
+                  <p:txBody>
+                    <a:bodyPr wrap="square" rtlCol="0">
+                      <a:spAutoFit/>
+                    </a:bodyPr>
+                    <a:lstStyle/>
+                    <a:p>
+                      <a:pPr algn="ctr"/>
+                      <a:r>
+                        <a:rPr lang="en-US" altLang="ja-JP" sz="1400" dirty="0" smtClean="0"/>
+                        <a:t>3.3V Output</a:t>
+                      </a:r>
+                      <a:endParaRPr kumimoji="1" lang="ja-JP" altLang="en-US" sz="1400" dirty="0"/>
+                    </a:p>
+                  </p:txBody>
+                </p:sp>
+                <p:sp>
+                  <p:nvSpPr>
+                    <p:cNvPr id="66" name="テキスト ボックス 65"/>
+                    <p:cNvSpPr txBox="1"/>
+                    <p:nvPr/>
+                  </p:nvSpPr>
+                  <p:spPr>
+                    <a:xfrm>
+                      <a:off x="8512320" y="630286"/>
+                      <a:ext cx="1377696" cy="307777"/>
+                    </a:xfrm>
+                    <a:prstGeom prst="rect">
+                      <a:avLst/>
+                    </a:prstGeom>
+                    <a:ln>
+                      <a:solidFill>
+                        <a:schemeClr val="bg1"/>
+                      </a:solidFill>
+                    </a:ln>
+                  </p:spPr>
+                  <p:style>
+                    <a:lnRef idx="3">
+                      <a:schemeClr val="lt1"/>
+                    </a:lnRef>
+                    <a:fillRef idx="1">
+                      <a:schemeClr val="dk1"/>
+                    </a:fillRef>
+                    <a:effectRef idx="1">
+                      <a:schemeClr val="dk1"/>
+                    </a:effectRef>
+                    <a:fontRef idx="minor">
+                      <a:schemeClr val="lt1"/>
+                    </a:fontRef>
+                  </p:style>
+                  <p:txBody>
+                    <a:bodyPr wrap="square" rtlCol="0">
+                      <a:spAutoFit/>
+                    </a:bodyPr>
+                    <a:lstStyle/>
+                    <a:p>
+                      <a:pPr algn="ctr"/>
+                      <a:r>
+                        <a:rPr kumimoji="1" lang="en-US" altLang="ja-JP" sz="1400" dirty="0" smtClean="0"/>
+                        <a:t>GND</a:t>
+                      </a:r>
+                      <a:endParaRPr kumimoji="1" lang="ja-JP" altLang="en-US" sz="1400" dirty="0"/>
+                    </a:p>
+                  </p:txBody>
+                </p:sp>
+              </p:grpSp>
               <p:sp>
                 <p:nvSpPr>
-                  <p:cNvPr id="55" name="テキスト ボックス 54"/>
-                  <p:cNvSpPr txBox="1"/>
+                  <p:cNvPr id="68" name="十字形 67"/>
+                  <p:cNvSpPr>
+                    <a:spLocks noChangeAspect="1"/>
+                  </p:cNvSpPr>
                   <p:nvPr/>
                 </p:nvSpPr>
                 <p:spPr>
-                  <a:xfrm>
-                    <a:off x="8503920" y="3776933"/>
-                    <a:ext cx="1728000" cy="307777"/>
+                  <a:xfrm rot="2700000">
+                    <a:off x="8376836" y="1419513"/>
+                    <a:ext cx="312280" cy="312280"/>
                   </a:xfrm>
-                  <a:prstGeom prst="rect">
-                    <a:avLst/>
-                  </a:prstGeom>
-                  <a:ln>
-                    <a:solidFill>
-                      <a:schemeClr val="bg1"/>
-                    </a:solidFill>
-                  </a:ln>
-                </p:spPr>
-                <p:style>
-                  <a:lnRef idx="1">
-                    <a:schemeClr val="accent4"/>
-                  </a:lnRef>
-                  <a:fillRef idx="2">
-                    <a:schemeClr val="accent4"/>
-                  </a:fillRef>
-                  <a:effectRef idx="1">
-                    <a:schemeClr val="accent4"/>
-                  </a:effectRef>
-                  <a:fontRef idx="minor">
-                    <a:schemeClr val="dk1"/>
-                  </a:fontRef>
-                </p:style>
-                <p:txBody>
-                  <a:bodyPr wrap="square" rtlCol="0">
-                    <a:spAutoFit/>
-                  </a:bodyPr>
-                  <a:lstStyle/>
-                  <a:p>
-                    <a:pPr algn="ctr"/>
-                    <a:r>
-                      <a:rPr kumimoji="1" lang="en-US" altLang="ja-JP" sz="1400" dirty="0" smtClean="0"/>
-                      <a:t>GPIO </a:t>
-                    </a:r>
-                    <a:r>
-                      <a:rPr lang="en-US" altLang="ja-JP" sz="1400" dirty="0" smtClean="0"/>
-                      <a:t>15</a:t>
-                    </a:r>
-                    <a:endParaRPr kumimoji="1" lang="ja-JP" altLang="en-US" sz="1400" dirty="0"/>
-                  </a:p>
-                </p:txBody>
-              </p:sp>
-              <p:sp>
-                <p:nvSpPr>
-                  <p:cNvPr id="56" name="テキスト ボックス 55"/>
-                  <p:cNvSpPr txBox="1"/>
-                  <p:nvPr/>
-                </p:nvSpPr>
-                <p:spPr>
-                  <a:xfrm>
-                    <a:off x="8495595" y="4535623"/>
-                    <a:ext cx="1728000" cy="307777"/>
-                  </a:xfrm>
-                  <a:prstGeom prst="rect">
-                    <a:avLst/>
-                  </a:prstGeom>
-                  <a:ln>
-                    <a:solidFill>
-                      <a:schemeClr val="bg1"/>
-                    </a:solidFill>
-                  </a:ln>
-                </p:spPr>
-                <p:style>
-                  <a:lnRef idx="1">
-                    <a:schemeClr val="accent4"/>
-                  </a:lnRef>
-                  <a:fillRef idx="2">
-                    <a:schemeClr val="accent4"/>
-                  </a:fillRef>
-                  <a:effectRef idx="1">
-                    <a:schemeClr val="accent4"/>
-                  </a:effectRef>
-                  <a:fontRef idx="minor">
-                    <a:schemeClr val="dk1"/>
-                  </a:fontRef>
-                </p:style>
-                <p:txBody>
-                  <a:bodyPr wrap="square" rtlCol="0">
-                    <a:spAutoFit/>
-                  </a:bodyPr>
-                  <a:lstStyle/>
-                  <a:p>
-                    <a:pPr algn="ctr"/>
-                    <a:r>
-                      <a:rPr kumimoji="1" lang="en-US" altLang="ja-JP" sz="1400" dirty="0" smtClean="0"/>
-                      <a:t>GPIO </a:t>
-                    </a:r>
-                    <a:r>
-                      <a:rPr lang="en-US" altLang="ja-JP" sz="1400" dirty="0" smtClean="0"/>
-                      <a:t>14</a:t>
-                    </a:r>
-                    <a:endParaRPr kumimoji="1" lang="ja-JP" altLang="en-US" sz="1400" dirty="0"/>
-                  </a:p>
-                </p:txBody>
-              </p:sp>
-              <p:sp>
-                <p:nvSpPr>
-                  <p:cNvPr id="57" name="テキスト ボックス 56"/>
-                  <p:cNvSpPr txBox="1"/>
-                  <p:nvPr/>
-                </p:nvSpPr>
-                <p:spPr>
-                  <a:xfrm>
-                    <a:off x="8512320" y="5367373"/>
-                    <a:ext cx="1728000" cy="307777"/>
-                  </a:xfrm>
-                  <a:prstGeom prst="rect">
-                    <a:avLst/>
-                  </a:prstGeom>
-                  <a:ln>
-                    <a:solidFill>
-                      <a:schemeClr val="bg1"/>
-                    </a:solidFill>
-                  </a:ln>
-                </p:spPr>
-                <p:style>
-                  <a:lnRef idx="1">
-                    <a:schemeClr val="accent4"/>
-                  </a:lnRef>
-                  <a:fillRef idx="2">
-                    <a:schemeClr val="accent4"/>
-                  </a:fillRef>
-                  <a:effectRef idx="1">
-                    <a:schemeClr val="accent4"/>
-                  </a:effectRef>
-                  <a:fontRef idx="minor">
-                    <a:schemeClr val="dk1"/>
-                  </a:fontRef>
-                </p:style>
-                <p:txBody>
-                  <a:bodyPr wrap="square" rtlCol="0">
-                    <a:spAutoFit/>
-                  </a:bodyPr>
-                  <a:lstStyle/>
-                  <a:p>
-                    <a:pPr algn="ctr"/>
-                    <a:r>
-                      <a:rPr kumimoji="1" lang="en-US" altLang="ja-JP" sz="1400" dirty="0" smtClean="0"/>
-                      <a:t>GPIO </a:t>
-                    </a:r>
-                    <a:r>
-                      <a:rPr lang="en-US" altLang="ja-JP" sz="1400" dirty="0" smtClean="0"/>
-                      <a:t>13</a:t>
-                    </a:r>
-                    <a:endParaRPr kumimoji="1" lang="ja-JP" altLang="en-US" sz="1400" dirty="0"/>
-                  </a:p>
-                </p:txBody>
-              </p:sp>
-              <p:sp>
-                <p:nvSpPr>
-                  <p:cNvPr id="58" name="テキスト ボックス 57"/>
-                  <p:cNvSpPr txBox="1"/>
-                  <p:nvPr/>
-                </p:nvSpPr>
-                <p:spPr>
-                  <a:xfrm>
-                    <a:off x="8495595" y="5743310"/>
-                    <a:ext cx="1728000" cy="307777"/>
-                  </a:xfrm>
-                  <a:prstGeom prst="rect">
-                    <a:avLst/>
-                  </a:prstGeom>
-                  <a:ln>
-                    <a:solidFill>
-                      <a:schemeClr val="bg1"/>
-                    </a:solidFill>
-                  </a:ln>
-                </p:spPr>
-                <p:style>
-                  <a:lnRef idx="1">
-                    <a:schemeClr val="accent4"/>
-                  </a:lnRef>
-                  <a:fillRef idx="2">
-                    <a:schemeClr val="accent4"/>
-                  </a:fillRef>
-                  <a:effectRef idx="1">
-                    <a:schemeClr val="accent4"/>
-                  </a:effectRef>
-                  <a:fontRef idx="minor">
-                    <a:schemeClr val="dk1"/>
-                  </a:fontRef>
-                </p:style>
-                <p:txBody>
-                  <a:bodyPr wrap="square" rtlCol="0">
-                    <a:spAutoFit/>
-                  </a:bodyPr>
-                  <a:lstStyle/>
-                  <a:p>
-                    <a:pPr algn="ctr"/>
-                    <a:r>
-                      <a:rPr kumimoji="1" lang="en-US" altLang="ja-JP" sz="1400" dirty="0" smtClean="0"/>
-                      <a:t>GPIO </a:t>
-                    </a:r>
-                    <a:r>
-                      <a:rPr lang="en-US" altLang="ja-JP" sz="1400" dirty="0" smtClean="0"/>
-                      <a:t>12</a:t>
-                    </a:r>
-                    <a:endParaRPr kumimoji="1" lang="ja-JP" altLang="en-US" sz="1400" dirty="0"/>
-                  </a:p>
-                </p:txBody>
-              </p:sp>
-              <p:sp>
-                <p:nvSpPr>
-                  <p:cNvPr id="59" name="テキスト ボックス 58"/>
-                  <p:cNvSpPr txBox="1"/>
-                  <p:nvPr/>
-                </p:nvSpPr>
-                <p:spPr>
-                  <a:xfrm>
-                    <a:off x="8495595" y="6157104"/>
-                    <a:ext cx="1728000" cy="307777"/>
-                  </a:xfrm>
-                  <a:prstGeom prst="rect">
-                    <a:avLst/>
-                  </a:prstGeom>
-                  <a:ln>
-                    <a:solidFill>
-                      <a:schemeClr val="bg1"/>
-                    </a:solidFill>
-                  </a:ln>
-                </p:spPr>
-                <p:style>
-                  <a:lnRef idx="1">
-                    <a:schemeClr val="accent4"/>
-                  </a:lnRef>
-                  <a:fillRef idx="2">
-                    <a:schemeClr val="accent4"/>
-                  </a:fillRef>
-                  <a:effectRef idx="1">
-                    <a:schemeClr val="accent4"/>
-                  </a:effectRef>
-                  <a:fontRef idx="minor">
-                    <a:schemeClr val="dk1"/>
-                  </a:fontRef>
-                </p:style>
-                <p:txBody>
-                  <a:bodyPr wrap="square" rtlCol="0">
-                    <a:spAutoFit/>
-                  </a:bodyPr>
-                  <a:lstStyle/>
-                  <a:p>
-                    <a:pPr algn="ctr"/>
-                    <a:r>
-                      <a:rPr kumimoji="1" lang="en-US" altLang="ja-JP" sz="1400" dirty="0" smtClean="0"/>
-                      <a:t>GPIO </a:t>
-                    </a:r>
-                    <a:r>
-                      <a:rPr lang="en-US" altLang="ja-JP" sz="1400" dirty="0" smtClean="0"/>
-                      <a:t>11</a:t>
-                    </a:r>
-                    <a:endParaRPr kumimoji="1" lang="ja-JP" altLang="en-US" sz="1400" dirty="0"/>
-                  </a:p>
-                </p:txBody>
-              </p:sp>
-              <p:sp>
-                <p:nvSpPr>
-                  <p:cNvPr id="61" name="テキスト ボックス 60"/>
-                  <p:cNvSpPr txBox="1"/>
-                  <p:nvPr/>
-                </p:nvSpPr>
-                <p:spPr>
-                  <a:xfrm>
-                    <a:off x="2353052" y="1014846"/>
-                    <a:ext cx="1377696" cy="307777"/>
-                  </a:xfrm>
-                  <a:prstGeom prst="rect">
-                    <a:avLst/>
+                  <a:prstGeom prst="plus">
+                    <a:avLst>
+                      <a:gd name="adj" fmla="val 47223"/>
+                    </a:avLst>
                   </a:prstGeom>
                   <a:solidFill>
-                    <a:srgbClr val="FF0000"/>
+                    <a:schemeClr val="tx1"/>
                   </a:solidFill>
                   <a:ln>
                     <a:solidFill>
-                      <a:schemeClr val="bg1"/>
+                      <a:schemeClr val="tx1"/>
                     </a:solidFill>
                   </a:ln>
                 </p:spPr>
                 <p:style>
                   <a:lnRef idx="2">
-                    <a:schemeClr val="accent2">
+                    <a:schemeClr val="accent1">
                       <a:shade val="50000"/>
                     </a:schemeClr>
                   </a:lnRef>
                   <a:fillRef idx="1">
-                    <a:schemeClr val="accent2"/>
+                    <a:schemeClr val="accent1"/>
                   </a:fillRef>
                   <a:effectRef idx="0">
-                    <a:schemeClr val="accent2"/>
+                    <a:schemeClr val="accent1"/>
                   </a:effectRef>
                   <a:fontRef idx="minor">
                     <a:schemeClr val="lt1"/>
                   </a:fontRef>
                 </p:style>
                 <p:txBody>
-                  <a:bodyPr wrap="square" rtlCol="0">
-                    <a:spAutoFit/>
-                  </a:bodyPr>
+                  <a:bodyPr rtlCol="0" anchor="ctr"/>
                   <a:lstStyle/>
                   <a:p>
                     <a:pPr algn="ctr"/>
-                    <a:r>
-                      <a:rPr lang="en-US" altLang="ja-JP" sz="1400" dirty="0" smtClean="0"/>
-                      <a:t>VBUS 5.0V</a:t>
-                    </a:r>
-                    <a:endParaRPr kumimoji="1" lang="ja-JP" altLang="en-US" sz="1400" dirty="0"/>
+                    <a:endParaRPr kumimoji="1" lang="ja-JP" altLang="en-US"/>
                   </a:p>
                 </p:txBody>
               </p:sp>
               <p:sp>
                 <p:nvSpPr>
-                  <p:cNvPr id="62" name="テキスト ボックス 61"/>
-                  <p:cNvSpPr txBox="1"/>
+                  <p:cNvPr id="69" name="十字形 68"/>
+                  <p:cNvSpPr>
+                    <a:spLocks noChangeAspect="1"/>
+                  </p:cNvSpPr>
                   <p:nvPr/>
                 </p:nvSpPr>
                 <p:spPr>
-                  <a:xfrm>
-                    <a:off x="2353052" y="622644"/>
-                    <a:ext cx="1377696" cy="307777"/>
+                  <a:xfrm rot="2700000">
+                    <a:off x="8373855" y="2969746"/>
+                    <a:ext cx="312280" cy="312280"/>
                   </a:xfrm>
-                  <a:prstGeom prst="rect">
-                    <a:avLst/>
+                  <a:prstGeom prst="plus">
+                    <a:avLst>
+                      <a:gd name="adj" fmla="val 47223"/>
+                    </a:avLst>
                   </a:prstGeom>
+                  <a:solidFill>
+                    <a:schemeClr val="tx1"/>
+                  </a:solidFill>
                   <a:ln>
                     <a:solidFill>
-                      <a:schemeClr val="bg1"/>
+                      <a:schemeClr val="tx1"/>
                     </a:solidFill>
                   </a:ln>
                 </p:spPr>
                 <p:style>
-                  <a:lnRef idx="3">
-                    <a:schemeClr val="lt1"/>
+                  <a:lnRef idx="2">
+                    <a:schemeClr val="accent1">
+                      <a:shade val="50000"/>
+                    </a:schemeClr>
                   </a:lnRef>
                   <a:fillRef idx="1">
-                    <a:schemeClr val="dk1"/>
+                    <a:schemeClr val="accent1"/>
                   </a:fillRef>
-                  <a:effectRef idx="1">
-                    <a:schemeClr val="dk1"/>
+                  <a:effectRef idx="0">
+                    <a:schemeClr val="accent1"/>
                   </a:effectRef>
                   <a:fontRef idx="minor">
                     <a:schemeClr val="lt1"/>
                   </a:fontRef>
                 </p:style>
                 <p:txBody>
-                  <a:bodyPr wrap="square" rtlCol="0">
-                    <a:spAutoFit/>
-                  </a:bodyPr>
+                  <a:bodyPr rtlCol="0" anchor="ctr"/>
                   <a:lstStyle/>
                   <a:p>
                     <a:pPr algn="ctr"/>
-                    <a:r>
-                      <a:rPr kumimoji="1" lang="en-US" altLang="ja-JP" sz="1400" dirty="0" smtClean="0"/>
-                      <a:t>GND</a:t>
-                    </a:r>
-                    <a:endParaRPr kumimoji="1" lang="ja-JP" altLang="en-US" sz="1400" dirty="0"/>
+                    <a:endParaRPr kumimoji="1" lang="ja-JP" altLang="en-US"/>
                   </a:p>
                 </p:txBody>
               </p:sp>
               <p:sp>
                 <p:nvSpPr>
-                  <p:cNvPr id="65" name="テキスト ボックス 64"/>
-                  <p:cNvSpPr txBox="1"/>
+                  <p:cNvPr id="71" name="十字形 70"/>
+                  <p:cNvSpPr>
+                    <a:spLocks noChangeAspect="1"/>
+                  </p:cNvSpPr>
                   <p:nvPr/>
                 </p:nvSpPr>
                 <p:spPr>
-                  <a:xfrm>
-                    <a:off x="8512320" y="1022488"/>
-                    <a:ext cx="1377696" cy="307777"/>
+                  <a:xfrm rot="2700000">
+                    <a:off x="8373856" y="4131462"/>
+                    <a:ext cx="312280" cy="312280"/>
                   </a:xfrm>
-                  <a:prstGeom prst="rect">
-                    <a:avLst/>
+                  <a:prstGeom prst="plus">
+                    <a:avLst>
+                      <a:gd name="adj" fmla="val 47223"/>
+                    </a:avLst>
                   </a:prstGeom>
                   <a:solidFill>
-                    <a:srgbClr val="FF0000"/>
+                    <a:schemeClr val="tx1"/>
                   </a:solidFill>
                   <a:ln>
                     <a:solidFill>
-                      <a:schemeClr val="bg1"/>
+                      <a:schemeClr val="tx1"/>
                     </a:solidFill>
                   </a:ln>
                 </p:spPr>
                 <p:style>
                   <a:lnRef idx="2">
-                    <a:schemeClr val="accent2">
+                    <a:schemeClr val="accent1">
                       <a:shade val="50000"/>
                     </a:schemeClr>
                   </a:lnRef>
                   <a:fillRef idx="1">
-                    <a:schemeClr val="accent2"/>
+                    <a:schemeClr val="accent1"/>
                   </a:fillRef>
                   <a:effectRef idx="0">
-                    <a:schemeClr val="accent2"/>
+                    <a:schemeClr val="accent1"/>
                   </a:effectRef>
                   <a:fontRef idx="minor">
                     <a:schemeClr val="lt1"/>
                   </a:fontRef>
                 </p:style>
                 <p:txBody>
-                  <a:bodyPr wrap="square" rtlCol="0">
-                    <a:spAutoFit/>
-                  </a:bodyPr>
+                  <a:bodyPr rtlCol="0" anchor="ctr"/>
                   <a:lstStyle/>
                   <a:p>
                     <a:pPr algn="ctr"/>
-                    <a:r>
-                      <a:rPr lang="en-US" altLang="ja-JP" sz="1400" dirty="0" smtClean="0"/>
-                      <a:t>3.3V Output</a:t>
-                    </a:r>
-                    <a:endParaRPr kumimoji="1" lang="ja-JP" altLang="en-US" sz="1400" dirty="0"/>
+                    <a:endParaRPr kumimoji="1" lang="ja-JP" altLang="en-US"/>
                   </a:p>
                 </p:txBody>
               </p:sp>
               <p:sp>
                 <p:nvSpPr>
-                  <p:cNvPr id="66" name="テキスト ボックス 65"/>
-                  <p:cNvSpPr txBox="1"/>
+                  <p:cNvPr id="72" name="十字形 71"/>
+                  <p:cNvSpPr>
+                    <a:spLocks noChangeAspect="1"/>
+                  </p:cNvSpPr>
                   <p:nvPr/>
                 </p:nvSpPr>
                 <p:spPr>
-                  <a:xfrm>
-                    <a:off x="8512320" y="630286"/>
-                    <a:ext cx="1377696" cy="307777"/>
+                  <a:xfrm rot="2700000">
+                    <a:off x="8350711" y="4930315"/>
+                    <a:ext cx="312280" cy="312280"/>
                   </a:xfrm>
-                  <a:prstGeom prst="rect">
-                    <a:avLst/>
+                  <a:prstGeom prst="plus">
+                    <a:avLst>
+                      <a:gd name="adj" fmla="val 47223"/>
+                    </a:avLst>
                   </a:prstGeom>
+                  <a:solidFill>
+                    <a:schemeClr val="tx1"/>
+                  </a:solidFill>
                   <a:ln>
                     <a:solidFill>
-                      <a:schemeClr val="bg1"/>
+                      <a:schemeClr val="tx1"/>
                     </a:solidFill>
                   </a:ln>
                 </p:spPr>
                 <p:style>
-                  <a:lnRef idx="3">
-                    <a:schemeClr val="lt1"/>
+                  <a:lnRef idx="2">
+                    <a:schemeClr val="accent1">
+                      <a:shade val="50000"/>
+                    </a:schemeClr>
                   </a:lnRef>
                   <a:fillRef idx="1">
-                    <a:schemeClr val="dk1"/>
+                    <a:schemeClr val="accent1"/>
                   </a:fillRef>
-                  <a:effectRef idx="1">
-                    <a:schemeClr val="dk1"/>
+                  <a:effectRef idx="0">
+                    <a:schemeClr val="accent1"/>
                   </a:effectRef>
                   <a:fontRef idx="minor">
                     <a:schemeClr val="lt1"/>
                   </a:fontRef>
                 </p:style>
                 <p:txBody>
-                  <a:bodyPr wrap="square" rtlCol="0">
-                    <a:spAutoFit/>
-                  </a:bodyPr>
+                  <a:bodyPr rtlCol="0" anchor="ctr"/>
                   <a:lstStyle/>
                   <a:p>
                     <a:pPr algn="ctr"/>
-                    <a:r>
-                      <a:rPr kumimoji="1" lang="en-US" altLang="ja-JP" sz="1400" dirty="0" smtClean="0"/>
-                      <a:t>GND</a:t>
-                    </a:r>
-                    <a:endParaRPr kumimoji="1" lang="ja-JP" altLang="en-US" sz="1400" dirty="0"/>
+                    <a:endParaRPr kumimoji="1" lang="ja-JP" altLang="en-US"/>
                   </a:p>
                 </p:txBody>
               </p:sp>
             </p:grpSp>
             <p:sp>
               <p:nvSpPr>
-                <p:cNvPr id="68" name="十字形 67"/>
-                <p:cNvSpPr>
-                  <a:spLocks noChangeAspect="1"/>
-                </p:cNvSpPr>
+                <p:cNvPr id="74" name="テキスト ボックス 73"/>
+                <p:cNvSpPr txBox="1"/>
                 <p:nvPr/>
               </p:nvSpPr>
               <p:spPr>
-                <a:xfrm rot="2700000">
-                  <a:off x="8376836" y="1419513"/>
-                  <a:ext cx="312280" cy="312280"/>
+                <a:xfrm rot="5400000">
+                  <a:off x="7845876" y="4163983"/>
+                  <a:ext cx="5080059" cy="307978"/>
                 </a:xfrm>
-                <a:prstGeom prst="plus">
-                  <a:avLst>
-                    <a:gd name="adj" fmla="val 47223"/>
-                  </a:avLst>
+                <a:prstGeom prst="rect">
+                  <a:avLst/>
                 </a:prstGeom>
-                <a:solidFill>
-                  <a:schemeClr val="tx1"/>
-                </a:solidFill>
                 <a:ln>
                   <a:solidFill>
-                    <a:schemeClr val="tx1"/>
+                    <a:schemeClr val="bg1"/>
                   </a:solidFill>
                 </a:ln>
               </p:spPr>
               <p:style>
-                <a:lnRef idx="2">
-                  <a:schemeClr val="accent1">
-                    <a:shade val="50000"/>
-                  </a:schemeClr>
+                <a:lnRef idx="1">
+                  <a:schemeClr val="accent4"/>
                 </a:lnRef>
-                <a:fillRef idx="1">
-                  <a:schemeClr val="accent1"/>
+                <a:fillRef idx="2">
+                  <a:schemeClr val="accent4"/>
                 </a:fillRef>
-                <a:effectRef idx="0">
-                  <a:schemeClr val="accent1"/>
+                <a:effectRef idx="1">
+                  <a:schemeClr val="accent4"/>
                 </a:effectRef>
                 <a:fontRef idx="minor">
-                  <a:schemeClr val="lt1"/>
+                  <a:schemeClr val="dk1"/>
                 </a:fontRef>
               </p:style>
               <p:txBody>
-                <a:bodyPr rtlCol="0" anchor="ctr"/>
+                <a:bodyPr wrap="square" rtlCol="0">
+                  <a:spAutoFit/>
+                </a:bodyPr>
                 <a:lstStyle/>
                 <a:p>
                   <a:pPr algn="ctr"/>
-                  <a:endParaRPr kumimoji="1" lang="ja-JP" altLang="en-US"/>
-                </a:p>
-              </p:txBody>
-            </p:sp>
-            <p:sp>
-              <p:nvSpPr>
-                <p:cNvPr id="69" name="十字形 68"/>
-                <p:cNvSpPr>
-                  <a:spLocks noChangeAspect="1"/>
-                </p:cNvSpPr>
-                <p:nvPr/>
-              </p:nvSpPr>
-              <p:spPr>
-                <a:xfrm rot="2700000">
-                  <a:off x="8373855" y="2969746"/>
-                  <a:ext cx="312280" cy="312280"/>
-                </a:xfrm>
-                <a:prstGeom prst="plus">
-                  <a:avLst>
-                    <a:gd name="adj" fmla="val 47223"/>
-                  </a:avLst>
-                </a:prstGeom>
-                <a:solidFill>
-                  <a:schemeClr val="tx1"/>
-                </a:solidFill>
-                <a:ln>
-                  <a:solidFill>
-                    <a:schemeClr val="tx1"/>
-                  </a:solidFill>
-                </a:ln>
-              </p:spPr>
-              <p:style>
-                <a:lnRef idx="2">
-                  <a:schemeClr val="accent1">
-                    <a:shade val="50000"/>
-                  </a:schemeClr>
-                </a:lnRef>
-                <a:fillRef idx="1">
-                  <a:schemeClr val="accent1"/>
-                </a:fillRef>
-                <a:effectRef idx="0">
-                  <a:schemeClr val="accent1"/>
-                </a:effectRef>
-                <a:fontRef idx="minor">
-                  <a:schemeClr val="lt1"/>
-                </a:fontRef>
-              </p:style>
-              <p:txBody>
-                <a:bodyPr rtlCol="0" anchor="ctr"/>
-                <a:lstStyle/>
-                <a:p>
-                  <a:pPr algn="ctr"/>
-                  <a:endParaRPr kumimoji="1" lang="ja-JP" altLang="en-US"/>
-                </a:p>
-              </p:txBody>
-            </p:sp>
-            <p:sp>
-              <p:nvSpPr>
-                <p:cNvPr id="71" name="十字形 70"/>
-                <p:cNvSpPr>
-                  <a:spLocks noChangeAspect="1"/>
-                </p:cNvSpPr>
-                <p:nvPr/>
-              </p:nvSpPr>
-              <p:spPr>
-                <a:xfrm rot="2700000">
-                  <a:off x="8373856" y="4131462"/>
-                  <a:ext cx="312280" cy="312280"/>
-                </a:xfrm>
-                <a:prstGeom prst="plus">
-                  <a:avLst>
-                    <a:gd name="adj" fmla="val 47223"/>
-                  </a:avLst>
-                </a:prstGeom>
-                <a:solidFill>
-                  <a:schemeClr val="tx1"/>
-                </a:solidFill>
-                <a:ln>
-                  <a:solidFill>
-                    <a:schemeClr val="tx1"/>
-                  </a:solidFill>
-                </a:ln>
-              </p:spPr>
-              <p:style>
-                <a:lnRef idx="2">
-                  <a:schemeClr val="accent1">
-                    <a:shade val="50000"/>
-                  </a:schemeClr>
-                </a:lnRef>
-                <a:fillRef idx="1">
-                  <a:schemeClr val="accent1"/>
-                </a:fillRef>
-                <a:effectRef idx="0">
-                  <a:schemeClr val="accent1"/>
-                </a:effectRef>
-                <a:fontRef idx="minor">
-                  <a:schemeClr val="lt1"/>
-                </a:fontRef>
-              </p:style>
-              <p:txBody>
-                <a:bodyPr rtlCol="0" anchor="ctr"/>
-                <a:lstStyle/>
-                <a:p>
-                  <a:pPr algn="ctr"/>
-                  <a:endParaRPr kumimoji="1" lang="ja-JP" altLang="en-US"/>
-                </a:p>
-              </p:txBody>
-            </p:sp>
-            <p:sp>
-              <p:nvSpPr>
-                <p:cNvPr id="72" name="十字形 71"/>
-                <p:cNvSpPr>
-                  <a:spLocks noChangeAspect="1"/>
-                </p:cNvSpPr>
-                <p:nvPr/>
-              </p:nvSpPr>
-              <p:spPr>
-                <a:xfrm rot="2700000">
-                  <a:off x="8350711" y="4930315"/>
-                  <a:ext cx="312280" cy="312280"/>
-                </a:xfrm>
-                <a:prstGeom prst="plus">
-                  <a:avLst>
-                    <a:gd name="adj" fmla="val 47223"/>
-                  </a:avLst>
-                </a:prstGeom>
-                <a:solidFill>
-                  <a:schemeClr val="tx1"/>
-                </a:solidFill>
-                <a:ln>
-                  <a:solidFill>
-                    <a:schemeClr val="tx1"/>
-                  </a:solidFill>
-                </a:ln>
-              </p:spPr>
-              <p:style>
-                <a:lnRef idx="2">
-                  <a:schemeClr val="accent1">
-                    <a:shade val="50000"/>
-                  </a:schemeClr>
-                </a:lnRef>
-                <a:fillRef idx="1">
-                  <a:schemeClr val="accent1"/>
-                </a:fillRef>
-                <a:effectRef idx="0">
-                  <a:schemeClr val="accent1"/>
-                </a:effectRef>
-                <a:fontRef idx="minor">
-                  <a:schemeClr val="lt1"/>
-                </a:fontRef>
-              </p:style>
-              <p:txBody>
-                <a:bodyPr rtlCol="0" anchor="ctr"/>
-                <a:lstStyle/>
-                <a:p>
-                  <a:pPr algn="ctr"/>
-                  <a:endParaRPr kumimoji="1" lang="ja-JP" altLang="en-US"/>
+                  <a:r>
+                    <a:rPr kumimoji="1" lang="en-US" altLang="ja-JP" sz="1400" smtClean="0"/>
+                    <a:t>GPIO 1</a:t>
+                  </a:r>
+                  <a:endParaRPr kumimoji="1" lang="ja-JP" altLang="en-US" sz="1400" dirty="0"/>
                 </a:p>
               </p:txBody>
             </p:sp>
           </p:grpSp>
           <p:sp>
             <p:nvSpPr>
-              <p:cNvPr id="74" name="テキスト ボックス 73"/>
+              <p:cNvPr id="76" name="テキスト ボックス 75"/>
               <p:cNvSpPr txBox="1"/>
               <p:nvPr/>
             </p:nvSpPr>
             <p:spPr>
-              <a:xfrm rot="5400000">
-                <a:off x="7845876" y="4163983"/>
-                <a:ext cx="5080059" cy="307978"/>
+              <a:xfrm>
+                <a:off x="2368309" y="6633314"/>
+                <a:ext cx="8184649" cy="307777"/>
               </a:xfrm>
               <a:prstGeom prst="rect">
                 <a:avLst/>
@@ -9178,11 +9238,56 @@
                 <a:pPr algn="ctr"/>
                 <a:r>
                   <a:rPr kumimoji="1" lang="en-US" altLang="ja-JP" sz="1400" smtClean="0"/>
-                  <a:t>GPIO </a:t>
+                  <a:t>GPIO 1</a:t>
                 </a:r>
+                <a:endParaRPr kumimoji="1" lang="ja-JP" altLang="en-US" sz="1400" dirty="0"/>
+              </a:p>
+            </p:txBody>
+          </p:sp>
+          <p:sp>
+            <p:nvSpPr>
+              <p:cNvPr id="77" name="テキスト ボックス 76"/>
+              <p:cNvSpPr txBox="1"/>
+              <p:nvPr/>
+            </p:nvSpPr>
+            <p:spPr>
+              <a:xfrm rot="5400000">
+                <a:off x="1730343" y="6309483"/>
+                <a:ext cx="955445" cy="307777"/>
+              </a:xfrm>
+              <a:prstGeom prst="rect">
+                <a:avLst/>
+              </a:prstGeom>
+              <a:ln>
+                <a:solidFill>
+                  <a:schemeClr val="bg1"/>
+                </a:solidFill>
+              </a:ln>
+            </p:spPr>
+            <p:style>
+              <a:lnRef idx="1">
+                <a:schemeClr val="accent4"/>
+              </a:lnRef>
+              <a:fillRef idx="2">
+                <a:schemeClr val="accent4"/>
+              </a:fillRef>
+              <a:effectRef idx="1">
+                <a:schemeClr val="accent4"/>
+              </a:effectRef>
+              <a:fontRef idx="minor">
+                <a:schemeClr val="dk1"/>
+              </a:fontRef>
+            </p:style>
+            <p:txBody>
+              <a:bodyPr wrap="square" rtlCol="0">
+                <a:spAutoFit/>
+              </a:bodyPr>
+              <a:lstStyle/>
+              <a:p>
+                <a:pPr algn="ctr"/>
                 <a:r>
-                  <a:rPr kumimoji="1" lang="en-US" altLang="ja-JP" sz="1400" smtClean="0"/>
-                  <a:t>1</a:t>
+                  <a:rPr kumimoji="1" lang="en-US" altLang="ja-JP" sz="1400" dirty="0" smtClean="0"/>
+                  <a:t>GPIO 1</a:t>
                 </a:r>
                 <a:endParaRPr kumimoji="1" lang="ja-JP" altLang="en-US" sz="1400" dirty="0"/>
               </a:p>
@@ -9191,107 +9296,51 @@
         </p:grpSp>
         <p:sp>
           <p:nvSpPr>
-            <p:cNvPr id="76" name="テキスト ボックス 75"/>
+            <p:cNvPr id="2" name="テキスト ボックス 1"/>
             <p:cNvSpPr txBox="1"/>
             <p:nvPr/>
           </p:nvSpPr>
           <p:spPr>
             <a:xfrm>
-              <a:off x="2368309" y="6633314"/>
-              <a:ext cx="8184649" cy="307777"/>
+              <a:off x="2060515" y="6947731"/>
+              <a:ext cx="8257389" cy="276999"/>
             </a:xfrm>
             <a:prstGeom prst="rect">
               <a:avLst/>
             </a:prstGeom>
-            <a:ln>
-              <a:solidFill>
-                <a:schemeClr val="bg1"/>
-              </a:solidFill>
-            </a:ln>
+            <a:noFill/>
           </p:spPr>
-          <p:style>
-            <a:lnRef idx="1">
-              <a:schemeClr val="accent4"/>
-            </a:lnRef>
-            <a:fillRef idx="2">
-              <a:schemeClr val="accent4"/>
-            </a:fillRef>
-            <a:effectRef idx="1">
-              <a:schemeClr val="accent4"/>
-            </a:effectRef>
-            <a:fontRef idx="minor">
-              <a:schemeClr val="dk1"/>
-            </a:fontRef>
-          </p:style>
           <p:txBody>
-            <a:bodyPr wrap="square" rtlCol="0">
+            <a:bodyPr wrap="none" rtlCol="0">
               <a:spAutoFit/>
             </a:bodyPr>
             <a:lstStyle/>
             <a:p>
-              <a:pPr algn="ctr"/>
               <a:r>
-                <a:rPr kumimoji="1" lang="en-US" altLang="ja-JP" sz="1400" smtClean="0"/>
-                <a:t>GPIO </a:t>
+                <a:rPr lang="en-US" altLang="ja-JP" sz="1200" dirty="0" smtClean="0"/>
+                <a:t>Image from http</a:t>
               </a:r>
               <a:r>
-                <a:rPr kumimoji="1" lang="en-US" altLang="ja-JP" sz="1400" smtClean="0"/>
-                <a:t>1</a:t>
-              </a:r>
-              <a:endParaRPr kumimoji="1" lang="ja-JP" altLang="en-US" sz="1400" dirty="0"/>
-            </a:p>
-          </p:txBody>
-        </p:sp>
-        <p:sp>
-          <p:nvSpPr>
-            <p:cNvPr id="77" name="テキスト ボックス 76"/>
-            <p:cNvSpPr txBox="1"/>
-            <p:nvPr/>
-          </p:nvSpPr>
-          <p:spPr>
-            <a:xfrm rot="5400000">
-              <a:off x="1730343" y="6309483"/>
-              <a:ext cx="955445" cy="307777"/>
-            </a:xfrm>
-            <a:prstGeom prst="rect">
-              <a:avLst/>
-            </a:prstGeom>
-            <a:ln>
-              <a:solidFill>
-                <a:schemeClr val="bg1"/>
-              </a:solidFill>
-            </a:ln>
-          </p:spPr>
-          <p:style>
-            <a:lnRef idx="1">
-              <a:schemeClr val="accent4"/>
-            </a:lnRef>
-            <a:fillRef idx="2">
-              <a:schemeClr val="accent4"/>
-            </a:fillRef>
-            <a:effectRef idx="1">
-              <a:schemeClr val="accent4"/>
-            </a:effectRef>
-            <a:fontRef idx="minor">
-              <a:schemeClr val="dk1"/>
-            </a:fontRef>
-          </p:style>
-          <p:txBody>
-            <a:bodyPr wrap="square" rtlCol="0">
-              <a:spAutoFit/>
-            </a:bodyPr>
-            <a:lstStyle/>
-            <a:p>
-              <a:pPr algn="ctr"/>
-              <a:r>
-                <a:rPr kumimoji="1" lang="en-US" altLang="ja-JP" sz="1400" smtClean="0"/>
-                <a:t>GPIO </a:t>
+                <a:rPr lang="en-US" altLang="ja-JP" sz="1200" dirty="0"/>
+                <a:t>://</a:t>
               </a:r>
               <a:r>
-                <a:rPr kumimoji="1" lang="en-US" altLang="ja-JP" sz="1400" smtClean="0"/>
-                <a:t>1</a:t>
+                <a:rPr lang="en-US" altLang="ja-JP" sz="1200" dirty="0" err="1" smtClean="0"/>
+                <a:t>www.embeddedartists.com</a:t>
               </a:r>
-              <a:endParaRPr kumimoji="1" lang="ja-JP" altLang="en-US" sz="1400" dirty="0"/>
+              <a:r>
+                <a:rPr lang="en-US" altLang="ja-JP" sz="1200" dirty="0" smtClean="0"/>
+                <a:t>/sites/default/files/styles/</a:t>
+              </a:r>
+              <a:r>
+                <a:rPr lang="en-US" altLang="ja-JP" sz="1200" dirty="0" err="1" smtClean="0"/>
+                <a:t>ea_photos_list</a:t>
+              </a:r>
+              <a:r>
+                <a:rPr lang="en-US" altLang="ja-JP" sz="1200" dirty="0" smtClean="0"/>
+                <a:t>/public/image/product/qsb_lpc11u35.png</a:t>
+              </a:r>
+              <a:endParaRPr kumimoji="1" lang="ja-JP" altLang="en-US" sz="1200" dirty="0"/>
             </a:p>
           </p:txBody>
         </p:sp>

</xml_diff>